<commit_message>
feat:refactor and optimize layout management
</commit_message>
<xml_diff>
--- a/templates/MasterTemplate.pptx
+++ b/templates/MasterTemplate.pptx
@@ -2610,6 +2610,1887 @@
 </p:sldLayout>
 </file>
 
+<file path=ppt/slideLayouts/slideLayout5.xml><?xml version="1.0" encoding="utf-8"?>
+<p:sldLayout xmlns:a="http://schemas.openxmlformats.org/drawingml/2006/main" xmlns:r="http://schemas.openxmlformats.org/officeDocument/2006/relationships" xmlns:p="http://schemas.openxmlformats.org/presentationml/2006/main" preserve="1" userDrawn="1">
+  <p:cSld name="Title and 2 Column 1">
+    <p:bg>
+      <p:bgPr>
+        <a:gradFill>
+          <a:gsLst>
+            <a:gs pos="100000">
+              <a:schemeClr val="tx2"/>
+            </a:gs>
+            <a:gs pos="81000">
+              <a:schemeClr val="accent6"/>
+            </a:gs>
+            <a:gs pos="31000">
+              <a:srgbClr val="02090E"/>
+            </a:gs>
+            <a:gs pos="14000">
+              <a:schemeClr val="accent4">
+                <a:lumMod val="75000"/>
+              </a:schemeClr>
+            </a:gs>
+            <a:gs pos="0">
+              <a:schemeClr val="accent4"/>
+            </a:gs>
+          </a:gsLst>
+          <a:lin ang="7800000" scaled="0"/>
+        </a:gradFill>
+        <a:effectLst/>
+      </p:bgPr>
+    </p:bg>
+    <p:spTree>
+      <p:nvGrpSpPr>
+        <p:cNvPr id="1" name=""/>
+        <p:cNvGrpSpPr/>
+        <p:nvPr/>
+      </p:nvGrpSpPr>
+      <p:grpSpPr>
+        <a:xfrm>
+          <a:off x="0" y="0"/>
+          <a:ext cx="0" cy="0"/>
+          <a:chOff x="0" y="0"/>
+          <a:chExt cx="0" cy="0"/>
+        </a:xfrm>
+      </p:grpSpPr>
+      <p:grpSp>
+        <p:nvGrpSpPr>
+          <p:cNvPr id="3" name="Group 2">
+            <a:extLst>
+              <a:ext uri="{FF2B5EF4-FFF2-40B4-BE49-F238E27FC236}">
+                <a16:creationId xmlns:a16="http://schemas.microsoft.com/office/drawing/2014/main" id="{9C7D5518-914C-92E3-E9EC-26752C9F05AD}"/>
+              </a:ext>
+              <a:ext uri="{C183D7F6-B498-43B3-948B-1728B52AA6E4}">
+                <adec:decorative xmlns:adec="http://schemas.microsoft.com/office/drawing/2017/decorative" val="1"/>
+              </a:ext>
+            </a:extLst>
+          </p:cNvPr>
+          <p:cNvGrpSpPr/>
+          <p:nvPr userDrawn="1"/>
+        </p:nvGrpSpPr>
+        <p:grpSpPr>
+          <a:xfrm>
+            <a:off x="-1" y="-6350"/>
+            <a:ext cx="12192000" cy="6864350"/>
+            <a:chOff x="-1" y="-6350"/>
+            <a:chExt cx="12192000" cy="6864350"/>
+          </a:xfrm>
+        </p:grpSpPr>
+        <p:sp>
+          <p:nvSpPr>
+            <p:cNvPr id="4" name="Rectangle 3">
+              <a:extLst>
+                <a:ext uri="{FF2B5EF4-FFF2-40B4-BE49-F238E27FC236}">
+                  <a16:creationId xmlns:a16="http://schemas.microsoft.com/office/drawing/2014/main" id="{C82D0B82-F74C-65EF-3BF6-8EEA16F36B7D}"/>
+                </a:ext>
+                <a:ext uri="{C183D7F6-B498-43B3-948B-1728B52AA6E4}">
+                  <adec:decorative xmlns:adec="http://schemas.microsoft.com/office/drawing/2017/decorative" val="1"/>
+                </a:ext>
+              </a:extLst>
+            </p:cNvPr>
+            <p:cNvSpPr/>
+            <p:nvPr/>
+          </p:nvSpPr>
+          <p:spPr>
+            <a:xfrm>
+              <a:off x="1428750" y="-6350"/>
+              <a:ext cx="10763249" cy="6864350"/>
+            </a:xfrm>
+            <a:prstGeom prst="rect">
+              <a:avLst/>
+            </a:prstGeom>
+            <a:solidFill>
+              <a:schemeClr val="tx1">
+                <a:alpha val="70000"/>
+              </a:schemeClr>
+            </a:solidFill>
+            <a:ln>
+              <a:noFill/>
+            </a:ln>
+          </p:spPr>
+          <p:style>
+            <a:lnRef idx="2">
+              <a:schemeClr val="accent1">
+                <a:shade val="50000"/>
+              </a:schemeClr>
+            </a:lnRef>
+            <a:fillRef idx="1">
+              <a:schemeClr val="accent1"/>
+            </a:fillRef>
+            <a:effectRef idx="0">
+              <a:schemeClr val="accent1"/>
+            </a:effectRef>
+            <a:fontRef idx="minor">
+              <a:schemeClr val="lt1"/>
+            </a:fontRef>
+          </p:style>
+          <p:txBody>
+            <a:bodyPr rtlCol="0" anchor="ctr">
+              <a:noAutofit/>
+            </a:bodyPr>
+            <a:lstStyle/>
+            <a:p>
+              <a:pPr algn="ctr"/>
+              <a:endParaRPr lang="en-US" dirty="0"/>
+            </a:p>
+          </p:txBody>
+        </p:sp>
+        <p:pic>
+          <p:nvPicPr>
+            <p:cNvPr id="6" name="Picture 5" descr="A blue and purple spiral&#10;&#10;Description automatically generated">
+              <a:extLst>
+                <a:ext uri="{FF2B5EF4-FFF2-40B4-BE49-F238E27FC236}">
+                  <a16:creationId xmlns:a16="http://schemas.microsoft.com/office/drawing/2014/main" id="{44E12326-9CF4-38EC-1BAF-1F994F220899}"/>
+                </a:ext>
+              </a:extLst>
+            </p:cNvPr>
+            <p:cNvPicPr>
+              <a:picLocks noChangeAspect="1"/>
+            </p:cNvPicPr>
+            <p:nvPr/>
+          </p:nvPicPr>
+          <p:blipFill rotWithShape="1">
+            <a:blip r:embed="rId2" cstate="screen">
+              <a:extLst>
+                <a:ext uri="{28A0092B-C50C-407E-A947-70E740481C1C}">
+                  <a14:useLocalDpi xmlns:a14="http://schemas.microsoft.com/office/drawing/2010/main"/>
+                </a:ext>
+              </a:extLst>
+            </a:blip>
+            <a:srcRect b="-93"/>
+            <a:stretch/>
+          </p:blipFill>
+          <p:spPr>
+            <a:xfrm flipH="1">
+              <a:off x="-1" y="0"/>
+              <a:ext cx="1428751" cy="6858000"/>
+            </a:xfrm>
+            <a:prstGeom prst="rect">
+              <a:avLst/>
+            </a:prstGeom>
+          </p:spPr>
+        </p:pic>
+        <p:grpSp>
+          <p:nvGrpSpPr>
+            <p:cNvPr id="7" name="Group 6">
+              <a:extLst>
+                <a:ext uri="{FF2B5EF4-FFF2-40B4-BE49-F238E27FC236}">
+                  <a16:creationId xmlns:a16="http://schemas.microsoft.com/office/drawing/2014/main" id="{AD5C1D9C-B114-FC6A-9213-7287D39EAD9F}"/>
+                </a:ext>
+              </a:extLst>
+            </p:cNvPr>
+            <p:cNvGrpSpPr/>
+            <p:nvPr/>
+          </p:nvGrpSpPr>
+          <p:grpSpPr>
+            <a:xfrm>
+              <a:off x="10649689" y="4382998"/>
+              <a:ext cx="754139" cy="1865729"/>
+              <a:chOff x="653351" y="2693558"/>
+              <a:chExt cx="754139" cy="1865729"/>
+            </a:xfrm>
+          </p:grpSpPr>
+          <p:sp>
+            <p:nvSpPr>
+              <p:cNvPr id="11" name="Graphic 15">
+                <a:extLst>
+                  <a:ext uri="{FF2B5EF4-FFF2-40B4-BE49-F238E27FC236}">
+                    <a16:creationId xmlns:a16="http://schemas.microsoft.com/office/drawing/2014/main" id="{2BC89B10-C93E-8CE5-73B3-F6049168C313}"/>
+                  </a:ext>
+                  <a:ext uri="{C183D7F6-B498-43B3-948B-1728B52AA6E4}">
+                    <adec:decorative xmlns:adec="http://schemas.microsoft.com/office/drawing/2017/decorative" val="1"/>
+                  </a:ext>
+                </a:extLst>
+              </p:cNvPr>
+              <p:cNvSpPr/>
+              <p:nvPr/>
+            </p:nvSpPr>
+            <p:spPr>
+              <a:xfrm>
+                <a:off x="1098137" y="2693558"/>
+                <a:ext cx="128016" cy="128016"/>
+              </a:xfrm>
+              <a:custGeom>
+                <a:avLst/>
+                <a:gdLst>
+                  <a:gd name="connsiteX0" fmla="*/ 63857 w 127713"/>
+                  <a:gd name="connsiteY0" fmla="*/ 18874 h 127713"/>
+                  <a:gd name="connsiteX1" fmla="*/ 108839 w 127713"/>
+                  <a:gd name="connsiteY1" fmla="*/ 63857 h 127713"/>
+                  <a:gd name="connsiteX2" fmla="*/ 63857 w 127713"/>
+                  <a:gd name="connsiteY2" fmla="*/ 108839 h 127713"/>
+                  <a:gd name="connsiteX3" fmla="*/ 18874 w 127713"/>
+                  <a:gd name="connsiteY3" fmla="*/ 63857 h 127713"/>
+                  <a:gd name="connsiteX4" fmla="*/ 63857 w 127713"/>
+                  <a:gd name="connsiteY4" fmla="*/ 18874 h 127713"/>
+                  <a:gd name="connsiteX5" fmla="*/ 63857 w 127713"/>
+                  <a:gd name="connsiteY5" fmla="*/ 0 h 127713"/>
+                  <a:gd name="connsiteX6" fmla="*/ 0 w 127713"/>
+                  <a:gd name="connsiteY6" fmla="*/ 63857 h 127713"/>
+                  <a:gd name="connsiteX7" fmla="*/ 63857 w 127713"/>
+                  <a:gd name="connsiteY7" fmla="*/ 127713 h 127713"/>
+                  <a:gd name="connsiteX8" fmla="*/ 127713 w 127713"/>
+                  <a:gd name="connsiteY8" fmla="*/ 63857 h 127713"/>
+                  <a:gd name="connsiteX9" fmla="*/ 63857 w 127713"/>
+                  <a:gd name="connsiteY9" fmla="*/ 0 h 127713"/>
+                </a:gdLst>
+                <a:ahLst/>
+                <a:cxnLst>
+                  <a:cxn ang="0">
+                    <a:pos x="connsiteX0" y="connsiteY0"/>
+                  </a:cxn>
+                  <a:cxn ang="0">
+                    <a:pos x="connsiteX1" y="connsiteY1"/>
+                  </a:cxn>
+                  <a:cxn ang="0">
+                    <a:pos x="connsiteX2" y="connsiteY2"/>
+                  </a:cxn>
+                  <a:cxn ang="0">
+                    <a:pos x="connsiteX3" y="connsiteY3"/>
+                  </a:cxn>
+                  <a:cxn ang="0">
+                    <a:pos x="connsiteX4" y="connsiteY4"/>
+                  </a:cxn>
+                  <a:cxn ang="0">
+                    <a:pos x="connsiteX5" y="connsiteY5"/>
+                  </a:cxn>
+                  <a:cxn ang="0">
+                    <a:pos x="connsiteX6" y="connsiteY6"/>
+                  </a:cxn>
+                  <a:cxn ang="0">
+                    <a:pos x="connsiteX7" y="connsiteY7"/>
+                  </a:cxn>
+                  <a:cxn ang="0">
+                    <a:pos x="connsiteX8" y="connsiteY8"/>
+                  </a:cxn>
+                  <a:cxn ang="0">
+                    <a:pos x="connsiteX9" y="connsiteY9"/>
+                  </a:cxn>
+                </a:cxnLst>
+                <a:rect l="l" t="t" r="r" b="b"/>
+                <a:pathLst>
+                  <a:path w="127713" h="127713">
+                    <a:moveTo>
+                      <a:pt x="63857" y="18874"/>
+                    </a:moveTo>
+                    <a:cubicBezTo>
+                      <a:pt x="88700" y="18874"/>
+                      <a:pt x="108839" y="39013"/>
+                      <a:pt x="108839" y="63857"/>
+                    </a:cubicBezTo>
+                    <a:cubicBezTo>
+                      <a:pt x="108839" y="88700"/>
+                      <a:pt x="88700" y="108839"/>
+                      <a:pt x="63857" y="108839"/>
+                    </a:cubicBezTo>
+                    <a:cubicBezTo>
+                      <a:pt x="39013" y="108839"/>
+                      <a:pt x="18874" y="88700"/>
+                      <a:pt x="18874" y="63857"/>
+                    </a:cubicBezTo>
+                    <a:cubicBezTo>
+                      <a:pt x="18898" y="39023"/>
+                      <a:pt x="39023" y="18898"/>
+                      <a:pt x="63857" y="18874"/>
+                    </a:cubicBezTo>
+                    <a:moveTo>
+                      <a:pt x="63857" y="0"/>
+                    </a:moveTo>
+                    <a:cubicBezTo>
+                      <a:pt x="28590" y="0"/>
+                      <a:pt x="0" y="28590"/>
+                      <a:pt x="0" y="63857"/>
+                    </a:cubicBezTo>
+                    <a:cubicBezTo>
+                      <a:pt x="0" y="99124"/>
+                      <a:pt x="28590" y="127713"/>
+                      <a:pt x="63857" y="127713"/>
+                    </a:cubicBezTo>
+                    <a:cubicBezTo>
+                      <a:pt x="99124" y="127713"/>
+                      <a:pt x="127713" y="99124"/>
+                      <a:pt x="127713" y="63857"/>
+                    </a:cubicBezTo>
+                    <a:cubicBezTo>
+                      <a:pt x="127713" y="28590"/>
+                      <a:pt x="99124" y="0"/>
+                      <a:pt x="63857" y="0"/>
+                    </a:cubicBezTo>
+                    <a:close/>
+                  </a:path>
+                </a:pathLst>
+              </a:custGeom>
+              <a:solidFill>
+                <a:schemeClr val="accent4">
+                  <a:lumMod val="60000"/>
+                  <a:lumOff val="40000"/>
+                  <a:alpha val="49071"/>
+                </a:schemeClr>
+              </a:solidFill>
+              <a:ln w="610" cap="flat">
+                <a:noFill/>
+                <a:prstDash val="solid"/>
+                <a:miter/>
+              </a:ln>
+            </p:spPr>
+            <p:txBody>
+              <a:bodyPr rtlCol="0" anchor="ctr">
+                <a:noAutofit/>
+              </a:bodyPr>
+              <a:lstStyle/>
+              <a:p>
+                <a:endParaRPr lang="en-US" dirty="0"/>
+              </a:p>
+            </p:txBody>
+          </p:sp>
+          <p:sp>
+            <p:nvSpPr>
+              <p:cNvPr id="12" name="Graphic 12">
+                <a:extLst>
+                  <a:ext uri="{FF2B5EF4-FFF2-40B4-BE49-F238E27FC236}">
+                    <a16:creationId xmlns:a16="http://schemas.microsoft.com/office/drawing/2014/main" id="{39DB2AA2-9661-AC91-932D-2F1BEC47BD84}"/>
+                  </a:ext>
+                  <a:ext uri="{C183D7F6-B498-43B3-948B-1728B52AA6E4}">
+                    <adec:decorative xmlns:adec="http://schemas.microsoft.com/office/drawing/2017/decorative" val="1"/>
+                  </a:ext>
+                </a:extLst>
+              </p:cNvPr>
+              <p:cNvSpPr/>
+              <p:nvPr/>
+            </p:nvSpPr>
+            <p:spPr>
+              <a:xfrm>
+                <a:off x="1306906" y="3837599"/>
+                <a:ext cx="100584" cy="100584"/>
+              </a:xfrm>
+              <a:custGeom>
+                <a:avLst/>
+                <a:gdLst>
+                  <a:gd name="connsiteX0" fmla="*/ 91138 w 91138"/>
+                  <a:gd name="connsiteY0" fmla="*/ 45569 h 91138"/>
+                  <a:gd name="connsiteX1" fmla="*/ 45569 w 91138"/>
+                  <a:gd name="connsiteY1" fmla="*/ 91138 h 91138"/>
+                  <a:gd name="connsiteX2" fmla="*/ 0 w 91138"/>
+                  <a:gd name="connsiteY2" fmla="*/ 45569 h 91138"/>
+                  <a:gd name="connsiteX3" fmla="*/ 45569 w 91138"/>
+                  <a:gd name="connsiteY3" fmla="*/ 0 h 91138"/>
+                  <a:gd name="connsiteX4" fmla="*/ 91138 w 91138"/>
+                  <a:gd name="connsiteY4" fmla="*/ 45569 h 91138"/>
+                </a:gdLst>
+                <a:ahLst/>
+                <a:cxnLst>
+                  <a:cxn ang="0">
+                    <a:pos x="connsiteX0" y="connsiteY0"/>
+                  </a:cxn>
+                  <a:cxn ang="0">
+                    <a:pos x="connsiteX1" y="connsiteY1"/>
+                  </a:cxn>
+                  <a:cxn ang="0">
+                    <a:pos x="connsiteX2" y="connsiteY2"/>
+                  </a:cxn>
+                  <a:cxn ang="0">
+                    <a:pos x="connsiteX3" y="connsiteY3"/>
+                  </a:cxn>
+                  <a:cxn ang="0">
+                    <a:pos x="connsiteX4" y="connsiteY4"/>
+                  </a:cxn>
+                </a:cxnLst>
+                <a:rect l="l" t="t" r="r" b="b"/>
+                <a:pathLst>
+                  <a:path w="91138" h="91138">
+                    <a:moveTo>
+                      <a:pt x="91138" y="45569"/>
+                    </a:moveTo>
+                    <a:cubicBezTo>
+                      <a:pt x="91138" y="70736"/>
+                      <a:pt x="70736" y="91138"/>
+                      <a:pt x="45569" y="91138"/>
+                    </a:cubicBezTo>
+                    <a:cubicBezTo>
+                      <a:pt x="20402" y="91138"/>
+                      <a:pt x="0" y="70736"/>
+                      <a:pt x="0" y="45569"/>
+                    </a:cubicBezTo>
+                    <a:cubicBezTo>
+                      <a:pt x="0" y="20402"/>
+                      <a:pt x="20402" y="0"/>
+                      <a:pt x="45569" y="0"/>
+                    </a:cubicBezTo>
+                    <a:cubicBezTo>
+                      <a:pt x="70736" y="0"/>
+                      <a:pt x="91138" y="20402"/>
+                      <a:pt x="91138" y="45569"/>
+                    </a:cubicBezTo>
+                    <a:close/>
+                  </a:path>
+                </a:pathLst>
+              </a:custGeom>
+              <a:solidFill>
+                <a:schemeClr val="accent4">
+                  <a:lumMod val="60000"/>
+                  <a:lumOff val="40000"/>
+                  <a:alpha val="49071"/>
+                </a:schemeClr>
+              </a:solidFill>
+              <a:ln w="422" cap="flat">
+                <a:noFill/>
+                <a:prstDash val="solid"/>
+                <a:miter/>
+              </a:ln>
+            </p:spPr>
+            <p:txBody>
+              <a:bodyPr rtlCol="0" anchor="ctr">
+                <a:noAutofit/>
+              </a:bodyPr>
+              <a:lstStyle/>
+              <a:p>
+                <a:endParaRPr lang="en-US" dirty="0"/>
+              </a:p>
+            </p:txBody>
+          </p:sp>
+          <p:sp>
+            <p:nvSpPr>
+              <p:cNvPr id="13" name="Graphic 12">
+                <a:extLst>
+                  <a:ext uri="{FF2B5EF4-FFF2-40B4-BE49-F238E27FC236}">
+                    <a16:creationId xmlns:a16="http://schemas.microsoft.com/office/drawing/2014/main" id="{86C9AC9B-3792-E880-03FE-D46FB046AB63}"/>
+                  </a:ext>
+                  <a:ext uri="{C183D7F6-B498-43B3-948B-1728B52AA6E4}">
+                    <adec:decorative xmlns:adec="http://schemas.microsoft.com/office/drawing/2017/decorative" val="1"/>
+                  </a:ext>
+                </a:extLst>
+              </p:cNvPr>
+              <p:cNvSpPr/>
+              <p:nvPr/>
+            </p:nvSpPr>
+            <p:spPr>
+              <a:xfrm>
+                <a:off x="653351" y="4521502"/>
+                <a:ext cx="45719" cy="37785"/>
+              </a:xfrm>
+              <a:custGeom>
+                <a:avLst/>
+                <a:gdLst>
+                  <a:gd name="connsiteX0" fmla="*/ 91138 w 91138"/>
+                  <a:gd name="connsiteY0" fmla="*/ 45569 h 91138"/>
+                  <a:gd name="connsiteX1" fmla="*/ 45569 w 91138"/>
+                  <a:gd name="connsiteY1" fmla="*/ 91138 h 91138"/>
+                  <a:gd name="connsiteX2" fmla="*/ 0 w 91138"/>
+                  <a:gd name="connsiteY2" fmla="*/ 45569 h 91138"/>
+                  <a:gd name="connsiteX3" fmla="*/ 45569 w 91138"/>
+                  <a:gd name="connsiteY3" fmla="*/ 0 h 91138"/>
+                  <a:gd name="connsiteX4" fmla="*/ 91138 w 91138"/>
+                  <a:gd name="connsiteY4" fmla="*/ 45569 h 91138"/>
+                </a:gdLst>
+                <a:ahLst/>
+                <a:cxnLst>
+                  <a:cxn ang="0">
+                    <a:pos x="connsiteX0" y="connsiteY0"/>
+                  </a:cxn>
+                  <a:cxn ang="0">
+                    <a:pos x="connsiteX1" y="connsiteY1"/>
+                  </a:cxn>
+                  <a:cxn ang="0">
+                    <a:pos x="connsiteX2" y="connsiteY2"/>
+                  </a:cxn>
+                  <a:cxn ang="0">
+                    <a:pos x="connsiteX3" y="connsiteY3"/>
+                  </a:cxn>
+                  <a:cxn ang="0">
+                    <a:pos x="connsiteX4" y="connsiteY4"/>
+                  </a:cxn>
+                </a:cxnLst>
+                <a:rect l="l" t="t" r="r" b="b"/>
+                <a:pathLst>
+                  <a:path w="91138" h="91138">
+                    <a:moveTo>
+                      <a:pt x="91138" y="45569"/>
+                    </a:moveTo>
+                    <a:cubicBezTo>
+                      <a:pt x="91138" y="70736"/>
+                      <a:pt x="70736" y="91138"/>
+                      <a:pt x="45569" y="91138"/>
+                    </a:cubicBezTo>
+                    <a:cubicBezTo>
+                      <a:pt x="20402" y="91138"/>
+                      <a:pt x="0" y="70736"/>
+                      <a:pt x="0" y="45569"/>
+                    </a:cubicBezTo>
+                    <a:cubicBezTo>
+                      <a:pt x="0" y="20402"/>
+                      <a:pt x="20402" y="0"/>
+                      <a:pt x="45569" y="0"/>
+                    </a:cubicBezTo>
+                    <a:cubicBezTo>
+                      <a:pt x="70736" y="0"/>
+                      <a:pt x="91138" y="20402"/>
+                      <a:pt x="91138" y="45569"/>
+                    </a:cubicBezTo>
+                    <a:close/>
+                  </a:path>
+                </a:pathLst>
+              </a:custGeom>
+              <a:solidFill>
+                <a:schemeClr val="accent4">
+                  <a:lumMod val="60000"/>
+                  <a:lumOff val="40000"/>
+                  <a:alpha val="49071"/>
+                </a:schemeClr>
+              </a:solidFill>
+              <a:ln w="422" cap="flat">
+                <a:noFill/>
+                <a:prstDash val="solid"/>
+                <a:miter/>
+              </a:ln>
+            </p:spPr>
+            <p:txBody>
+              <a:bodyPr rtlCol="0" anchor="ctr">
+                <a:noAutofit/>
+              </a:bodyPr>
+              <a:lstStyle/>
+              <a:p>
+                <a:endParaRPr lang="en-US" dirty="0"/>
+              </a:p>
+            </p:txBody>
+          </p:sp>
+        </p:grpSp>
+        <p:grpSp>
+          <p:nvGrpSpPr>
+            <p:cNvPr id="8" name="Group 7">
+              <a:extLst>
+                <a:ext uri="{FF2B5EF4-FFF2-40B4-BE49-F238E27FC236}">
+                  <a16:creationId xmlns:a16="http://schemas.microsoft.com/office/drawing/2014/main" id="{1142A133-65D6-D958-C0CD-E8D45B9BD7BB}"/>
+                </a:ext>
+              </a:extLst>
+            </p:cNvPr>
+            <p:cNvGrpSpPr/>
+            <p:nvPr/>
+          </p:nvGrpSpPr>
+          <p:grpSpPr>
+            <a:xfrm>
+              <a:off x="1870859" y="869908"/>
+              <a:ext cx="431603" cy="412684"/>
+              <a:chOff x="1870859" y="869908"/>
+              <a:chExt cx="431603" cy="412684"/>
+            </a:xfrm>
+          </p:grpSpPr>
+          <p:sp>
+            <p:nvSpPr>
+              <p:cNvPr id="9" name="Graphic 15">
+                <a:extLst>
+                  <a:ext uri="{FF2B5EF4-FFF2-40B4-BE49-F238E27FC236}">
+                    <a16:creationId xmlns:a16="http://schemas.microsoft.com/office/drawing/2014/main" id="{A746B023-387D-4EAC-052B-60F131E6E707}"/>
+                  </a:ext>
+                  <a:ext uri="{C183D7F6-B498-43B3-948B-1728B52AA6E4}">
+                    <adec:decorative xmlns:adec="http://schemas.microsoft.com/office/drawing/2017/decorative" val="1"/>
+                  </a:ext>
+                </a:extLst>
+              </p:cNvPr>
+              <p:cNvSpPr/>
+              <p:nvPr/>
+            </p:nvSpPr>
+            <p:spPr>
+              <a:xfrm rot="10800000">
+                <a:off x="1870859" y="1154576"/>
+                <a:ext cx="128016" cy="128016"/>
+              </a:xfrm>
+              <a:custGeom>
+                <a:avLst/>
+                <a:gdLst>
+                  <a:gd name="connsiteX0" fmla="*/ 63857 w 127713"/>
+                  <a:gd name="connsiteY0" fmla="*/ 18874 h 127713"/>
+                  <a:gd name="connsiteX1" fmla="*/ 108839 w 127713"/>
+                  <a:gd name="connsiteY1" fmla="*/ 63857 h 127713"/>
+                  <a:gd name="connsiteX2" fmla="*/ 63857 w 127713"/>
+                  <a:gd name="connsiteY2" fmla="*/ 108839 h 127713"/>
+                  <a:gd name="connsiteX3" fmla="*/ 18874 w 127713"/>
+                  <a:gd name="connsiteY3" fmla="*/ 63857 h 127713"/>
+                  <a:gd name="connsiteX4" fmla="*/ 63857 w 127713"/>
+                  <a:gd name="connsiteY4" fmla="*/ 18874 h 127713"/>
+                  <a:gd name="connsiteX5" fmla="*/ 63857 w 127713"/>
+                  <a:gd name="connsiteY5" fmla="*/ 0 h 127713"/>
+                  <a:gd name="connsiteX6" fmla="*/ 0 w 127713"/>
+                  <a:gd name="connsiteY6" fmla="*/ 63857 h 127713"/>
+                  <a:gd name="connsiteX7" fmla="*/ 63857 w 127713"/>
+                  <a:gd name="connsiteY7" fmla="*/ 127713 h 127713"/>
+                  <a:gd name="connsiteX8" fmla="*/ 127713 w 127713"/>
+                  <a:gd name="connsiteY8" fmla="*/ 63857 h 127713"/>
+                  <a:gd name="connsiteX9" fmla="*/ 63857 w 127713"/>
+                  <a:gd name="connsiteY9" fmla="*/ 0 h 127713"/>
+                </a:gdLst>
+                <a:ahLst/>
+                <a:cxnLst>
+                  <a:cxn ang="0">
+                    <a:pos x="connsiteX0" y="connsiteY0"/>
+                  </a:cxn>
+                  <a:cxn ang="0">
+                    <a:pos x="connsiteX1" y="connsiteY1"/>
+                  </a:cxn>
+                  <a:cxn ang="0">
+                    <a:pos x="connsiteX2" y="connsiteY2"/>
+                  </a:cxn>
+                  <a:cxn ang="0">
+                    <a:pos x="connsiteX3" y="connsiteY3"/>
+                  </a:cxn>
+                  <a:cxn ang="0">
+                    <a:pos x="connsiteX4" y="connsiteY4"/>
+                  </a:cxn>
+                  <a:cxn ang="0">
+                    <a:pos x="connsiteX5" y="connsiteY5"/>
+                  </a:cxn>
+                  <a:cxn ang="0">
+                    <a:pos x="connsiteX6" y="connsiteY6"/>
+                  </a:cxn>
+                  <a:cxn ang="0">
+                    <a:pos x="connsiteX7" y="connsiteY7"/>
+                  </a:cxn>
+                  <a:cxn ang="0">
+                    <a:pos x="connsiteX8" y="connsiteY8"/>
+                  </a:cxn>
+                  <a:cxn ang="0">
+                    <a:pos x="connsiteX9" y="connsiteY9"/>
+                  </a:cxn>
+                </a:cxnLst>
+                <a:rect l="l" t="t" r="r" b="b"/>
+                <a:pathLst>
+                  <a:path w="127713" h="127713">
+                    <a:moveTo>
+                      <a:pt x="63857" y="18874"/>
+                    </a:moveTo>
+                    <a:cubicBezTo>
+                      <a:pt x="88700" y="18874"/>
+                      <a:pt x="108839" y="39013"/>
+                      <a:pt x="108839" y="63857"/>
+                    </a:cubicBezTo>
+                    <a:cubicBezTo>
+                      <a:pt x="108839" y="88700"/>
+                      <a:pt x="88700" y="108839"/>
+                      <a:pt x="63857" y="108839"/>
+                    </a:cubicBezTo>
+                    <a:cubicBezTo>
+                      <a:pt x="39013" y="108839"/>
+                      <a:pt x="18874" y="88700"/>
+                      <a:pt x="18874" y="63857"/>
+                    </a:cubicBezTo>
+                    <a:cubicBezTo>
+                      <a:pt x="18898" y="39023"/>
+                      <a:pt x="39023" y="18898"/>
+                      <a:pt x="63857" y="18874"/>
+                    </a:cubicBezTo>
+                    <a:moveTo>
+                      <a:pt x="63857" y="0"/>
+                    </a:moveTo>
+                    <a:cubicBezTo>
+                      <a:pt x="28590" y="0"/>
+                      <a:pt x="0" y="28590"/>
+                      <a:pt x="0" y="63857"/>
+                    </a:cubicBezTo>
+                    <a:cubicBezTo>
+                      <a:pt x="0" y="99124"/>
+                      <a:pt x="28590" y="127713"/>
+                      <a:pt x="63857" y="127713"/>
+                    </a:cubicBezTo>
+                    <a:cubicBezTo>
+                      <a:pt x="99124" y="127713"/>
+                      <a:pt x="127713" y="99124"/>
+                      <a:pt x="127713" y="63857"/>
+                    </a:cubicBezTo>
+                    <a:cubicBezTo>
+                      <a:pt x="127713" y="28590"/>
+                      <a:pt x="99124" y="0"/>
+                      <a:pt x="63857" y="0"/>
+                    </a:cubicBezTo>
+                    <a:close/>
+                  </a:path>
+                </a:pathLst>
+              </a:custGeom>
+              <a:solidFill>
+                <a:schemeClr val="accent4">
+                  <a:lumMod val="60000"/>
+                  <a:lumOff val="40000"/>
+                  <a:alpha val="49071"/>
+                </a:schemeClr>
+              </a:solidFill>
+              <a:ln w="610" cap="flat">
+                <a:noFill/>
+                <a:prstDash val="solid"/>
+                <a:miter/>
+              </a:ln>
+            </p:spPr>
+            <p:txBody>
+              <a:bodyPr rtlCol="0" anchor="ctr">
+                <a:noAutofit/>
+              </a:bodyPr>
+              <a:lstStyle/>
+              <a:p>
+                <a:endParaRPr lang="en-US" dirty="0"/>
+              </a:p>
+            </p:txBody>
+          </p:sp>
+          <p:sp>
+            <p:nvSpPr>
+              <p:cNvPr id="10" name="Graphic 12">
+                <a:extLst>
+                  <a:ext uri="{FF2B5EF4-FFF2-40B4-BE49-F238E27FC236}">
+                    <a16:creationId xmlns:a16="http://schemas.microsoft.com/office/drawing/2014/main" id="{20760125-21CF-A296-3EA7-3C6C0E9BCB2F}"/>
+                  </a:ext>
+                  <a:ext uri="{C183D7F6-B498-43B3-948B-1728B52AA6E4}">
+                    <adec:decorative xmlns:adec="http://schemas.microsoft.com/office/drawing/2017/decorative" val="1"/>
+                  </a:ext>
+                </a:extLst>
+              </p:cNvPr>
+              <p:cNvSpPr/>
+              <p:nvPr/>
+            </p:nvSpPr>
+            <p:spPr>
+              <a:xfrm>
+                <a:off x="2256743" y="869908"/>
+                <a:ext cx="45719" cy="37785"/>
+              </a:xfrm>
+              <a:custGeom>
+                <a:avLst/>
+                <a:gdLst>
+                  <a:gd name="connsiteX0" fmla="*/ 91138 w 91138"/>
+                  <a:gd name="connsiteY0" fmla="*/ 45569 h 91138"/>
+                  <a:gd name="connsiteX1" fmla="*/ 45569 w 91138"/>
+                  <a:gd name="connsiteY1" fmla="*/ 91138 h 91138"/>
+                  <a:gd name="connsiteX2" fmla="*/ 0 w 91138"/>
+                  <a:gd name="connsiteY2" fmla="*/ 45569 h 91138"/>
+                  <a:gd name="connsiteX3" fmla="*/ 45569 w 91138"/>
+                  <a:gd name="connsiteY3" fmla="*/ 0 h 91138"/>
+                  <a:gd name="connsiteX4" fmla="*/ 91138 w 91138"/>
+                  <a:gd name="connsiteY4" fmla="*/ 45569 h 91138"/>
+                </a:gdLst>
+                <a:ahLst/>
+                <a:cxnLst>
+                  <a:cxn ang="0">
+                    <a:pos x="connsiteX0" y="connsiteY0"/>
+                  </a:cxn>
+                  <a:cxn ang="0">
+                    <a:pos x="connsiteX1" y="connsiteY1"/>
+                  </a:cxn>
+                  <a:cxn ang="0">
+                    <a:pos x="connsiteX2" y="connsiteY2"/>
+                  </a:cxn>
+                  <a:cxn ang="0">
+                    <a:pos x="connsiteX3" y="connsiteY3"/>
+                  </a:cxn>
+                  <a:cxn ang="0">
+                    <a:pos x="connsiteX4" y="connsiteY4"/>
+                  </a:cxn>
+                </a:cxnLst>
+                <a:rect l="l" t="t" r="r" b="b"/>
+                <a:pathLst>
+                  <a:path w="91138" h="91138">
+                    <a:moveTo>
+                      <a:pt x="91138" y="45569"/>
+                    </a:moveTo>
+                    <a:cubicBezTo>
+                      <a:pt x="91138" y="70736"/>
+                      <a:pt x="70736" y="91138"/>
+                      <a:pt x="45569" y="91138"/>
+                    </a:cubicBezTo>
+                    <a:cubicBezTo>
+                      <a:pt x="20402" y="91138"/>
+                      <a:pt x="0" y="70736"/>
+                      <a:pt x="0" y="45569"/>
+                    </a:cubicBezTo>
+                    <a:cubicBezTo>
+                      <a:pt x="0" y="20402"/>
+                      <a:pt x="20402" y="0"/>
+                      <a:pt x="45569" y="0"/>
+                    </a:cubicBezTo>
+                    <a:cubicBezTo>
+                      <a:pt x="70736" y="0"/>
+                      <a:pt x="91138" y="20402"/>
+                      <a:pt x="91138" y="45569"/>
+                    </a:cubicBezTo>
+                    <a:close/>
+                  </a:path>
+                </a:pathLst>
+              </a:custGeom>
+              <a:solidFill>
+                <a:schemeClr val="accent4">
+                  <a:lumMod val="60000"/>
+                  <a:lumOff val="40000"/>
+                  <a:alpha val="49071"/>
+                </a:schemeClr>
+              </a:solidFill>
+              <a:ln w="422" cap="flat">
+                <a:noFill/>
+                <a:prstDash val="solid"/>
+                <a:miter/>
+              </a:ln>
+            </p:spPr>
+            <p:txBody>
+              <a:bodyPr rtlCol="0" anchor="ctr">
+                <a:noAutofit/>
+              </a:bodyPr>
+              <a:lstStyle/>
+              <a:p>
+                <a:endParaRPr lang="en-US" dirty="0"/>
+              </a:p>
+            </p:txBody>
+          </p:sp>
+        </p:grpSp>
+      </p:grpSp>
+      <p:cxnSp>
+        <p:nvCxnSpPr>
+          <p:cNvPr id="14" name="Straight Connector 13">
+            <a:extLst>
+              <a:ext uri="{FF2B5EF4-FFF2-40B4-BE49-F238E27FC236}">
+                <a16:creationId xmlns:a16="http://schemas.microsoft.com/office/drawing/2014/main" id="{7F851D11-41E3-33F2-CBA6-B2A9A5A2A517}"/>
+              </a:ext>
+              <a:ext uri="{C183D7F6-B498-43B3-948B-1728B52AA6E4}">
+                <adec:decorative xmlns:adec="http://schemas.microsoft.com/office/drawing/2017/decorative" val="1"/>
+              </a:ext>
+            </a:extLst>
+          </p:cNvPr>
+          <p:cNvCxnSpPr>
+            <a:cxnSpLocks/>
+          </p:cNvCxnSpPr>
+          <p:nvPr userDrawn="1"/>
+        </p:nvCxnSpPr>
+        <p:spPr>
+          <a:xfrm>
+            <a:off x="2369139" y="2002443"/>
+            <a:ext cx="8873530" cy="0"/>
+          </a:xfrm>
+          <a:prstGeom prst="line">
+            <a:avLst/>
+          </a:prstGeom>
+          <a:ln w="25400">
+            <a:gradFill>
+              <a:gsLst>
+                <a:gs pos="0">
+                  <a:schemeClr val="accent4">
+                    <a:lumMod val="50000"/>
+                  </a:schemeClr>
+                </a:gs>
+                <a:gs pos="100000">
+                  <a:schemeClr val="accent6"/>
+                </a:gs>
+              </a:gsLst>
+              <a:lin ang="10800000" scaled="0"/>
+            </a:gradFill>
+          </a:ln>
+        </p:spPr>
+        <p:style>
+          <a:lnRef idx="1">
+            <a:schemeClr val="accent1"/>
+          </a:lnRef>
+          <a:fillRef idx="0">
+            <a:schemeClr val="accent1"/>
+          </a:fillRef>
+          <a:effectRef idx="0">
+            <a:schemeClr val="accent1"/>
+          </a:effectRef>
+          <a:fontRef idx="minor">
+            <a:schemeClr val="tx1"/>
+          </a:fontRef>
+        </p:style>
+      </p:cxnSp>
+      <p:sp>
+        <p:nvSpPr>
+          <p:cNvPr id="2" name="Title 1">
+            <a:extLst>
+              <a:ext uri="{FF2B5EF4-FFF2-40B4-BE49-F238E27FC236}">
+                <a16:creationId xmlns:a16="http://schemas.microsoft.com/office/drawing/2014/main" id="{DF8070BB-B3B5-3A8A-2466-D661C741794F}"/>
+              </a:ext>
+            </a:extLst>
+          </p:cNvPr>
+          <p:cNvSpPr>
+            <a:spLocks noGrp="1"/>
+          </p:cNvSpPr>
+          <p:nvPr>
+            <p:ph type="title" hasCustomPrompt="1"/>
+          </p:nvPr>
+        </p:nvSpPr>
+        <p:spPr>
+          <a:xfrm>
+            <a:off x="2399620" y="162560"/>
+            <a:ext cx="8843050" cy="1616904"/>
+          </a:xfrm>
+        </p:spPr>
+        <p:txBody>
+          <a:bodyPr lIns="0" anchor="b">
+            <a:noAutofit/>
+          </a:bodyPr>
+          <a:lstStyle>
+            <a:lvl1pPr algn="l">
+              <a:defRPr sz="3200" cap="all" spc="0" baseline="0">
+                <a:solidFill>
+                  <a:schemeClr val="accent3">
+                    <a:lumMod val="75000"/>
+                  </a:schemeClr>
+                </a:solidFill>
+              </a:defRPr>
+            </a:lvl1pPr>
+          </a:lstStyle>
+          <a:p>
+            <a:r>
+              <a:rPr lang="en-US" dirty="0"/>
+              <a:t>Click to add title</a:t>
+            </a:r>
+          </a:p>
+        </p:txBody>
+      </p:sp>
+      <p:sp>
+        <p:nvSpPr>
+          <p:cNvPr id="5" name="Content Placeholder 4">
+            <a:extLst>
+              <a:ext uri="{FF2B5EF4-FFF2-40B4-BE49-F238E27FC236}">
+                <a16:creationId xmlns:a16="http://schemas.microsoft.com/office/drawing/2014/main" id="{A2003C5A-BF21-DE87-0ED1-3E2D0F32B5D8}"/>
+              </a:ext>
+            </a:extLst>
+          </p:cNvPr>
+          <p:cNvSpPr>
+            <a:spLocks noGrp="1"/>
+          </p:cNvSpPr>
+          <p:nvPr>
+            <p:ph sz="quarter" idx="35" hasCustomPrompt="1"/>
+          </p:nvPr>
+        </p:nvSpPr>
+        <p:spPr>
+          <a:xfrm>
+            <a:off x="2373002" y="2474811"/>
+            <a:ext cx="4015098" cy="3528397"/>
+          </a:xfrm>
+        </p:spPr>
+        <p:txBody>
+          <a:bodyPr/>
+          <a:lstStyle>
+            <a:lvl1pPr marL="0" indent="0">
+              <a:lnSpc>
+                <a:spcPct val="120000"/>
+              </a:lnSpc>
+              <a:spcBef>
+                <a:spcPts val="1000"/>
+              </a:spcBef>
+              <a:buClr>
+                <a:schemeClr val="accent6"/>
+              </a:buClr>
+              <a:buFont typeface="Arial" panose="020B0604020202020204" pitchFamily="34" charset="0"/>
+              <a:buNone/>
+              <a:defRPr sz="1800" spc="0" baseline="0">
+                <a:solidFill>
+                  <a:schemeClr val="bg1"/>
+                </a:solidFill>
+                <a:latin typeface="+mn-lt"/>
+              </a:defRPr>
+            </a:lvl1pPr>
+            <a:lvl2pPr marL="283464" indent="-285750">
+              <a:lnSpc>
+                <a:spcPct val="120000"/>
+              </a:lnSpc>
+              <a:spcBef>
+                <a:spcPts val="1000"/>
+              </a:spcBef>
+              <a:buClr>
+                <a:schemeClr val="accent3">
+                  <a:lumMod val="75000"/>
+                </a:schemeClr>
+              </a:buClr>
+              <a:buFont typeface="Arial" panose="020B0604020202020204" pitchFamily="34" charset="0"/>
+              <a:buChar char="•"/>
+              <a:defRPr sz="1800" spc="0">
+                <a:solidFill>
+                  <a:schemeClr val="bg1"/>
+                </a:solidFill>
+              </a:defRPr>
+            </a:lvl2pPr>
+            <a:lvl3pPr marL="566928" indent="-285750">
+              <a:lnSpc>
+                <a:spcPct val="120000"/>
+              </a:lnSpc>
+              <a:spcBef>
+                <a:spcPts val="1000"/>
+              </a:spcBef>
+              <a:buClr>
+                <a:schemeClr val="accent3">
+                  <a:lumMod val="75000"/>
+                </a:schemeClr>
+              </a:buClr>
+              <a:buFont typeface="Arial" panose="020B0604020202020204" pitchFamily="34" charset="0"/>
+              <a:buChar char="•"/>
+              <a:defRPr sz="1800" spc="0">
+                <a:solidFill>
+                  <a:schemeClr val="bg1"/>
+                </a:solidFill>
+              </a:defRPr>
+            </a:lvl3pPr>
+            <a:lvl4pPr marL="859536" indent="-285750">
+              <a:lnSpc>
+                <a:spcPct val="120000"/>
+              </a:lnSpc>
+              <a:spcBef>
+                <a:spcPts val="1000"/>
+              </a:spcBef>
+              <a:buClr>
+                <a:schemeClr val="accent3">
+                  <a:lumMod val="75000"/>
+                </a:schemeClr>
+              </a:buClr>
+              <a:buFont typeface="Arial" panose="020B0604020202020204" pitchFamily="34" charset="0"/>
+              <a:buChar char="•"/>
+              <a:defRPr sz="1800" spc="0">
+                <a:solidFill>
+                  <a:schemeClr val="bg1"/>
+                </a:solidFill>
+              </a:defRPr>
+            </a:lvl4pPr>
+          </a:lstStyle>
+          <a:p>
+            <a:pPr lvl="0"/>
+            <a:r>
+              <a:rPr lang="en-US" dirty="0"/>
+              <a:t>Click to add content</a:t>
+            </a:r>
+          </a:p>
+          <a:p>
+            <a:pPr lvl="1"/>
+            <a:r>
+              <a:rPr lang="en-US" dirty="0"/>
+              <a:t>Second level</a:t>
+            </a:r>
+          </a:p>
+          <a:p>
+            <a:pPr lvl="2"/>
+            <a:r>
+              <a:rPr lang="en-US" dirty="0"/>
+              <a:t>Third level</a:t>
+            </a:r>
+          </a:p>
+          <a:p>
+            <a:pPr lvl="3"/>
+            <a:r>
+              <a:rPr lang="en-US" dirty="0"/>
+              <a:t>Fourth level</a:t>
+            </a:r>
+          </a:p>
+        </p:txBody>
+      </p:sp>
+      <p:sp>
+        <p:nvSpPr>
+          <p:cNvPr id="21" name="Content Placeholder 4">
+            <a:extLst>
+              <a:ext uri="{FF2B5EF4-FFF2-40B4-BE49-F238E27FC236}">
+                <a16:creationId xmlns:a16="http://schemas.microsoft.com/office/drawing/2014/main" id="{D77F99A7-26FA-422E-43E9-C76B4A56E44A}"/>
+              </a:ext>
+            </a:extLst>
+          </p:cNvPr>
+          <p:cNvSpPr>
+            <a:spLocks noGrp="1"/>
+          </p:cNvSpPr>
+          <p:nvPr>
+            <p:ph sz="quarter" idx="36" hasCustomPrompt="1"/>
+          </p:nvPr>
+        </p:nvSpPr>
+        <p:spPr>
+          <a:xfrm>
+            <a:off x="6995159" y="2474811"/>
+            <a:ext cx="4227332" cy="3528397"/>
+          </a:xfrm>
+        </p:spPr>
+        <p:txBody>
+          <a:bodyPr/>
+          <a:lstStyle>
+            <a:lvl1pPr marL="0" indent="0">
+              <a:lnSpc>
+                <a:spcPct val="120000"/>
+              </a:lnSpc>
+              <a:spcBef>
+                <a:spcPts val="1000"/>
+              </a:spcBef>
+              <a:buClr>
+                <a:schemeClr val="accent6"/>
+              </a:buClr>
+              <a:buFont typeface="Arial" panose="020B0604020202020204" pitchFamily="34" charset="0"/>
+              <a:buNone/>
+              <a:defRPr sz="1800" spc="0" baseline="0">
+                <a:solidFill>
+                  <a:schemeClr val="bg1"/>
+                </a:solidFill>
+                <a:latin typeface="+mn-lt"/>
+              </a:defRPr>
+            </a:lvl1pPr>
+            <a:lvl2pPr marL="283464" indent="-285750">
+              <a:lnSpc>
+                <a:spcPct val="120000"/>
+              </a:lnSpc>
+              <a:spcBef>
+                <a:spcPts val="1000"/>
+              </a:spcBef>
+              <a:buClr>
+                <a:schemeClr val="accent3">
+                  <a:lumMod val="75000"/>
+                </a:schemeClr>
+              </a:buClr>
+              <a:buFont typeface="Arial" panose="020B0604020202020204" pitchFamily="34" charset="0"/>
+              <a:buChar char="•"/>
+              <a:defRPr sz="1800" spc="0">
+                <a:solidFill>
+                  <a:schemeClr val="bg1"/>
+                </a:solidFill>
+              </a:defRPr>
+            </a:lvl2pPr>
+            <a:lvl3pPr marL="566928" indent="-285750">
+              <a:lnSpc>
+                <a:spcPct val="120000"/>
+              </a:lnSpc>
+              <a:spcBef>
+                <a:spcPts val="1000"/>
+              </a:spcBef>
+              <a:buClr>
+                <a:schemeClr val="accent3">
+                  <a:lumMod val="75000"/>
+                </a:schemeClr>
+              </a:buClr>
+              <a:buFont typeface="Arial" panose="020B0604020202020204" pitchFamily="34" charset="0"/>
+              <a:buChar char="•"/>
+              <a:defRPr sz="1800" spc="0">
+                <a:solidFill>
+                  <a:schemeClr val="bg1"/>
+                </a:solidFill>
+              </a:defRPr>
+            </a:lvl3pPr>
+            <a:lvl4pPr marL="859536" indent="-285750">
+              <a:lnSpc>
+                <a:spcPct val="120000"/>
+              </a:lnSpc>
+              <a:spcBef>
+                <a:spcPts val="1000"/>
+              </a:spcBef>
+              <a:buClr>
+                <a:schemeClr val="accent3">
+                  <a:lumMod val="75000"/>
+                </a:schemeClr>
+              </a:buClr>
+              <a:buFont typeface="Arial" panose="020B0604020202020204" pitchFamily="34" charset="0"/>
+              <a:buChar char="•"/>
+              <a:defRPr sz="1800" spc="0">
+                <a:solidFill>
+                  <a:schemeClr val="bg1"/>
+                </a:solidFill>
+              </a:defRPr>
+            </a:lvl4pPr>
+          </a:lstStyle>
+          <a:p>
+            <a:pPr lvl="0"/>
+            <a:r>
+              <a:rPr lang="en-US" dirty="0"/>
+              <a:t>Click to add content</a:t>
+            </a:r>
+          </a:p>
+          <a:p>
+            <a:pPr lvl="1"/>
+            <a:r>
+              <a:rPr lang="en-US" dirty="0"/>
+              <a:t>Second level</a:t>
+            </a:r>
+          </a:p>
+          <a:p>
+            <a:pPr lvl="2"/>
+            <a:r>
+              <a:rPr lang="en-US" dirty="0"/>
+              <a:t>Third level</a:t>
+            </a:r>
+          </a:p>
+          <a:p>
+            <a:pPr lvl="3"/>
+            <a:r>
+              <a:rPr lang="en-US" dirty="0"/>
+              <a:t>Fourth level</a:t>
+            </a:r>
+          </a:p>
+        </p:txBody>
+      </p:sp>
+      <p:sp>
+        <p:nvSpPr>
+          <p:cNvPr id="15" name="Footer Placeholder 4">
+            <a:extLst>
+              <a:ext uri="{FF2B5EF4-FFF2-40B4-BE49-F238E27FC236}">
+                <a16:creationId xmlns:a16="http://schemas.microsoft.com/office/drawing/2014/main" id="{B02A6961-FD29-3446-6A70-B0D4EE5D14C5}"/>
+              </a:ext>
+            </a:extLst>
+          </p:cNvPr>
+          <p:cNvSpPr>
+            <a:spLocks noGrp="1"/>
+          </p:cNvSpPr>
+          <p:nvPr>
+            <p:ph type="ftr" sz="quarter" idx="11"/>
+          </p:nvPr>
+        </p:nvSpPr>
+        <p:spPr>
+          <a:xfrm>
+            <a:off x="336405" y="6237287"/>
+            <a:ext cx="4114800" cy="365125"/>
+          </a:xfrm>
+        </p:spPr>
+        <p:txBody>
+          <a:bodyPr>
+            <a:noAutofit/>
+          </a:bodyPr>
+          <a:lstStyle>
+            <a:lvl1pPr algn="l">
+              <a:defRPr sz="1200" spc="0">
+                <a:solidFill>
+                  <a:schemeClr val="bg1"/>
+                </a:solidFill>
+              </a:defRPr>
+            </a:lvl1pPr>
+          </a:lstStyle>
+          <a:p>
+            <a:r>
+              <a:rPr lang="en-US" dirty="0"/>
+              <a:t>Presentation title</a:t>
+            </a:r>
+          </a:p>
+        </p:txBody>
+      </p:sp>
+      <p:sp>
+        <p:nvSpPr>
+          <p:cNvPr id="16" name="Slide Number Placeholder 5">
+            <a:extLst>
+              <a:ext uri="{FF2B5EF4-FFF2-40B4-BE49-F238E27FC236}">
+                <a16:creationId xmlns:a16="http://schemas.microsoft.com/office/drawing/2014/main" id="{68477A85-1CCD-1BF5-8FF0-11B80AE2F6FC}"/>
+              </a:ext>
+            </a:extLst>
+          </p:cNvPr>
+          <p:cNvSpPr>
+            <a:spLocks noGrp="1"/>
+          </p:cNvSpPr>
+          <p:nvPr>
+            <p:ph type="sldNum" sz="quarter" idx="12"/>
+          </p:nvPr>
+        </p:nvSpPr>
+        <p:spPr>
+          <a:xfrm>
+            <a:off x="9140971" y="6226198"/>
+            <a:ext cx="2743200" cy="365125"/>
+          </a:xfrm>
+        </p:spPr>
+        <p:txBody>
+          <a:bodyPr>
+            <a:noAutofit/>
+          </a:bodyPr>
+          <a:lstStyle>
+            <a:lvl1pPr>
+              <a:defRPr sz="1200">
+                <a:solidFill>
+                  <a:schemeClr val="bg1"/>
+                </a:solidFill>
+              </a:defRPr>
+            </a:lvl1pPr>
+          </a:lstStyle>
+          <a:p>
+            <a:fld id="{FE024F78-56A6-7740-B68D-8D4D026EDF3F}" type="slidenum">
+              <a:rPr lang="en-US" smtClean="0"/>
+              <a:pPr/>
+              <a:t>‹#›</a:t>
+            </a:fld>
+            <a:endParaRPr lang="en-US" dirty="0"/>
+          </a:p>
+        </p:txBody>
+      </p:sp>
+    </p:spTree>
+    <p:extLst>
+      <p:ext uri="{BB962C8B-B14F-4D97-AF65-F5344CB8AC3E}">
+        <p14:creationId xmlns:p14="http://schemas.microsoft.com/office/powerpoint/2010/main" val="3651039301"/>
+      </p:ext>
+    </p:extLst>
+  </p:cSld>
+  <p:clrMapOvr>
+    <a:masterClrMapping/>
+  </p:clrMapOvr>
+  <p:extLst>
+    <p:ext uri="{DCECCB84-F9BA-43D5-87BE-67443E8EF086}">
+      <p15:sldGuideLst xmlns:p15="http://schemas.microsoft.com/office/powerpoint/2012/main">
+        <p15:guide id="1" orient="horz" pos="2160">
+          <p15:clr>
+            <a:srgbClr val="FBAE40"/>
+          </p15:clr>
+        </p15:guide>
+        <p15:guide id="2" pos="3840">
+          <p15:clr>
+            <a:srgbClr val="FBAE40"/>
+          </p15:clr>
+        </p15:guide>
+      </p15:sldGuideLst>
+    </p:ext>
+  </p:extLst>
+</p:sldLayout>
+</file>
+
+<file path=ppt/slideLayouts/slideLayout6.xml><?xml version="1.0" encoding="utf-8"?>
+<p:sldLayout xmlns:a="http://schemas.openxmlformats.org/drawingml/2006/main" xmlns:r="http://schemas.openxmlformats.org/officeDocument/2006/relationships" xmlns:p="http://schemas.openxmlformats.org/presentationml/2006/main" preserve="1" userDrawn="1">
+  <p:cSld name="Tilte and Content 1 ">
+    <p:bg>
+      <p:bgPr>
+        <a:gradFill>
+          <a:gsLst>
+            <a:gs pos="81987">
+              <a:schemeClr val="accent6">
+                <a:lumMod val="50000"/>
+              </a:schemeClr>
+            </a:gs>
+            <a:gs pos="35040">
+              <a:srgbClr val="020B11"/>
+            </a:gs>
+            <a:gs pos="11979">
+              <a:schemeClr val="accent4">
+                <a:lumMod val="50000"/>
+              </a:schemeClr>
+            </a:gs>
+            <a:gs pos="0">
+              <a:schemeClr val="accent4"/>
+            </a:gs>
+            <a:gs pos="99000">
+              <a:schemeClr val="tx2"/>
+            </a:gs>
+          </a:gsLst>
+          <a:lin ang="5400000" scaled="1"/>
+        </a:gradFill>
+        <a:effectLst/>
+      </p:bgPr>
+    </p:bg>
+    <p:spTree>
+      <p:nvGrpSpPr>
+        <p:cNvPr id="1" name=""/>
+        <p:cNvGrpSpPr/>
+        <p:nvPr/>
+      </p:nvGrpSpPr>
+      <p:grpSpPr>
+        <a:xfrm>
+          <a:off x="0" y="0"/>
+          <a:ext cx="0" cy="0"/>
+          <a:chOff x="0" y="0"/>
+          <a:chExt cx="0" cy="0"/>
+        </a:xfrm>
+      </p:grpSpPr>
+      <p:grpSp>
+        <p:nvGrpSpPr>
+          <p:cNvPr id="3" name="Group 2">
+            <a:extLst>
+              <a:ext uri="{FF2B5EF4-FFF2-40B4-BE49-F238E27FC236}">
+                <a16:creationId xmlns:a16="http://schemas.microsoft.com/office/drawing/2014/main" id="{289F5C3D-E9E6-75E0-BF7D-799B5CFE5ED0}"/>
+              </a:ext>
+              <a:ext uri="{C183D7F6-B498-43B3-948B-1728B52AA6E4}">
+                <adec:decorative xmlns:adec="http://schemas.microsoft.com/office/drawing/2017/decorative" val="1"/>
+              </a:ext>
+            </a:extLst>
+          </p:cNvPr>
+          <p:cNvGrpSpPr/>
+          <p:nvPr userDrawn="1"/>
+        </p:nvGrpSpPr>
+        <p:grpSpPr>
+          <a:xfrm>
+            <a:off x="4575462" y="4137"/>
+            <a:ext cx="7616537" cy="6853863"/>
+            <a:chOff x="4575462" y="4137"/>
+            <a:chExt cx="7616537" cy="6853863"/>
+          </a:xfrm>
+        </p:grpSpPr>
+        <p:grpSp>
+          <p:nvGrpSpPr>
+            <p:cNvPr id="16" name="Group 15">
+              <a:extLst>
+                <a:ext uri="{FF2B5EF4-FFF2-40B4-BE49-F238E27FC236}">
+                  <a16:creationId xmlns:a16="http://schemas.microsoft.com/office/drawing/2014/main" id="{CDE1D2C2-40C4-6B80-E8C6-B4CE94C23037}"/>
+                </a:ext>
+              </a:extLst>
+            </p:cNvPr>
+            <p:cNvGrpSpPr/>
+            <p:nvPr/>
+          </p:nvGrpSpPr>
+          <p:grpSpPr>
+            <a:xfrm>
+              <a:off x="4575462" y="691665"/>
+              <a:ext cx="364018" cy="857035"/>
+              <a:chOff x="468157" y="1144246"/>
+              <a:chExt cx="364018" cy="857035"/>
+            </a:xfrm>
+          </p:grpSpPr>
+          <p:sp>
+            <p:nvSpPr>
+              <p:cNvPr id="27" name="Oval 26">
+                <a:extLst>
+                  <a:ext uri="{FF2B5EF4-FFF2-40B4-BE49-F238E27FC236}">
+                    <a16:creationId xmlns:a16="http://schemas.microsoft.com/office/drawing/2014/main" id="{7C904D88-E1BE-F1FA-D405-F55DA966DA84}"/>
+                  </a:ext>
+                  <a:ext uri="{C183D7F6-B498-43B3-948B-1728B52AA6E4}">
+                    <adec:decorative xmlns:adec="http://schemas.microsoft.com/office/drawing/2017/decorative" val="1"/>
+                  </a:ext>
+                </a:extLst>
+              </p:cNvPr>
+              <p:cNvSpPr/>
+              <p:nvPr/>
+            </p:nvSpPr>
+            <p:spPr>
+              <a:xfrm>
+                <a:off x="705405" y="1144246"/>
+                <a:ext cx="126770" cy="126770"/>
+              </a:xfrm>
+              <a:prstGeom prst="ellipse">
+                <a:avLst/>
+              </a:prstGeom>
+              <a:noFill/>
+              <a:ln>
+                <a:solidFill>
+                  <a:schemeClr val="accent4">
+                    <a:lumMod val="60000"/>
+                    <a:lumOff val="40000"/>
+                    <a:alpha val="49000"/>
+                  </a:schemeClr>
+                </a:solidFill>
+              </a:ln>
+            </p:spPr>
+            <p:style>
+              <a:lnRef idx="2">
+                <a:schemeClr val="accent1">
+                  <a:shade val="50000"/>
+                </a:schemeClr>
+              </a:lnRef>
+              <a:fillRef idx="1">
+                <a:schemeClr val="accent1"/>
+              </a:fillRef>
+              <a:effectRef idx="0">
+                <a:schemeClr val="accent1"/>
+              </a:effectRef>
+              <a:fontRef idx="minor">
+                <a:schemeClr val="lt1"/>
+              </a:fontRef>
+            </p:style>
+            <p:txBody>
+              <a:bodyPr rtlCol="0" anchor="ctr">
+                <a:noAutofit/>
+              </a:bodyPr>
+              <a:lstStyle/>
+              <a:p>
+                <a:pPr algn="ctr"/>
+                <a:endParaRPr lang="en-US" dirty="0"/>
+              </a:p>
+            </p:txBody>
+          </p:sp>
+          <p:sp>
+            <p:nvSpPr>
+              <p:cNvPr id="18" name="Graphic 12">
+                <a:extLst>
+                  <a:ext uri="{FF2B5EF4-FFF2-40B4-BE49-F238E27FC236}">
+                    <a16:creationId xmlns:a16="http://schemas.microsoft.com/office/drawing/2014/main" id="{1D8F0816-C429-D32E-058B-33405874DFA7}"/>
+                  </a:ext>
+                  <a:ext uri="{C183D7F6-B498-43B3-948B-1728B52AA6E4}">
+                    <adec:decorative xmlns:adec="http://schemas.microsoft.com/office/drawing/2017/decorative" val="1"/>
+                  </a:ext>
+                </a:extLst>
+              </p:cNvPr>
+              <p:cNvSpPr/>
+              <p:nvPr/>
+            </p:nvSpPr>
+            <p:spPr>
+              <a:xfrm>
+                <a:off x="468157" y="1963496"/>
+                <a:ext cx="45719" cy="37785"/>
+              </a:xfrm>
+              <a:custGeom>
+                <a:avLst/>
+                <a:gdLst>
+                  <a:gd name="connsiteX0" fmla="*/ 91138 w 91138"/>
+                  <a:gd name="connsiteY0" fmla="*/ 45569 h 91138"/>
+                  <a:gd name="connsiteX1" fmla="*/ 45569 w 91138"/>
+                  <a:gd name="connsiteY1" fmla="*/ 91138 h 91138"/>
+                  <a:gd name="connsiteX2" fmla="*/ 0 w 91138"/>
+                  <a:gd name="connsiteY2" fmla="*/ 45569 h 91138"/>
+                  <a:gd name="connsiteX3" fmla="*/ 45569 w 91138"/>
+                  <a:gd name="connsiteY3" fmla="*/ 0 h 91138"/>
+                  <a:gd name="connsiteX4" fmla="*/ 91138 w 91138"/>
+                  <a:gd name="connsiteY4" fmla="*/ 45569 h 91138"/>
+                </a:gdLst>
+                <a:ahLst/>
+                <a:cxnLst>
+                  <a:cxn ang="0">
+                    <a:pos x="connsiteX0" y="connsiteY0"/>
+                  </a:cxn>
+                  <a:cxn ang="0">
+                    <a:pos x="connsiteX1" y="connsiteY1"/>
+                  </a:cxn>
+                  <a:cxn ang="0">
+                    <a:pos x="connsiteX2" y="connsiteY2"/>
+                  </a:cxn>
+                  <a:cxn ang="0">
+                    <a:pos x="connsiteX3" y="connsiteY3"/>
+                  </a:cxn>
+                  <a:cxn ang="0">
+                    <a:pos x="connsiteX4" y="connsiteY4"/>
+                  </a:cxn>
+                </a:cxnLst>
+                <a:rect l="l" t="t" r="r" b="b"/>
+                <a:pathLst>
+                  <a:path w="91138" h="91138">
+                    <a:moveTo>
+                      <a:pt x="91138" y="45569"/>
+                    </a:moveTo>
+                    <a:cubicBezTo>
+                      <a:pt x="91138" y="70736"/>
+                      <a:pt x="70736" y="91138"/>
+                      <a:pt x="45569" y="91138"/>
+                    </a:cubicBezTo>
+                    <a:cubicBezTo>
+                      <a:pt x="20402" y="91138"/>
+                      <a:pt x="0" y="70736"/>
+                      <a:pt x="0" y="45569"/>
+                    </a:cubicBezTo>
+                    <a:cubicBezTo>
+                      <a:pt x="0" y="20402"/>
+                      <a:pt x="20402" y="0"/>
+                      <a:pt x="45569" y="0"/>
+                    </a:cubicBezTo>
+                    <a:cubicBezTo>
+                      <a:pt x="70736" y="0"/>
+                      <a:pt x="91138" y="20402"/>
+                      <a:pt x="91138" y="45569"/>
+                    </a:cubicBezTo>
+                    <a:close/>
+                  </a:path>
+                </a:pathLst>
+              </a:custGeom>
+              <a:solidFill>
+                <a:schemeClr val="accent4">
+                  <a:lumMod val="60000"/>
+                  <a:lumOff val="40000"/>
+                  <a:alpha val="49071"/>
+                </a:schemeClr>
+              </a:solidFill>
+              <a:ln w="422" cap="flat">
+                <a:noFill/>
+                <a:prstDash val="solid"/>
+                <a:miter/>
+              </a:ln>
+            </p:spPr>
+            <p:txBody>
+              <a:bodyPr rtlCol="0" anchor="ctr">
+                <a:noAutofit/>
+              </a:bodyPr>
+              <a:lstStyle/>
+              <a:p>
+                <a:endParaRPr lang="en-US" dirty="0"/>
+              </a:p>
+            </p:txBody>
+          </p:sp>
+        </p:grpSp>
+        <p:pic>
+          <p:nvPicPr>
+            <p:cNvPr id="4" name="Content Placeholder 14">
+              <a:extLst>
+                <a:ext uri="{FF2B5EF4-FFF2-40B4-BE49-F238E27FC236}">
+                  <a16:creationId xmlns:a16="http://schemas.microsoft.com/office/drawing/2014/main" id="{14AC0A97-7D79-3DBE-FB53-A9EBFD806E06}"/>
+                </a:ext>
+                <a:ext uri="{C183D7F6-B498-43B3-948B-1728B52AA6E4}">
+                  <adec:decorative xmlns:adec="http://schemas.microsoft.com/office/drawing/2017/decorative" val="1"/>
+                </a:ext>
+              </a:extLst>
+            </p:cNvPr>
+            <p:cNvPicPr>
+              <a:picLocks noChangeAspect="1"/>
+            </p:cNvPicPr>
+            <p:nvPr userDrawn="1"/>
+          </p:nvPicPr>
+          <p:blipFill rotWithShape="1">
+            <a:blip r:embed="rId2" cstate="screen">
+              <a:extLst>
+                <a:ext uri="{28A0092B-C50C-407E-A947-70E740481C1C}">
+                  <a14:useLocalDpi xmlns:a14="http://schemas.microsoft.com/office/drawing/2010/main"/>
+                </a:ext>
+              </a:extLst>
+            </a:blip>
+            <a:srcRect/>
+            <a:stretch/>
+          </p:blipFill>
+          <p:spPr>
+            <a:xfrm>
+              <a:off x="6542796" y="4137"/>
+              <a:ext cx="5649203" cy="6853863"/>
+            </a:xfrm>
+            <a:prstGeom prst="rect">
+              <a:avLst/>
+            </a:prstGeom>
+          </p:spPr>
+        </p:pic>
+      </p:grpSp>
+      <p:sp>
+        <p:nvSpPr>
+          <p:cNvPr id="2" name="Title 1">
+            <a:extLst>
+              <a:ext uri="{FF2B5EF4-FFF2-40B4-BE49-F238E27FC236}">
+                <a16:creationId xmlns:a16="http://schemas.microsoft.com/office/drawing/2014/main" id="{51E83F98-B388-2594-BACB-E3DB652C97D5}"/>
+              </a:ext>
+            </a:extLst>
+          </p:cNvPr>
+          <p:cNvSpPr>
+            <a:spLocks noGrp="1"/>
+          </p:cNvSpPr>
+          <p:nvPr>
+            <p:ph type="title" hasCustomPrompt="1"/>
+          </p:nvPr>
+        </p:nvSpPr>
+        <p:spPr>
+          <a:xfrm>
+            <a:off x="835831" y="173735"/>
+            <a:ext cx="4409514" cy="2203704"/>
+          </a:xfrm>
+        </p:spPr>
+        <p:txBody>
+          <a:bodyPr anchor="b">
+            <a:noAutofit/>
+          </a:bodyPr>
+          <a:lstStyle>
+            <a:lvl1pPr>
+              <a:defRPr sz="3200" cap="all" baseline="0">
+                <a:solidFill>
+                  <a:schemeClr val="accent3"/>
+                </a:solidFill>
+              </a:defRPr>
+            </a:lvl1pPr>
+          </a:lstStyle>
+          <a:p>
+            <a:r>
+              <a:rPr lang="en-US" dirty="0"/>
+              <a:t>Click to add title</a:t>
+            </a:r>
+          </a:p>
+        </p:txBody>
+      </p:sp>
+      <p:sp>
+        <p:nvSpPr>
+          <p:cNvPr id="7" name="Content Placeholder 6">
+            <a:extLst>
+              <a:ext uri="{FF2B5EF4-FFF2-40B4-BE49-F238E27FC236}">
+                <a16:creationId xmlns:a16="http://schemas.microsoft.com/office/drawing/2014/main" id="{0D9D0F3E-69D8-49F3-5D7A-71FDC4E3EEE3}"/>
+              </a:ext>
+            </a:extLst>
+          </p:cNvPr>
+          <p:cNvSpPr>
+            <a:spLocks noGrp="1"/>
+          </p:cNvSpPr>
+          <p:nvPr>
+            <p:ph sz="quarter" idx="14" hasCustomPrompt="1"/>
+          </p:nvPr>
+        </p:nvSpPr>
+        <p:spPr>
+          <a:xfrm>
+            <a:off x="831850" y="3079119"/>
+            <a:ext cx="4413250" cy="2752725"/>
+          </a:xfrm>
+        </p:spPr>
+        <p:txBody>
+          <a:bodyPr/>
+          <a:lstStyle>
+            <a:lvl1pPr>
+              <a:lnSpc>
+                <a:spcPct val="120000"/>
+              </a:lnSpc>
+              <a:spcBef>
+                <a:spcPts val="1000"/>
+              </a:spcBef>
+              <a:defRPr sz="1800">
+                <a:solidFill>
+                  <a:schemeClr val="bg1"/>
+                </a:solidFill>
+                <a:latin typeface="+mn-lt"/>
+              </a:defRPr>
+            </a:lvl1pPr>
+            <a:lvl2pPr>
+              <a:lnSpc>
+                <a:spcPct val="120000"/>
+              </a:lnSpc>
+              <a:spcBef>
+                <a:spcPts val="1000"/>
+              </a:spcBef>
+              <a:buClr>
+                <a:schemeClr val="accent3"/>
+              </a:buClr>
+              <a:defRPr sz="1600">
+                <a:solidFill>
+                  <a:schemeClr val="bg1"/>
+                </a:solidFill>
+                <a:latin typeface="+mn-lt"/>
+              </a:defRPr>
+            </a:lvl2pPr>
+            <a:lvl3pPr>
+              <a:lnSpc>
+                <a:spcPct val="120000"/>
+              </a:lnSpc>
+              <a:spcBef>
+                <a:spcPts val="1000"/>
+              </a:spcBef>
+              <a:buClr>
+                <a:schemeClr val="accent3"/>
+              </a:buClr>
+              <a:defRPr sz="1400">
+                <a:solidFill>
+                  <a:schemeClr val="bg1"/>
+                </a:solidFill>
+                <a:latin typeface="+mn-lt"/>
+              </a:defRPr>
+            </a:lvl3pPr>
+            <a:lvl4pPr>
+              <a:lnSpc>
+                <a:spcPct val="120000"/>
+              </a:lnSpc>
+              <a:spcBef>
+                <a:spcPts val="1000"/>
+              </a:spcBef>
+              <a:buClr>
+                <a:schemeClr val="accent3"/>
+              </a:buClr>
+              <a:defRPr sz="1200">
+                <a:solidFill>
+                  <a:schemeClr val="bg1"/>
+                </a:solidFill>
+                <a:latin typeface="+mn-lt"/>
+              </a:defRPr>
+            </a:lvl4pPr>
+            <a:lvl5pPr>
+              <a:lnSpc>
+                <a:spcPct val="120000"/>
+              </a:lnSpc>
+              <a:spcBef>
+                <a:spcPts val="1000"/>
+              </a:spcBef>
+              <a:buClr>
+                <a:schemeClr val="accent3"/>
+              </a:buClr>
+              <a:defRPr sz="1200">
+                <a:solidFill>
+                  <a:schemeClr val="bg1"/>
+                </a:solidFill>
+                <a:latin typeface="+mn-lt"/>
+              </a:defRPr>
+            </a:lvl5pPr>
+          </a:lstStyle>
+          <a:p>
+            <a:pPr lvl="0"/>
+            <a:r>
+              <a:rPr lang="en-US" dirty="0"/>
+              <a:t>Click to add content</a:t>
+            </a:r>
+          </a:p>
+          <a:p>
+            <a:pPr lvl="1"/>
+            <a:r>
+              <a:rPr lang="en-US" dirty="0"/>
+              <a:t>Second level</a:t>
+            </a:r>
+          </a:p>
+          <a:p>
+            <a:pPr lvl="2"/>
+            <a:r>
+              <a:rPr lang="en-US" dirty="0"/>
+              <a:t>Third level</a:t>
+            </a:r>
+          </a:p>
+          <a:p>
+            <a:pPr lvl="3"/>
+            <a:r>
+              <a:rPr lang="en-US" dirty="0"/>
+              <a:t>Fourth level</a:t>
+            </a:r>
+          </a:p>
+          <a:p>
+            <a:pPr lvl="4"/>
+            <a:r>
+              <a:rPr lang="en-US" dirty="0"/>
+              <a:t>Fifth level</a:t>
+            </a:r>
+          </a:p>
+        </p:txBody>
+      </p:sp>
+      <p:cxnSp>
+        <p:nvCxnSpPr>
+          <p:cNvPr id="6" name="Straight Connector 5">
+            <a:extLst>
+              <a:ext uri="{FF2B5EF4-FFF2-40B4-BE49-F238E27FC236}">
+                <a16:creationId xmlns:a16="http://schemas.microsoft.com/office/drawing/2014/main" id="{61CFC792-44F7-2497-E19D-8FB08AFF94F7}"/>
+              </a:ext>
+              <a:ext uri="{C183D7F6-B498-43B3-948B-1728B52AA6E4}">
+                <adec:decorative xmlns:adec="http://schemas.microsoft.com/office/drawing/2017/decorative" val="1"/>
+              </a:ext>
+            </a:extLst>
+          </p:cNvPr>
+          <p:cNvCxnSpPr>
+            <a:cxnSpLocks/>
+          </p:cNvCxnSpPr>
+          <p:nvPr userDrawn="1"/>
+        </p:nvCxnSpPr>
+        <p:spPr>
+          <a:xfrm>
+            <a:off x="835831" y="2679192"/>
+            <a:ext cx="4101929" cy="0"/>
+          </a:xfrm>
+          <a:prstGeom prst="line">
+            <a:avLst/>
+          </a:prstGeom>
+          <a:ln w="25400">
+            <a:gradFill>
+              <a:gsLst>
+                <a:gs pos="0">
+                  <a:schemeClr val="accent4">
+                    <a:lumMod val="50000"/>
+                  </a:schemeClr>
+                </a:gs>
+                <a:gs pos="100000">
+                  <a:schemeClr val="accent6"/>
+                </a:gs>
+              </a:gsLst>
+              <a:lin ang="10800000" scaled="0"/>
+            </a:gradFill>
+          </a:ln>
+        </p:spPr>
+        <p:style>
+          <a:lnRef idx="1">
+            <a:schemeClr val="accent1"/>
+          </a:lnRef>
+          <a:fillRef idx="0">
+            <a:schemeClr val="accent1"/>
+          </a:fillRef>
+          <a:effectRef idx="0">
+            <a:schemeClr val="accent1"/>
+          </a:effectRef>
+          <a:fontRef idx="minor">
+            <a:schemeClr val="tx1"/>
+          </a:fontRef>
+        </p:style>
+      </p:cxnSp>
+    </p:spTree>
+    <p:extLst>
+      <p:ext uri="{BB962C8B-B14F-4D97-AF65-F5344CB8AC3E}">
+        <p14:creationId xmlns:p14="http://schemas.microsoft.com/office/powerpoint/2010/main" val="2968843757"/>
+      </p:ext>
+    </p:extLst>
+  </p:cSld>
+  <p:clrMapOvr>
+    <a:masterClrMapping/>
+  </p:clrMapOvr>
+  <p:extLst>
+    <p:ext uri="{DCECCB84-F9BA-43D5-87BE-67443E8EF086}">
+      <p15:sldGuideLst xmlns:p15="http://schemas.microsoft.com/office/powerpoint/2012/main">
+        <p15:guide id="1" orient="horz" pos="2160">
+          <p15:clr>
+            <a:srgbClr val="FBAE40"/>
+          </p15:clr>
+        </p15:guide>
+        <p15:guide id="2" pos="3840">
+          <p15:clr>
+            <a:srgbClr val="FBAE40"/>
+          </p15:clr>
+        </p15:guide>
+      </p15:sldGuideLst>
+    </p:ext>
+  </p:extLst>
+</p:sldLayout>
+</file>
+
 <file path=ppt/slideMasters/slideMaster1.xml><?xml version="1.0" encoding="utf-8"?>
 <p:sldMaster xmlns:a="http://schemas.openxmlformats.org/drawingml/2006/main" xmlns:r="http://schemas.openxmlformats.org/officeDocument/2006/relationships" xmlns:p="http://schemas.openxmlformats.org/presentationml/2006/main">
   <p:cSld>
@@ -2906,6 +4787,8 @@
     <p:sldLayoutId id="2147483669" r:id="rId2"/>
     <p:sldLayoutId id="2147483680" r:id="rId3"/>
     <p:sldLayoutId id="2147483676" r:id="rId4"/>
+    <p:sldLayoutId id="2147483681" r:id="rId5"/>
+    <p:sldLayoutId id="2147483682" r:id="rId6"/>
   </p:sldLayoutIdLst>
   <p:hf hdr="0" ftr="0" dt="0"/>
   <p:txStyles>
@@ -3995,15 +5878,6 @@
 </file>
 
 <file path=customXml/item1.xml><?xml version="1.0" encoding="utf-8"?>
-<?mso-contentType ?>
-<FormTemplates xmlns="http://schemas.microsoft.com/sharepoint/v3/contenttype/forms">
-  <Display>DocumentLibraryForm</Display>
-  <Edit>DocumentLibraryForm</Edit>
-  <New>DocumentLibraryForm</New>
-</FormTemplates>
-</file>
-
-<file path=customXml/item2.xml><?xml version="1.0" encoding="utf-8"?>
 <p:properties xmlns:p="http://schemas.microsoft.com/office/2006/metadata/properties" xmlns:xsi="http://www.w3.org/2001/XMLSchema-instance" xmlns:pc="http://schemas.microsoft.com/office/infopath/2007/PartnerControls">
   <documentManagement>
     <_ip_UnifiedCompliancePolicyUIAction xmlns="http://schemas.microsoft.com/sharepoint/v3" xsi:nil="true"/>
@@ -4021,6 +5895,15 @@
     <MediaServiceKeyPoints xmlns="71af3243-3dd4-4a8d-8c0d-dd76da1f02a5" xsi:nil="true"/>
   </documentManagement>
 </p:properties>
+</file>
+
+<file path=customXml/item2.xml><?xml version="1.0" encoding="utf-8"?>
+<?mso-contentType ?>
+<FormTemplates xmlns="http://schemas.microsoft.com/sharepoint/v3/contenttype/forms">
+  <Display>DocumentLibraryForm</Display>
+  <Edit>DocumentLibraryForm</Edit>
+  <New>DocumentLibraryForm</New>
+</FormTemplates>
 </file>
 
 <file path=customXml/item3.xml><?xml version="1.0" encoding="utf-8"?>
@@ -4336,14 +6219,6 @@
 </file>
 
 <file path=customXml/itemProps1.xml><?xml version="1.0" encoding="utf-8"?>
-<ds:datastoreItem xmlns:ds="http://schemas.openxmlformats.org/officeDocument/2006/customXml" ds:itemID="{A78D9019-7CE1-4B77-8F5D-67F6576598CB}">
-  <ds:schemaRefs>
-    <ds:schemaRef ds:uri="http://schemas.microsoft.com/sharepoint/v3/contenttype/forms"/>
-  </ds:schemaRefs>
-</ds:datastoreItem>
-</file>
-
-<file path=customXml/itemProps2.xml><?xml version="1.0" encoding="utf-8"?>
 <ds:datastoreItem xmlns:ds="http://schemas.openxmlformats.org/officeDocument/2006/customXml" ds:itemID="{E42E6C21-1752-4E06-9FE3-208D45ADB668}">
   <ds:schemaRefs>
     <ds:schemaRef ds:uri="http://schemas.microsoft.com/office/2006/metadata/properties"/>
@@ -4351,6 +6226,14 @@
     <ds:schemaRef ds:uri="http://schemas.microsoft.com/sharepoint/v3"/>
     <ds:schemaRef ds:uri="71af3243-3dd4-4a8d-8c0d-dd76da1f02a5"/>
     <ds:schemaRef ds:uri="230e9df3-be65-4c73-a93b-d1236ebd677e"/>
+  </ds:schemaRefs>
+</ds:datastoreItem>
+</file>
+
+<file path=customXml/itemProps2.xml><?xml version="1.0" encoding="utf-8"?>
+<ds:datastoreItem xmlns:ds="http://schemas.openxmlformats.org/officeDocument/2006/customXml" ds:itemID="{A78D9019-7CE1-4B77-8F5D-67F6576598CB}">
+  <ds:schemaRefs>
+    <ds:schemaRef ds:uri="http://schemas.microsoft.com/sharepoint/v3/contenttype/forms"/>
   </ds:schemaRefs>
 </ds:datastoreItem>
 </file>

</xml_diff>

<commit_message>
feat:add SlideBuilder and LayoutManager
</commit_message>
<xml_diff>
--- a/templates/MasterTemplate.pptx
+++ b/templates/MasterTemplate.pptx
@@ -229,7 +229,7 @@
           <a:p>
             <a:fld id="{258BFD57-AB0A-470B-A7AF-56DFE7B5174A}" type="datetimeFigureOut">
               <a:rPr lang="en-US" smtClean="0"/>
-              <a:t>10/12/24</a:t>
+              <a:t>10/14/24</a:t>
             </a:fld>
             <a:endParaRPr lang="en-US" dirty="0"/>
           </a:p>
@@ -406,7 +406,7 @@
           <a:p>
             <a:fld id="{D4B3339F-6CEA-4641-BE08-40DAFD6FCF25}" type="datetimeFigureOut">
               <a:rPr lang="en-US" smtClean="0"/>
-              <a:t>10/12/24</a:t>
+              <a:t>10/14/24</a:t>
             </a:fld>
             <a:endParaRPr lang="en-US" dirty="0"/>
           </a:p>
@@ -1822,7 +1822,7 @@
 
 <file path=ppt/slideLayouts/slideLayout4.xml><?xml version="1.0" encoding="utf-8"?>
 <p:sldLayout xmlns:a="http://schemas.openxmlformats.org/drawingml/2006/main" xmlns:r="http://schemas.openxmlformats.org/officeDocument/2006/relationships" xmlns:p="http://schemas.openxmlformats.org/presentationml/2006/main" preserve="1" userDrawn="1">
-  <p:cSld name="Title and 2 Column">
+  <p:cSld name="Title, Content, and Picture">
     <p:bg>
       <p:bgPr>
         <a:gradFill>
@@ -5878,35 +5878,6 @@
 </file>
 
 <file path=customXml/item1.xml><?xml version="1.0" encoding="utf-8"?>
-<p:properties xmlns:p="http://schemas.microsoft.com/office/2006/metadata/properties" xmlns:xsi="http://www.w3.org/2001/XMLSchema-instance" xmlns:pc="http://schemas.microsoft.com/office/infopath/2007/PartnerControls">
-  <documentManagement>
-    <_ip_UnifiedCompliancePolicyUIAction xmlns="http://schemas.microsoft.com/sharepoint/v3" xsi:nil="true"/>
-    <Image xmlns="71af3243-3dd4-4a8d-8c0d-dd76da1f02a5">
-      <Url xsi:nil="true"/>
-      <Description xsi:nil="true"/>
-    </Image>
-    <Status xmlns="71af3243-3dd4-4a8d-8c0d-dd76da1f02a5">Not started</Status>
-    <Background xmlns="71af3243-3dd4-4a8d-8c0d-dd76da1f02a5">false</Background>
-    <_ip_UnifiedCompliancePolicyProperties xmlns="http://schemas.microsoft.com/sharepoint/v3" xsi:nil="true"/>
-    <ImageTagsTaxHTField xmlns="71af3243-3dd4-4a8d-8c0d-dd76da1f02a5">
-      <Terms xmlns="http://schemas.microsoft.com/office/infopath/2007/PartnerControls"/>
-    </ImageTagsTaxHTField>
-    <TaxCatchAll xmlns="230e9df3-be65-4c73-a93b-d1236ebd677e" xsi:nil="true"/>
-    <MediaServiceKeyPoints xmlns="71af3243-3dd4-4a8d-8c0d-dd76da1f02a5" xsi:nil="true"/>
-  </documentManagement>
-</p:properties>
-</file>
-
-<file path=customXml/item2.xml><?xml version="1.0" encoding="utf-8"?>
-<?mso-contentType ?>
-<FormTemplates xmlns="http://schemas.microsoft.com/sharepoint/v3/contenttype/forms">
-  <Display>DocumentLibraryForm</Display>
-  <Edit>DocumentLibraryForm</Edit>
-  <New>DocumentLibraryForm</New>
-</FormTemplates>
-</file>
-
-<file path=customXml/item3.xml><?xml version="1.0" encoding="utf-8"?>
 <ct:contentTypeSchema xmlns:ct="http://schemas.microsoft.com/office/2006/metadata/contentType" xmlns:ma="http://schemas.microsoft.com/office/2006/metadata/properties/metaAttributes" ct:_="" ma:_="" ma:contentTypeName="Document" ma:contentTypeID="0x01010079F111ED35F8CC479449609E8A0923A6" ma:contentTypeVersion="28" ma:contentTypeDescription="Create a new document." ma:contentTypeScope="" ma:versionID="60f5a4f2d2b0abadcf532d48ebf9cb71">
   <xsd:schema xmlns:xsd="http://www.w3.org/2001/XMLSchema" xmlns:xs="http://www.w3.org/2001/XMLSchema" xmlns:p="http://schemas.microsoft.com/office/2006/metadata/properties" xmlns:ns1="http://schemas.microsoft.com/sharepoint/v3" xmlns:ns2="71af3243-3dd4-4a8d-8c0d-dd76da1f02a5" xmlns:ns3="16c05727-aa75-4e4a-9b5f-8a80a1165891" xmlns:ns4="230e9df3-be65-4c73-a93b-d1236ebd677e" targetNamespace="http://schemas.microsoft.com/office/2006/metadata/properties" ma:root="true" ma:fieldsID="7dd78129e6a1811f84807ad11c651531" ns1:_="" ns2:_="" ns3:_="" ns4:_="">
     <xsd:import namespace="http://schemas.microsoft.com/sharepoint/v3"/>
@@ -6218,27 +6189,36 @@
 </ct:contentTypeSchema>
 </file>
 
-<file path=customXml/itemProps1.xml><?xml version="1.0" encoding="utf-8"?>
-<ds:datastoreItem xmlns:ds="http://schemas.openxmlformats.org/officeDocument/2006/customXml" ds:itemID="{E42E6C21-1752-4E06-9FE3-208D45ADB668}">
-  <ds:schemaRefs>
-    <ds:schemaRef ds:uri="http://schemas.microsoft.com/office/2006/metadata/properties"/>
-    <ds:schemaRef ds:uri="http://schemas.microsoft.com/office/infopath/2007/PartnerControls"/>
-    <ds:schemaRef ds:uri="http://schemas.microsoft.com/sharepoint/v3"/>
-    <ds:schemaRef ds:uri="71af3243-3dd4-4a8d-8c0d-dd76da1f02a5"/>
-    <ds:schemaRef ds:uri="230e9df3-be65-4c73-a93b-d1236ebd677e"/>
-  </ds:schemaRefs>
-</ds:datastoreItem>
+<file path=customXml/item2.xml><?xml version="1.0" encoding="utf-8"?>
+<?mso-contentType ?>
+<FormTemplates xmlns="http://schemas.microsoft.com/sharepoint/v3/contenttype/forms">
+  <Display>DocumentLibraryForm</Display>
+  <Edit>DocumentLibraryForm</Edit>
+  <New>DocumentLibraryForm</New>
+</FormTemplates>
 </file>
 
-<file path=customXml/itemProps2.xml><?xml version="1.0" encoding="utf-8"?>
-<ds:datastoreItem xmlns:ds="http://schemas.openxmlformats.org/officeDocument/2006/customXml" ds:itemID="{A78D9019-7CE1-4B77-8F5D-67F6576598CB}">
-  <ds:schemaRefs>
-    <ds:schemaRef ds:uri="http://schemas.microsoft.com/sharepoint/v3/contenttype/forms"/>
-  </ds:schemaRefs>
-</ds:datastoreItem>
+<file path=customXml/item3.xml><?xml version="1.0" encoding="utf-8"?>
+<p:properties xmlns:p="http://schemas.microsoft.com/office/2006/metadata/properties" xmlns:xsi="http://www.w3.org/2001/XMLSchema-instance" xmlns:pc="http://schemas.microsoft.com/office/infopath/2007/PartnerControls">
+  <documentManagement>
+    <_ip_UnifiedCompliancePolicyUIAction xmlns="http://schemas.microsoft.com/sharepoint/v3" xsi:nil="true"/>
+    <Image xmlns="71af3243-3dd4-4a8d-8c0d-dd76da1f02a5">
+      <Url xsi:nil="true"/>
+      <Description xsi:nil="true"/>
+    </Image>
+    <Status xmlns="71af3243-3dd4-4a8d-8c0d-dd76da1f02a5">Not started</Status>
+    <Background xmlns="71af3243-3dd4-4a8d-8c0d-dd76da1f02a5">false</Background>
+    <_ip_UnifiedCompliancePolicyProperties xmlns="http://schemas.microsoft.com/sharepoint/v3" xsi:nil="true"/>
+    <ImageTagsTaxHTField xmlns="71af3243-3dd4-4a8d-8c0d-dd76da1f02a5">
+      <Terms xmlns="http://schemas.microsoft.com/office/infopath/2007/PartnerControls"/>
+    </ImageTagsTaxHTField>
+    <TaxCatchAll xmlns="230e9df3-be65-4c73-a93b-d1236ebd677e" xsi:nil="true"/>
+    <MediaServiceKeyPoints xmlns="71af3243-3dd4-4a8d-8c0d-dd76da1f02a5" xsi:nil="true"/>
+  </documentManagement>
+</p:properties>
 </file>
 
-<file path=customXml/itemProps3.xml><?xml version="1.0" encoding="utf-8"?>
+<file path=customXml/itemProps1.xml><?xml version="1.0" encoding="utf-8"?>
 <ds:datastoreItem xmlns:ds="http://schemas.openxmlformats.org/officeDocument/2006/customXml" ds:itemID="{AF6E7B4D-FB62-47B7-AAA7-0DEC9938DB8A}">
   <ds:schemaRefs>
     <ds:schemaRef ds:uri="http://schemas.microsoft.com/office/2006/metadata/contentType"/>
@@ -6259,6 +6239,26 @@
 </ds:datastoreItem>
 </file>
 
+<file path=customXml/itemProps2.xml><?xml version="1.0" encoding="utf-8"?>
+<ds:datastoreItem xmlns:ds="http://schemas.openxmlformats.org/officeDocument/2006/customXml" ds:itemID="{A78D9019-7CE1-4B77-8F5D-67F6576598CB}">
+  <ds:schemaRefs>
+    <ds:schemaRef ds:uri="http://schemas.microsoft.com/sharepoint/v3/contenttype/forms"/>
+  </ds:schemaRefs>
+</ds:datastoreItem>
+</file>
+
+<file path=customXml/itemProps3.xml><?xml version="1.0" encoding="utf-8"?>
+<ds:datastoreItem xmlns:ds="http://schemas.openxmlformats.org/officeDocument/2006/customXml" ds:itemID="{E42E6C21-1752-4E06-9FE3-208D45ADB668}">
+  <ds:schemaRefs>
+    <ds:schemaRef ds:uri="http://schemas.microsoft.com/office/2006/metadata/properties"/>
+    <ds:schemaRef ds:uri="http://schemas.microsoft.com/office/infopath/2007/PartnerControls"/>
+    <ds:schemaRef ds:uri="http://schemas.microsoft.com/sharepoint/v3"/>
+    <ds:schemaRef ds:uri="71af3243-3dd4-4a8d-8c0d-dd76da1f02a5"/>
+    <ds:schemaRef ds:uri="230e9df3-be65-4c73-a93b-d1236ebd677e"/>
+  </ds:schemaRefs>
+</ds:datastoreItem>
+</file>
+
 <file path=docMetadata/LabelInfo.xml><?xml version="1.0" encoding="utf-8"?>
 <clbl:labelList xmlns:clbl="http://schemas.microsoft.com/office/2020/mipLabelMetadata"/>
 </file>
</xml_diff>

<commit_message>
add dynamic layout group via encodiing
</commit_message>
<xml_diff>
--- a/templates/MasterTemplate.pptx
+++ b/templates/MasterTemplate.pptx
@@ -229,7 +229,7 @@
           <a:p>
             <a:fld id="{258BFD57-AB0A-470B-A7AF-56DFE7B5174A}" type="datetimeFigureOut">
               <a:rPr lang="en-US" smtClean="0"/>
-              <a:t>10/14/24</a:t>
+              <a:t>10/23/24</a:t>
             </a:fld>
             <a:endParaRPr lang="en-US" dirty="0"/>
           </a:p>
@@ -406,7 +406,7 @@
           <a:p>
             <a:fld id="{D4B3339F-6CEA-4641-BE08-40DAFD6FCF25}" type="datetimeFigureOut">
               <a:rPr lang="en-US" smtClean="0"/>
-              <a:t>10/14/24</a:t>
+              <a:t>10/23/24</a:t>
             </a:fld>
             <a:endParaRPr lang="en-US" dirty="0"/>
           </a:p>
@@ -675,7 +675,7 @@
 
 <file path=ppt/slideLayouts/slideLayout1.xml><?xml version="1.0" encoding="utf-8"?>
 <p:sldLayout xmlns:a="http://schemas.openxmlformats.org/drawingml/2006/main" xmlns:r="http://schemas.openxmlformats.org/officeDocument/2006/relationships" xmlns:p="http://schemas.openxmlformats.org/presentationml/2006/main" preserve="1" userDrawn="1">
-  <p:cSld name="Title Only">
+  <p:cSld name="Title 0">
     <p:bg>
       <p:bgPr>
         <a:gradFill>
@@ -839,7 +839,143 @@
 
 <file path=ppt/slideLayouts/slideLayout2.xml><?xml version="1.0" encoding="utf-8"?>
 <p:sldLayout xmlns:a="http://schemas.openxmlformats.org/drawingml/2006/main" xmlns:r="http://schemas.openxmlformats.org/officeDocument/2006/relationships" xmlns:p="http://schemas.openxmlformats.org/presentationml/2006/main" preserve="1" userDrawn="1">
-  <p:cSld name="Title and Content">
+  <p:cSld name="Title 1">
+    <p:bg>
+      <p:bgRef idx="1001">
+        <a:schemeClr val="bg1"/>
+      </p:bgRef>
+    </p:bg>
+    <p:spTree>
+      <p:nvGrpSpPr>
+        <p:cNvPr id="1" name=""/>
+        <p:cNvGrpSpPr/>
+        <p:nvPr/>
+      </p:nvGrpSpPr>
+      <p:grpSpPr>
+        <a:xfrm>
+          <a:off x="0" y="0"/>
+          <a:ext cx="0" cy="0"/>
+          <a:chOff x="0" y="0"/>
+          <a:chExt cx="0" cy="0"/>
+        </a:xfrm>
+      </p:grpSpPr>
+      <p:pic>
+        <p:nvPicPr>
+          <p:cNvPr id="6" name="Picture Placeholder 7" descr="abstract image">
+            <a:extLst>
+              <a:ext uri="{FF2B5EF4-FFF2-40B4-BE49-F238E27FC236}">
+                <a16:creationId xmlns:a16="http://schemas.microsoft.com/office/drawing/2014/main" id="{15CF15CF-DF14-67AF-A7B4-E0C282F388B4}"/>
+              </a:ext>
+            </a:extLst>
+          </p:cNvPr>
+          <p:cNvPicPr>
+            <a:picLocks noChangeAspect="1"/>
+          </p:cNvPicPr>
+          <p:nvPr userDrawn="1"/>
+        </p:nvPicPr>
+        <p:blipFill rotWithShape="1">
+          <a:blip r:embed="rId2">
+            <a:alphaModFix amt="52000"/>
+            <a:extLst>
+              <a:ext uri="{BEBA8EAE-BF5A-486C-A8C5-ECC9F3942E4B}">
+                <a14:imgProps xmlns:a14="http://schemas.microsoft.com/office/drawing/2010/main">
+                  <a14:imgLayer r:embed="rId3">
+                    <a14:imgEffect>
+                      <a14:saturation sat="0"/>
+                    </a14:imgEffect>
+                  </a14:imgLayer>
+                </a14:imgProps>
+              </a:ext>
+            </a:extLst>
+          </a:blip>
+          <a:srcRect/>
+          <a:stretch/>
+        </p:blipFill>
+        <p:spPr>
+          <a:xfrm>
+            <a:off x="0" y="0"/>
+            <a:ext cx="12192000" cy="6858000"/>
+          </a:xfrm>
+          <a:prstGeom prst="rect">
+            <a:avLst/>
+          </a:prstGeom>
+        </p:spPr>
+      </p:pic>
+      <p:sp>
+        <p:nvSpPr>
+          <p:cNvPr id="2" name="Title 1">
+            <a:extLst>
+              <a:ext uri="{FF2B5EF4-FFF2-40B4-BE49-F238E27FC236}">
+                <a16:creationId xmlns:a16="http://schemas.microsoft.com/office/drawing/2014/main" id="{088D457C-4576-B9E1-B827-CECCD7D68CB3}"/>
+              </a:ext>
+            </a:extLst>
+          </p:cNvPr>
+          <p:cNvSpPr>
+            <a:spLocks noGrp="1"/>
+          </p:cNvSpPr>
+          <p:nvPr>
+            <p:ph type="title" hasCustomPrompt="1"/>
+          </p:nvPr>
+        </p:nvSpPr>
+        <p:spPr>
+          <a:xfrm>
+            <a:off x="3" y="1821180"/>
+            <a:ext cx="12191994" cy="3215641"/>
+          </a:xfrm>
+        </p:spPr>
+        <p:txBody>
+          <a:bodyPr lIns="0" rIns="0" bIns="0" anchor="ctr" anchorCtr="0">
+            <a:noAutofit/>
+          </a:bodyPr>
+          <a:lstStyle>
+            <a:lvl1pPr algn="ctr">
+              <a:defRPr sz="6000" kern="1200" cap="all" spc="300" baseline="0">
+                <a:solidFill>
+                  <a:schemeClr val="tx1"/>
+                </a:solidFill>
+              </a:defRPr>
+            </a:lvl1pPr>
+          </a:lstStyle>
+          <a:p>
+            <a:r>
+              <a:rPr lang="en-US" dirty="0"/>
+              <a:t>Click to add title</a:t>
+            </a:r>
+          </a:p>
+        </p:txBody>
+      </p:sp>
+    </p:spTree>
+    <p:extLst>
+      <p:ext uri="{BB962C8B-B14F-4D97-AF65-F5344CB8AC3E}">
+        <p14:creationId xmlns:p14="http://schemas.microsoft.com/office/powerpoint/2010/main" val="2117019654"/>
+      </p:ext>
+    </p:extLst>
+  </p:cSld>
+  <p:clrMapOvr>
+    <a:overrideClrMapping bg1="dk1" tx1="lt1" bg2="dk2" tx2="lt2" accent1="accent1" accent2="accent2" accent3="accent3" accent4="accent4" accent5="accent5" accent6="accent6" hlink="hlink" folHlink="folHlink"/>
+  </p:clrMapOvr>
+  <p:extLst>
+    <p:ext uri="{DCECCB84-F9BA-43D5-87BE-67443E8EF086}">
+      <p15:sldGuideLst xmlns:p15="http://schemas.microsoft.com/office/powerpoint/2012/main">
+        <p15:guide id="1" orient="horz" pos="2160">
+          <p15:clr>
+            <a:srgbClr val="FBAE40"/>
+          </p15:clr>
+        </p15:guide>
+        <p15:guide id="2" pos="3840">
+          <p15:clr>
+            <a:srgbClr val="FBAE40"/>
+          </p15:clr>
+        </p15:guide>
+      </p15:sldGuideLst>
+    </p:ext>
+  </p:extLst>
+</p:sldLayout>
+</file>
+
+<file path=ppt/slideLayouts/slideLayout3.xml><?xml version="1.0" encoding="utf-8"?>
+<p:sldLayout xmlns:a="http://schemas.openxmlformats.org/drawingml/2006/main" xmlns:r="http://schemas.openxmlformats.org/officeDocument/2006/relationships" xmlns:p="http://schemas.openxmlformats.org/presentationml/2006/main" preserve="1" userDrawn="1">
+  <p:cSld name="Title, Content 0">
     <p:bg>
       <p:bgPr>
         <a:gradFill>
@@ -1466,9 +1602,38 @@
 </p:sldLayout>
 </file>
 
-<file path=ppt/slideLayouts/slideLayout3.xml><?xml version="1.0" encoding="utf-8"?>
+<file path=ppt/slideLayouts/slideLayout4.xml><?xml version="1.0" encoding="utf-8"?>
 <p:sldLayout xmlns:a="http://schemas.openxmlformats.org/drawingml/2006/main" xmlns:r="http://schemas.openxmlformats.org/officeDocument/2006/relationships" xmlns:p="http://schemas.openxmlformats.org/presentationml/2006/main" preserve="1" userDrawn="1">
-  <p:cSld name="Title and Picture 1">
+  <p:cSld name="Title, Content 1 ">
+    <p:bg>
+      <p:bgPr>
+        <a:gradFill>
+          <a:gsLst>
+            <a:gs pos="81987">
+              <a:schemeClr val="accent6">
+                <a:lumMod val="50000"/>
+              </a:schemeClr>
+            </a:gs>
+            <a:gs pos="35040">
+              <a:srgbClr val="020B11"/>
+            </a:gs>
+            <a:gs pos="11979">
+              <a:schemeClr val="accent4">
+                <a:lumMod val="50000"/>
+              </a:schemeClr>
+            </a:gs>
+            <a:gs pos="0">
+              <a:schemeClr val="accent4"/>
+            </a:gs>
+            <a:gs pos="99000">
+              <a:schemeClr val="tx2"/>
+            </a:gs>
+          </a:gsLst>
+          <a:lin ang="5400000" scaled="1"/>
+        </a:gradFill>
+        <a:effectLst/>
+      </p:bgPr>
+    </p:bg>
     <p:spTree>
       <p:nvGrpSpPr>
         <p:cNvPr id="1" name=""/>
@@ -1485,10 +1650,10 @@
       </p:grpSpPr>
       <p:grpSp>
         <p:nvGrpSpPr>
-          <p:cNvPr id="6" name="Group 5">
+          <p:cNvPr id="3" name="Group 2">
             <a:extLst>
               <a:ext uri="{FF2B5EF4-FFF2-40B4-BE49-F238E27FC236}">
-                <a16:creationId xmlns:a16="http://schemas.microsoft.com/office/drawing/2014/main" id="{806F03C4-FDB1-00F5-8F67-619C72893547}"/>
+                <a16:creationId xmlns:a16="http://schemas.microsoft.com/office/drawing/2014/main" id="{289F5C3D-E9E6-75E0-BF7D-799B5CFE5ED0}"/>
               </a:ext>
               <a:ext uri="{C183D7F6-B498-43B3-948B-1728B52AA6E4}">
                 <adec:decorative xmlns:adec="http://schemas.microsoft.com/office/drawing/2017/decorative" val="1"/>
@@ -1500,18 +1665,18 @@
         </p:nvGrpSpPr>
         <p:grpSpPr>
           <a:xfrm>
-            <a:off x="4575462" y="4136"/>
-            <a:ext cx="7619947" cy="6858000"/>
-            <a:chOff x="4575462" y="4136"/>
-            <a:chExt cx="7619947" cy="6858000"/>
+            <a:off x="4575462" y="4137"/>
+            <a:ext cx="7616537" cy="6853863"/>
+            <a:chOff x="4575462" y="4137"/>
+            <a:chExt cx="7616537" cy="6853863"/>
           </a:xfrm>
         </p:grpSpPr>
         <p:grpSp>
           <p:nvGrpSpPr>
-            <p:cNvPr id="7" name="Group 6">
+            <p:cNvPr id="16" name="Group 15">
               <a:extLst>
                 <a:ext uri="{FF2B5EF4-FFF2-40B4-BE49-F238E27FC236}">
-                  <a16:creationId xmlns:a16="http://schemas.microsoft.com/office/drawing/2014/main" id="{BDE9364C-6EE9-E747-F3B5-9A5FA214C666}"/>
+                  <a16:creationId xmlns:a16="http://schemas.microsoft.com/office/drawing/2014/main" id="{CDE1D2C2-40C4-6B80-E8C6-B4CE94C23037}"/>
                 </a:ext>
               </a:extLst>
             </p:cNvPr>
@@ -1528,10 +1693,10 @@
           </p:grpSpPr>
           <p:sp>
             <p:nvSpPr>
-              <p:cNvPr id="9" name="Oval 8">
+              <p:cNvPr id="27" name="Oval 26">
                 <a:extLst>
                   <a:ext uri="{FF2B5EF4-FFF2-40B4-BE49-F238E27FC236}">
-                    <a16:creationId xmlns:a16="http://schemas.microsoft.com/office/drawing/2014/main" id="{043581CD-691C-ADD3-0896-F2E1A4E8553C}"/>
+                    <a16:creationId xmlns:a16="http://schemas.microsoft.com/office/drawing/2014/main" id="{7C904D88-E1BE-F1FA-D405-F55DA966DA84}"/>
                   </a:ext>
                   <a:ext uri="{C183D7F6-B498-43B3-948B-1728B52AA6E4}">
                     <adec:decorative xmlns:adec="http://schemas.microsoft.com/office/drawing/2017/decorative" val="1"/>
@@ -1589,10 +1754,10 @@
           </p:sp>
           <p:sp>
             <p:nvSpPr>
-              <p:cNvPr id="10" name="Graphic 12">
+              <p:cNvPr id="18" name="Graphic 12">
                 <a:extLst>
                   <a:ext uri="{FF2B5EF4-FFF2-40B4-BE49-F238E27FC236}">
-                    <a16:creationId xmlns:a16="http://schemas.microsoft.com/office/drawing/2014/main" id="{60EB671A-33C5-FB75-F27F-0FD17B37F524}"/>
+                    <a16:creationId xmlns:a16="http://schemas.microsoft.com/office/drawing/2014/main" id="{1D8F0816-C429-D32E-058B-33405874DFA7}"/>
                   </a:ext>
                   <a:ext uri="{C183D7F6-B498-43B3-948B-1728B52AA6E4}">
                     <adec:decorative xmlns:adec="http://schemas.microsoft.com/office/drawing/2017/decorative" val="1"/>
@@ -1695,10 +1860,10 @@
         </p:grpSp>
         <p:pic>
           <p:nvPicPr>
-            <p:cNvPr id="8" name="Content Placeholder 14">
+            <p:cNvPr id="4" name="Content Placeholder 14">
               <a:extLst>
                 <a:ext uri="{FF2B5EF4-FFF2-40B4-BE49-F238E27FC236}">
-                  <a16:creationId xmlns:a16="http://schemas.microsoft.com/office/drawing/2014/main" id="{CC8D74CA-9208-2D40-AB11-204A1C649127}"/>
+                  <a16:creationId xmlns:a16="http://schemas.microsoft.com/office/drawing/2014/main" id="{14AC0A97-7D79-3DBE-FB53-A9EBFD806E06}"/>
                 </a:ext>
                 <a:ext uri="{C183D7F6-B498-43B3-948B-1728B52AA6E4}">
                   <adec:decorative xmlns:adec="http://schemas.microsoft.com/office/drawing/2017/decorative" val="1"/>
@@ -1723,8 +1888,8 @@
           </p:blipFill>
           <p:spPr>
             <a:xfrm>
-              <a:off x="6542796" y="4136"/>
-              <a:ext cx="5652613" cy="6858000"/>
+              <a:off x="6542796" y="4137"/>
+              <a:ext cx="5649203" cy="6853863"/>
             </a:xfrm>
             <a:prstGeom prst="rect">
               <a:avLst/>
@@ -1734,10 +1899,10 @@
       </p:grpSp>
       <p:sp>
         <p:nvSpPr>
-          <p:cNvPr id="11" name="Title 1">
+          <p:cNvPr id="2" name="Title 1">
             <a:extLst>
               <a:ext uri="{FF2B5EF4-FFF2-40B4-BE49-F238E27FC236}">
-                <a16:creationId xmlns:a16="http://schemas.microsoft.com/office/drawing/2014/main" id="{1A99F113-D7C6-17BF-B586-3529CFF21E35}"/>
+                <a16:creationId xmlns:a16="http://schemas.microsoft.com/office/drawing/2014/main" id="{51E83F98-B388-2594-BACB-E3DB652C97D5}"/>
               </a:ext>
             </a:extLst>
           </p:cNvPr>
@@ -1750,8 +1915,8 @@
         </p:nvSpPr>
         <p:spPr>
           <a:xfrm>
-            <a:off x="741680" y="430482"/>
-            <a:ext cx="10500989" cy="778153"/>
+            <a:off x="835831" y="173735"/>
+            <a:ext cx="4409514" cy="2203704"/>
           </a:xfrm>
         </p:spPr>
         <p:txBody>
@@ -1759,12 +1924,10 @@
             <a:noAutofit/>
           </a:bodyPr>
           <a:lstStyle>
-            <a:lvl1pPr algn="l">
-              <a:defRPr sz="3200" cap="all" spc="0" baseline="0">
+            <a:lvl1pPr>
+              <a:defRPr sz="3200" cap="all" baseline="0">
                 <a:solidFill>
-                  <a:schemeClr val="accent3">
-                    <a:lumMod val="75000"/>
-                  </a:schemeClr>
+                  <a:schemeClr val="accent3"/>
                 </a:solidFill>
               </a:defRPr>
             </a:lvl1pPr>
@@ -1779,10 +1942,10 @@
       </p:sp>
       <p:sp>
         <p:nvSpPr>
-          <p:cNvPr id="13" name="Picture Placeholder 12">
+          <p:cNvPr id="7" name="Content Placeholder 6">
             <a:extLst>
               <a:ext uri="{FF2B5EF4-FFF2-40B4-BE49-F238E27FC236}">
-                <a16:creationId xmlns:a16="http://schemas.microsoft.com/office/drawing/2014/main" id="{9D4661F0-027E-881F-63A9-13BFE96EB8E7}"/>
+                <a16:creationId xmlns:a16="http://schemas.microsoft.com/office/drawing/2014/main" id="{0D9D0F3E-69D8-49F3-5D7A-71FDC4E3EEE3}"/>
               </a:ext>
             </a:extLst>
           </p:cNvPr>
@@ -1790,145 +1953,144 @@
             <a:spLocks noGrp="1"/>
           </p:cNvSpPr>
           <p:nvPr>
-            <p:ph type="pic" sz="quarter" idx="10"/>
+            <p:ph sz="quarter" idx="14" hasCustomPrompt="1"/>
           </p:nvPr>
         </p:nvSpPr>
         <p:spPr>
           <a:xfrm>
-            <a:off x="1528174" y="1511300"/>
-            <a:ext cx="8928000" cy="5040000"/>
+            <a:off x="831850" y="3079119"/>
+            <a:ext cx="4413250" cy="2752725"/>
           </a:xfrm>
         </p:spPr>
         <p:txBody>
           <a:bodyPr/>
-          <a:lstStyle/>
+          <a:lstStyle>
+            <a:lvl1pPr>
+              <a:lnSpc>
+                <a:spcPct val="120000"/>
+              </a:lnSpc>
+              <a:spcBef>
+                <a:spcPts val="1000"/>
+              </a:spcBef>
+              <a:defRPr sz="1800">
+                <a:solidFill>
+                  <a:schemeClr val="bg1"/>
+                </a:solidFill>
+                <a:latin typeface="+mn-lt"/>
+              </a:defRPr>
+            </a:lvl1pPr>
+            <a:lvl2pPr>
+              <a:lnSpc>
+                <a:spcPct val="120000"/>
+              </a:lnSpc>
+              <a:spcBef>
+                <a:spcPts val="1000"/>
+              </a:spcBef>
+              <a:buClr>
+                <a:schemeClr val="accent3"/>
+              </a:buClr>
+              <a:defRPr sz="1600">
+                <a:solidFill>
+                  <a:schemeClr val="bg1"/>
+                </a:solidFill>
+                <a:latin typeface="+mn-lt"/>
+              </a:defRPr>
+            </a:lvl2pPr>
+            <a:lvl3pPr>
+              <a:lnSpc>
+                <a:spcPct val="120000"/>
+              </a:lnSpc>
+              <a:spcBef>
+                <a:spcPts val="1000"/>
+              </a:spcBef>
+              <a:buClr>
+                <a:schemeClr val="accent3"/>
+              </a:buClr>
+              <a:defRPr sz="1400">
+                <a:solidFill>
+                  <a:schemeClr val="bg1"/>
+                </a:solidFill>
+                <a:latin typeface="+mn-lt"/>
+              </a:defRPr>
+            </a:lvl3pPr>
+            <a:lvl4pPr>
+              <a:lnSpc>
+                <a:spcPct val="120000"/>
+              </a:lnSpc>
+              <a:spcBef>
+                <a:spcPts val="1000"/>
+              </a:spcBef>
+              <a:buClr>
+                <a:schemeClr val="accent3"/>
+              </a:buClr>
+              <a:defRPr sz="1200">
+                <a:solidFill>
+                  <a:schemeClr val="bg1"/>
+                </a:solidFill>
+                <a:latin typeface="+mn-lt"/>
+              </a:defRPr>
+            </a:lvl4pPr>
+            <a:lvl5pPr>
+              <a:lnSpc>
+                <a:spcPct val="120000"/>
+              </a:lnSpc>
+              <a:spcBef>
+                <a:spcPts val="1000"/>
+              </a:spcBef>
+              <a:buClr>
+                <a:schemeClr val="accent3"/>
+              </a:buClr>
+              <a:defRPr sz="1200">
+                <a:solidFill>
+                  <a:schemeClr val="bg1"/>
+                </a:solidFill>
+                <a:latin typeface="+mn-lt"/>
+              </a:defRPr>
+            </a:lvl5pPr>
+          </a:lstStyle>
           <a:p>
-            <a:endParaRPr lang="en-CN"/>
+            <a:pPr lvl="0"/>
+            <a:r>
+              <a:rPr lang="en-US" dirty="0"/>
+              <a:t>Click to add content</a:t>
+            </a:r>
           </a:p>
-        </p:txBody>
-      </p:sp>
-    </p:spTree>
-    <p:extLst>
-      <p:ext uri="{BB962C8B-B14F-4D97-AF65-F5344CB8AC3E}">
-        <p14:creationId xmlns:p14="http://schemas.microsoft.com/office/powerpoint/2010/main" val="4125312550"/>
-      </p:ext>
-    </p:extLst>
-  </p:cSld>
-  <p:clrMapOvr>
-    <a:masterClrMapping/>
-  </p:clrMapOvr>
-</p:sldLayout>
-</file>
-
-<file path=ppt/slideLayouts/slideLayout4.xml><?xml version="1.0" encoding="utf-8"?>
-<p:sldLayout xmlns:a="http://schemas.openxmlformats.org/drawingml/2006/main" xmlns:r="http://schemas.openxmlformats.org/officeDocument/2006/relationships" xmlns:p="http://schemas.openxmlformats.org/presentationml/2006/main" preserve="1" userDrawn="1">
-  <p:cSld name="Title, Content, and Picture">
-    <p:bg>
-      <p:bgPr>
-        <a:gradFill>
-          <a:gsLst>
-            <a:gs pos="100000">
-              <a:schemeClr val="tx2"/>
-            </a:gs>
-            <a:gs pos="81000">
-              <a:schemeClr val="accent6"/>
-            </a:gs>
-            <a:gs pos="31000">
-              <a:srgbClr val="02090E"/>
-            </a:gs>
-            <a:gs pos="14000">
-              <a:schemeClr val="accent4">
-                <a:lumMod val="75000"/>
-              </a:schemeClr>
-            </a:gs>
-            <a:gs pos="0">
-              <a:schemeClr val="accent4"/>
-            </a:gs>
-          </a:gsLst>
-          <a:lin ang="7800000" scaled="0"/>
-        </a:gradFill>
-        <a:effectLst/>
-      </p:bgPr>
-    </p:bg>
-    <p:spTree>
-      <p:nvGrpSpPr>
-        <p:cNvPr id="1" name=""/>
-        <p:cNvGrpSpPr/>
-        <p:nvPr/>
-      </p:nvGrpSpPr>
-      <p:grpSpPr>
-        <a:xfrm>
-          <a:off x="0" y="0"/>
-          <a:ext cx="0" cy="0"/>
-          <a:chOff x="0" y="0"/>
-          <a:chExt cx="0" cy="0"/>
-        </a:xfrm>
-      </p:grpSpPr>
-      <p:sp>
-        <p:nvSpPr>
-          <p:cNvPr id="3" name="Rectangle 2">
-            <a:extLst>
-              <a:ext uri="{FF2B5EF4-FFF2-40B4-BE49-F238E27FC236}">
-                <a16:creationId xmlns:a16="http://schemas.microsoft.com/office/drawing/2014/main" id="{B3A7247A-846A-F316-B494-69B42CBF34DD}"/>
-              </a:ext>
-              <a:ext uri="{C183D7F6-B498-43B3-948B-1728B52AA6E4}">
-                <adec:decorative xmlns:adec="http://schemas.microsoft.com/office/drawing/2017/decorative" val="1"/>
-              </a:ext>
-            </a:extLst>
-          </p:cNvPr>
-          <p:cNvSpPr/>
-          <p:nvPr userDrawn="1"/>
-        </p:nvSpPr>
-        <p:spPr>
-          <a:xfrm>
-            <a:off x="321869" y="343814"/>
-            <a:ext cx="11550701" cy="6210605"/>
-          </a:xfrm>
-          <a:prstGeom prst="rect">
-            <a:avLst/>
-          </a:prstGeom>
-          <a:solidFill>
-            <a:schemeClr val="tx1">
-              <a:alpha val="70000"/>
-            </a:schemeClr>
-          </a:solidFill>
-          <a:ln>
-            <a:noFill/>
-          </a:ln>
-        </p:spPr>
-        <p:style>
-          <a:lnRef idx="2">
-            <a:schemeClr val="accent1">
-              <a:shade val="50000"/>
-            </a:schemeClr>
-          </a:lnRef>
-          <a:fillRef idx="1">
-            <a:schemeClr val="accent1"/>
-          </a:fillRef>
-          <a:effectRef idx="0">
-            <a:schemeClr val="accent1"/>
-          </a:effectRef>
-          <a:fontRef idx="minor">
-            <a:schemeClr val="lt1"/>
-          </a:fontRef>
-        </p:style>
-        <p:txBody>
-          <a:bodyPr rtlCol="0" anchor="ctr">
-            <a:noAutofit/>
-          </a:bodyPr>
-          <a:lstStyle/>
           <a:p>
-            <a:pPr algn="ctr"/>
-            <a:endParaRPr lang="en-US" dirty="0"/>
+            <a:pPr lvl="1"/>
+            <a:r>
+              <a:rPr lang="en-US" dirty="0"/>
+              <a:t>Second level</a:t>
+            </a:r>
+          </a:p>
+          <a:p>
+            <a:pPr lvl="2"/>
+            <a:r>
+              <a:rPr lang="en-US" dirty="0"/>
+              <a:t>Third level</a:t>
+            </a:r>
+          </a:p>
+          <a:p>
+            <a:pPr lvl="3"/>
+            <a:r>
+              <a:rPr lang="en-US" dirty="0"/>
+              <a:t>Fourth level</a:t>
+            </a:r>
+          </a:p>
+          <a:p>
+            <a:pPr lvl="4"/>
+            <a:r>
+              <a:rPr lang="en-US" dirty="0"/>
+              <a:t>Fifth level</a:t>
+            </a:r>
           </a:p>
         </p:txBody>
       </p:sp>
       <p:cxnSp>
         <p:nvCxnSpPr>
-          <p:cNvPr id="4" name="Straight Connector 3">
+          <p:cNvPr id="6" name="Straight Connector 5">
             <a:extLst>
               <a:ext uri="{FF2B5EF4-FFF2-40B4-BE49-F238E27FC236}">
-                <a16:creationId xmlns:a16="http://schemas.microsoft.com/office/drawing/2014/main" id="{884B3AF6-983E-0901-0045-6CDF4E93E1BA}"/>
+                <a16:creationId xmlns:a16="http://schemas.microsoft.com/office/drawing/2014/main" id="{61CFC792-44F7-2497-E19D-8FB08AFF94F7}"/>
               </a:ext>
               <a:ext uri="{C183D7F6-B498-43B3-948B-1728B52AA6E4}">
                 <adec:decorative xmlns:adec="http://schemas.microsoft.com/office/drawing/2017/decorative" val="1"/>
@@ -1942,8 +2104,8 @@
         </p:nvCxnSpPr>
         <p:spPr>
           <a:xfrm>
-            <a:off x="807039" y="1983705"/>
-            <a:ext cx="10435630" cy="0"/>
+            <a:off x="835831" y="2679192"/>
+            <a:ext cx="4101929" cy="0"/>
           </a:xfrm>
           <a:prstGeom prst="line">
             <a:avLst/>
@@ -1979,399 +2141,58 @@
           </a:fontRef>
         </p:style>
       </p:cxnSp>
-      <p:grpSp>
-        <p:nvGrpSpPr>
-          <p:cNvPr id="9" name="Group 8">
-            <a:extLst>
-              <a:ext uri="{FF2B5EF4-FFF2-40B4-BE49-F238E27FC236}">
-                <a16:creationId xmlns:a16="http://schemas.microsoft.com/office/drawing/2014/main" id="{3C5B7647-403E-A66E-6CF4-0D3A99AA5154}"/>
-              </a:ext>
-              <a:ext uri="{C183D7F6-B498-43B3-948B-1728B52AA6E4}">
-                <adec:decorative xmlns:adec="http://schemas.microsoft.com/office/drawing/2017/decorative" val="1"/>
-              </a:ext>
-            </a:extLst>
-          </p:cNvPr>
-          <p:cNvGrpSpPr/>
-          <p:nvPr userDrawn="1"/>
-        </p:nvGrpSpPr>
-        <p:grpSpPr>
-          <a:xfrm rot="10800000" flipH="1">
-            <a:off x="10488530" y="4210019"/>
-            <a:ext cx="754139" cy="1865729"/>
-            <a:chOff x="653351" y="2693558"/>
-            <a:chExt cx="754139" cy="1865729"/>
-          </a:xfrm>
-        </p:grpSpPr>
-        <p:sp>
-          <p:nvSpPr>
-            <p:cNvPr id="10" name="Graphic 15">
-              <a:extLst>
-                <a:ext uri="{FF2B5EF4-FFF2-40B4-BE49-F238E27FC236}">
-                  <a16:creationId xmlns:a16="http://schemas.microsoft.com/office/drawing/2014/main" id="{E48E731E-FEF1-9C59-64B0-9CB6E8853912}"/>
-                </a:ext>
-                <a:ext uri="{C183D7F6-B498-43B3-948B-1728B52AA6E4}">
-                  <adec:decorative xmlns:adec="http://schemas.microsoft.com/office/drawing/2017/decorative" val="1"/>
-                </a:ext>
-              </a:extLst>
-            </p:cNvPr>
-            <p:cNvSpPr/>
-            <p:nvPr/>
-          </p:nvSpPr>
-          <p:spPr>
-            <a:xfrm>
-              <a:off x="1098137" y="2693558"/>
-              <a:ext cx="128016" cy="128016"/>
-            </a:xfrm>
-            <a:custGeom>
-              <a:avLst/>
-              <a:gdLst>
-                <a:gd name="connsiteX0" fmla="*/ 63857 w 127713"/>
-                <a:gd name="connsiteY0" fmla="*/ 18874 h 127713"/>
-                <a:gd name="connsiteX1" fmla="*/ 108839 w 127713"/>
-                <a:gd name="connsiteY1" fmla="*/ 63857 h 127713"/>
-                <a:gd name="connsiteX2" fmla="*/ 63857 w 127713"/>
-                <a:gd name="connsiteY2" fmla="*/ 108839 h 127713"/>
-                <a:gd name="connsiteX3" fmla="*/ 18874 w 127713"/>
-                <a:gd name="connsiteY3" fmla="*/ 63857 h 127713"/>
-                <a:gd name="connsiteX4" fmla="*/ 63857 w 127713"/>
-                <a:gd name="connsiteY4" fmla="*/ 18874 h 127713"/>
-                <a:gd name="connsiteX5" fmla="*/ 63857 w 127713"/>
-                <a:gd name="connsiteY5" fmla="*/ 0 h 127713"/>
-                <a:gd name="connsiteX6" fmla="*/ 0 w 127713"/>
-                <a:gd name="connsiteY6" fmla="*/ 63857 h 127713"/>
-                <a:gd name="connsiteX7" fmla="*/ 63857 w 127713"/>
-                <a:gd name="connsiteY7" fmla="*/ 127713 h 127713"/>
-                <a:gd name="connsiteX8" fmla="*/ 127713 w 127713"/>
-                <a:gd name="connsiteY8" fmla="*/ 63857 h 127713"/>
-                <a:gd name="connsiteX9" fmla="*/ 63857 w 127713"/>
-                <a:gd name="connsiteY9" fmla="*/ 0 h 127713"/>
-              </a:gdLst>
-              <a:ahLst/>
-              <a:cxnLst>
-                <a:cxn ang="0">
-                  <a:pos x="connsiteX0" y="connsiteY0"/>
-                </a:cxn>
-                <a:cxn ang="0">
-                  <a:pos x="connsiteX1" y="connsiteY1"/>
-                </a:cxn>
-                <a:cxn ang="0">
-                  <a:pos x="connsiteX2" y="connsiteY2"/>
-                </a:cxn>
-                <a:cxn ang="0">
-                  <a:pos x="connsiteX3" y="connsiteY3"/>
-                </a:cxn>
-                <a:cxn ang="0">
-                  <a:pos x="connsiteX4" y="connsiteY4"/>
-                </a:cxn>
-                <a:cxn ang="0">
-                  <a:pos x="connsiteX5" y="connsiteY5"/>
-                </a:cxn>
-                <a:cxn ang="0">
-                  <a:pos x="connsiteX6" y="connsiteY6"/>
-                </a:cxn>
-                <a:cxn ang="0">
-                  <a:pos x="connsiteX7" y="connsiteY7"/>
-                </a:cxn>
-                <a:cxn ang="0">
-                  <a:pos x="connsiteX8" y="connsiteY8"/>
-                </a:cxn>
-                <a:cxn ang="0">
-                  <a:pos x="connsiteX9" y="connsiteY9"/>
-                </a:cxn>
-              </a:cxnLst>
-              <a:rect l="l" t="t" r="r" b="b"/>
-              <a:pathLst>
-                <a:path w="127713" h="127713">
-                  <a:moveTo>
-                    <a:pt x="63857" y="18874"/>
-                  </a:moveTo>
-                  <a:cubicBezTo>
-                    <a:pt x="88700" y="18874"/>
-                    <a:pt x="108839" y="39013"/>
-                    <a:pt x="108839" y="63857"/>
-                  </a:cubicBezTo>
-                  <a:cubicBezTo>
-                    <a:pt x="108839" y="88700"/>
-                    <a:pt x="88700" y="108839"/>
-                    <a:pt x="63857" y="108839"/>
-                  </a:cubicBezTo>
-                  <a:cubicBezTo>
-                    <a:pt x="39013" y="108839"/>
-                    <a:pt x="18874" y="88700"/>
-                    <a:pt x="18874" y="63857"/>
-                  </a:cubicBezTo>
-                  <a:cubicBezTo>
-                    <a:pt x="18898" y="39023"/>
-                    <a:pt x="39023" y="18898"/>
-                    <a:pt x="63857" y="18874"/>
-                  </a:cubicBezTo>
-                  <a:moveTo>
-                    <a:pt x="63857" y="0"/>
-                  </a:moveTo>
-                  <a:cubicBezTo>
-                    <a:pt x="28590" y="0"/>
-                    <a:pt x="0" y="28590"/>
-                    <a:pt x="0" y="63857"/>
-                  </a:cubicBezTo>
-                  <a:cubicBezTo>
-                    <a:pt x="0" y="99124"/>
-                    <a:pt x="28590" y="127713"/>
-                    <a:pt x="63857" y="127713"/>
-                  </a:cubicBezTo>
-                  <a:cubicBezTo>
-                    <a:pt x="99124" y="127713"/>
-                    <a:pt x="127713" y="99124"/>
-                    <a:pt x="127713" y="63857"/>
-                  </a:cubicBezTo>
-                  <a:cubicBezTo>
-                    <a:pt x="127713" y="28590"/>
-                    <a:pt x="99124" y="0"/>
-                    <a:pt x="63857" y="0"/>
-                  </a:cubicBezTo>
-                  <a:close/>
-                </a:path>
-              </a:pathLst>
-            </a:custGeom>
-            <a:solidFill>
-              <a:schemeClr val="accent4">
-                <a:lumMod val="60000"/>
-                <a:lumOff val="40000"/>
-                <a:alpha val="49071"/>
-              </a:schemeClr>
-            </a:solidFill>
-            <a:ln w="610" cap="flat">
-              <a:noFill/>
-              <a:prstDash val="solid"/>
-              <a:miter/>
-            </a:ln>
-          </p:spPr>
-          <p:txBody>
-            <a:bodyPr rtlCol="0" anchor="ctr">
-              <a:noAutofit/>
-            </a:bodyPr>
-            <a:lstStyle/>
-            <a:p>
-              <a:endParaRPr lang="en-US" dirty="0"/>
-            </a:p>
-          </p:txBody>
-        </p:sp>
-        <p:sp>
-          <p:nvSpPr>
-            <p:cNvPr id="11" name="Graphic 12">
-              <a:extLst>
-                <a:ext uri="{FF2B5EF4-FFF2-40B4-BE49-F238E27FC236}">
-                  <a16:creationId xmlns:a16="http://schemas.microsoft.com/office/drawing/2014/main" id="{AFE83BB3-4D12-8E20-CA93-1834D7F0A434}"/>
-                </a:ext>
-                <a:ext uri="{C183D7F6-B498-43B3-948B-1728B52AA6E4}">
-                  <adec:decorative xmlns:adec="http://schemas.microsoft.com/office/drawing/2017/decorative" val="1"/>
-                </a:ext>
-              </a:extLst>
-            </p:cNvPr>
-            <p:cNvSpPr/>
-            <p:nvPr/>
-          </p:nvSpPr>
-          <p:spPr>
-            <a:xfrm>
-              <a:off x="1306906" y="3837599"/>
-              <a:ext cx="100584" cy="100584"/>
-            </a:xfrm>
-            <a:custGeom>
-              <a:avLst/>
-              <a:gdLst>
-                <a:gd name="connsiteX0" fmla="*/ 91138 w 91138"/>
-                <a:gd name="connsiteY0" fmla="*/ 45569 h 91138"/>
-                <a:gd name="connsiteX1" fmla="*/ 45569 w 91138"/>
-                <a:gd name="connsiteY1" fmla="*/ 91138 h 91138"/>
-                <a:gd name="connsiteX2" fmla="*/ 0 w 91138"/>
-                <a:gd name="connsiteY2" fmla="*/ 45569 h 91138"/>
-                <a:gd name="connsiteX3" fmla="*/ 45569 w 91138"/>
-                <a:gd name="connsiteY3" fmla="*/ 0 h 91138"/>
-                <a:gd name="connsiteX4" fmla="*/ 91138 w 91138"/>
-                <a:gd name="connsiteY4" fmla="*/ 45569 h 91138"/>
-              </a:gdLst>
-              <a:ahLst/>
-              <a:cxnLst>
-                <a:cxn ang="0">
-                  <a:pos x="connsiteX0" y="connsiteY0"/>
-                </a:cxn>
-                <a:cxn ang="0">
-                  <a:pos x="connsiteX1" y="connsiteY1"/>
-                </a:cxn>
-                <a:cxn ang="0">
-                  <a:pos x="connsiteX2" y="connsiteY2"/>
-                </a:cxn>
-                <a:cxn ang="0">
-                  <a:pos x="connsiteX3" y="connsiteY3"/>
-                </a:cxn>
-                <a:cxn ang="0">
-                  <a:pos x="connsiteX4" y="connsiteY4"/>
-                </a:cxn>
-              </a:cxnLst>
-              <a:rect l="l" t="t" r="r" b="b"/>
-              <a:pathLst>
-                <a:path w="91138" h="91138">
-                  <a:moveTo>
-                    <a:pt x="91138" y="45569"/>
-                  </a:moveTo>
-                  <a:cubicBezTo>
-                    <a:pt x="91138" y="70736"/>
-                    <a:pt x="70736" y="91138"/>
-                    <a:pt x="45569" y="91138"/>
-                  </a:cubicBezTo>
-                  <a:cubicBezTo>
-                    <a:pt x="20402" y="91138"/>
-                    <a:pt x="0" y="70736"/>
-                    <a:pt x="0" y="45569"/>
-                  </a:cubicBezTo>
-                  <a:cubicBezTo>
-                    <a:pt x="0" y="20402"/>
-                    <a:pt x="20402" y="0"/>
-                    <a:pt x="45569" y="0"/>
-                  </a:cubicBezTo>
-                  <a:cubicBezTo>
-                    <a:pt x="70736" y="0"/>
-                    <a:pt x="91138" y="20402"/>
-                    <a:pt x="91138" y="45569"/>
-                  </a:cubicBezTo>
-                  <a:close/>
-                </a:path>
-              </a:pathLst>
-            </a:custGeom>
-            <a:solidFill>
-              <a:schemeClr val="accent4">
-                <a:lumMod val="60000"/>
-                <a:lumOff val="40000"/>
-                <a:alpha val="49071"/>
-              </a:schemeClr>
-            </a:solidFill>
-            <a:ln w="422" cap="flat">
-              <a:noFill/>
-              <a:prstDash val="solid"/>
-              <a:miter/>
-            </a:ln>
-          </p:spPr>
-          <p:txBody>
-            <a:bodyPr rtlCol="0" anchor="ctr">
-              <a:noAutofit/>
-            </a:bodyPr>
-            <a:lstStyle/>
-            <a:p>
-              <a:endParaRPr lang="en-US" dirty="0"/>
-            </a:p>
-          </p:txBody>
-        </p:sp>
-        <p:sp>
-          <p:nvSpPr>
-            <p:cNvPr id="12" name="Graphic 12">
-              <a:extLst>
-                <a:ext uri="{FF2B5EF4-FFF2-40B4-BE49-F238E27FC236}">
-                  <a16:creationId xmlns:a16="http://schemas.microsoft.com/office/drawing/2014/main" id="{3EB1D810-BC05-6C0E-0DE4-3604EBAADCC3}"/>
-                </a:ext>
-                <a:ext uri="{C183D7F6-B498-43B3-948B-1728B52AA6E4}">
-                  <adec:decorative xmlns:adec="http://schemas.microsoft.com/office/drawing/2017/decorative" val="1"/>
-                </a:ext>
-              </a:extLst>
-            </p:cNvPr>
-            <p:cNvSpPr/>
-            <p:nvPr/>
-          </p:nvSpPr>
-          <p:spPr>
-            <a:xfrm>
-              <a:off x="653351" y="4521502"/>
-              <a:ext cx="45719" cy="37785"/>
-            </a:xfrm>
-            <a:custGeom>
-              <a:avLst/>
-              <a:gdLst>
-                <a:gd name="connsiteX0" fmla="*/ 91138 w 91138"/>
-                <a:gd name="connsiteY0" fmla="*/ 45569 h 91138"/>
-                <a:gd name="connsiteX1" fmla="*/ 45569 w 91138"/>
-                <a:gd name="connsiteY1" fmla="*/ 91138 h 91138"/>
-                <a:gd name="connsiteX2" fmla="*/ 0 w 91138"/>
-                <a:gd name="connsiteY2" fmla="*/ 45569 h 91138"/>
-                <a:gd name="connsiteX3" fmla="*/ 45569 w 91138"/>
-                <a:gd name="connsiteY3" fmla="*/ 0 h 91138"/>
-                <a:gd name="connsiteX4" fmla="*/ 91138 w 91138"/>
-                <a:gd name="connsiteY4" fmla="*/ 45569 h 91138"/>
-              </a:gdLst>
-              <a:ahLst/>
-              <a:cxnLst>
-                <a:cxn ang="0">
-                  <a:pos x="connsiteX0" y="connsiteY0"/>
-                </a:cxn>
-                <a:cxn ang="0">
-                  <a:pos x="connsiteX1" y="connsiteY1"/>
-                </a:cxn>
-                <a:cxn ang="0">
-                  <a:pos x="connsiteX2" y="connsiteY2"/>
-                </a:cxn>
-                <a:cxn ang="0">
-                  <a:pos x="connsiteX3" y="connsiteY3"/>
-                </a:cxn>
-                <a:cxn ang="0">
-                  <a:pos x="connsiteX4" y="connsiteY4"/>
-                </a:cxn>
-              </a:cxnLst>
-              <a:rect l="l" t="t" r="r" b="b"/>
-              <a:pathLst>
-                <a:path w="91138" h="91138">
-                  <a:moveTo>
-                    <a:pt x="91138" y="45569"/>
-                  </a:moveTo>
-                  <a:cubicBezTo>
-                    <a:pt x="91138" y="70736"/>
-                    <a:pt x="70736" y="91138"/>
-                    <a:pt x="45569" y="91138"/>
-                  </a:cubicBezTo>
-                  <a:cubicBezTo>
-                    <a:pt x="20402" y="91138"/>
-                    <a:pt x="0" y="70736"/>
-                    <a:pt x="0" y="45569"/>
-                  </a:cubicBezTo>
-                  <a:cubicBezTo>
-                    <a:pt x="0" y="20402"/>
-                    <a:pt x="20402" y="0"/>
-                    <a:pt x="45569" y="0"/>
-                  </a:cubicBezTo>
-                  <a:cubicBezTo>
-                    <a:pt x="70736" y="0"/>
-                    <a:pt x="91138" y="20402"/>
-                    <a:pt x="91138" y="45569"/>
-                  </a:cubicBezTo>
-                  <a:close/>
-                </a:path>
-              </a:pathLst>
-            </a:custGeom>
-            <a:solidFill>
-              <a:schemeClr val="accent4">
-                <a:lumMod val="60000"/>
-                <a:lumOff val="40000"/>
-                <a:alpha val="49071"/>
-              </a:schemeClr>
-            </a:solidFill>
-            <a:ln w="422" cap="flat">
-              <a:noFill/>
-              <a:prstDash val="solid"/>
-              <a:miter/>
-            </a:ln>
-          </p:spPr>
-          <p:txBody>
-            <a:bodyPr rtlCol="0" anchor="ctr">
-              <a:noAutofit/>
-            </a:bodyPr>
-            <a:lstStyle/>
-            <a:p>
-              <a:endParaRPr lang="en-US" dirty="0"/>
-            </a:p>
-          </p:txBody>
-        </p:sp>
-      </p:grpSp>
+    </p:spTree>
+    <p:extLst>
+      <p:ext uri="{BB962C8B-B14F-4D97-AF65-F5344CB8AC3E}">
+        <p14:creationId xmlns:p14="http://schemas.microsoft.com/office/powerpoint/2010/main" val="2968843757"/>
+      </p:ext>
+    </p:extLst>
+  </p:cSld>
+  <p:clrMapOvr>
+    <a:masterClrMapping/>
+  </p:clrMapOvr>
+  <p:extLst>
+    <p:ext uri="{DCECCB84-F9BA-43D5-87BE-67443E8EF086}">
+      <p15:sldGuideLst xmlns:p15="http://schemas.microsoft.com/office/powerpoint/2012/main">
+        <p15:guide id="1" orient="horz" pos="2160">
+          <p15:clr>
+            <a:srgbClr val="FBAE40"/>
+          </p15:clr>
+        </p15:guide>
+        <p15:guide id="2" pos="3840">
+          <p15:clr>
+            <a:srgbClr val="FBAE40"/>
+          </p15:clr>
+        </p15:guide>
+      </p15:sldGuideLst>
+    </p:ext>
+  </p:extLst>
+</p:sldLayout>
+</file>
+
+<file path=ppt/slideLayouts/slideLayout5.xml><?xml version="1.0" encoding="utf-8"?>
+<p:sldLayout xmlns:a="http://schemas.openxmlformats.org/drawingml/2006/main" xmlns:r="http://schemas.openxmlformats.org/officeDocument/2006/relationships" xmlns:p="http://schemas.openxmlformats.org/presentationml/2006/main" preserve="1" userDrawn="1">
+  <p:cSld name="Title, Content 2">
+    <p:spTree>
+      <p:nvGrpSpPr>
+        <p:cNvPr id="1" name=""/>
+        <p:cNvGrpSpPr/>
+        <p:nvPr/>
+      </p:nvGrpSpPr>
+      <p:grpSpPr>
+        <a:xfrm>
+          <a:off x="0" y="0"/>
+          <a:ext cx="0" cy="0"/>
+          <a:chOff x="0" y="0"/>
+          <a:chExt cx="0" cy="0"/>
+        </a:xfrm>
+      </p:grpSpPr>
       <p:sp>
         <p:nvSpPr>
           <p:cNvPr id="2" name="Title 1">
             <a:extLst>
               <a:ext uri="{FF2B5EF4-FFF2-40B4-BE49-F238E27FC236}">
-                <a16:creationId xmlns:a16="http://schemas.microsoft.com/office/drawing/2014/main" id="{DF8070BB-B3B5-3A8A-2466-D661C741794F}"/>
+                <a16:creationId xmlns:a16="http://schemas.microsoft.com/office/drawing/2014/main" id="{0C40C44A-93E6-6C58-5E88-AFDC594EC27A}"/>
               </a:ext>
             </a:extLst>
           </p:cNvPr>
@@ -2384,39 +2205,61 @@
         </p:nvSpPr>
         <p:spPr>
           <a:xfrm>
-            <a:off x="741680" y="430482"/>
-            <a:ext cx="10500989" cy="1327464"/>
+            <a:off x="838201" y="448056"/>
+            <a:ext cx="6172200" cy="1581912"/>
           </a:xfrm>
         </p:spPr>
         <p:txBody>
-          <a:bodyPr anchor="b">
+          <a:bodyPr anchor="b" anchorCtr="0">
             <a:noAutofit/>
           </a:bodyPr>
           <a:lstStyle>
-            <a:lvl1pPr algn="l">
-              <a:defRPr sz="3200" cap="all" spc="0" baseline="0">
-                <a:solidFill>
-                  <a:schemeClr val="accent3">
-                    <a:lumMod val="75000"/>
-                  </a:schemeClr>
-                </a:solidFill>
-              </a:defRPr>
+            <a:lvl1pPr marL="0" marR="0" indent="0" algn="l" defTabSz="914400" rtl="0" eaLnBrk="1" fontAlgn="auto" latinLnBrk="0" hangingPunct="1">
+              <a:lnSpc>
+                <a:spcPct val="90000"/>
+              </a:lnSpc>
+              <a:spcBef>
+                <a:spcPct val="0"/>
+              </a:spcBef>
+              <a:spcAft>
+                <a:spcPts val="0"/>
+              </a:spcAft>
+              <a:buClrTx/>
+              <a:buSzTx/>
+              <a:buFontTx/>
+              <a:buNone/>
+              <a:tabLst/>
+              <a:defRPr sz="3200"/>
             </a:lvl1pPr>
           </a:lstStyle>
           <a:p>
             <a:r>
-              <a:rPr lang="en-US" dirty="0"/>
+              <a:rPr kumimoji="0" lang="en-US" sz="4400" b="0" i="0" u="none" strike="noStrike" kern="1200" cap="none" spc="300" normalizeH="0" baseline="0" noProof="0" dirty="0">
+                <a:ln>
+                  <a:noFill/>
+                </a:ln>
+                <a:solidFill>
+                  <a:srgbClr val="FFFFFF"/>
+                </a:solidFill>
+                <a:effectLst/>
+                <a:uLnTx/>
+                <a:uFillTx/>
+                <a:latin typeface="+mj-lt"/>
+                <a:ea typeface="+mj-ea"/>
+                <a:cs typeface="Biome" panose="020B0503030204020804" pitchFamily="34" charset="0"/>
+              </a:rPr>
               <a:t>Click to add title</a:t>
             </a:r>
+            <a:endParaRPr lang="en-US" dirty="0"/>
           </a:p>
         </p:txBody>
       </p:sp>
       <p:sp>
         <p:nvSpPr>
-          <p:cNvPr id="5" name="Content Placeholder 4">
+          <p:cNvPr id="4" name="Content Placeholder 10">
             <a:extLst>
               <a:ext uri="{FF2B5EF4-FFF2-40B4-BE49-F238E27FC236}">
-                <a16:creationId xmlns:a16="http://schemas.microsoft.com/office/drawing/2014/main" id="{A2003C5A-BF21-DE87-0ED1-3E2D0F32B5D8}"/>
+                <a16:creationId xmlns:a16="http://schemas.microsoft.com/office/drawing/2014/main" id="{5F30E2A0-23EF-51B1-8ABD-00429EEA0642}"/>
               </a:ext>
             </a:extLst>
           </p:cNvPr>
@@ -2424,108 +2267,106 @@
             <a:spLocks noGrp="1"/>
           </p:cNvSpPr>
           <p:nvPr>
-            <p:ph sz="quarter" idx="35" hasCustomPrompt="1"/>
+            <p:ph sz="quarter" idx="14" hasCustomPrompt="1"/>
           </p:nvPr>
         </p:nvSpPr>
         <p:spPr>
           <a:xfrm>
-            <a:off x="807038" y="2465539"/>
-            <a:ext cx="3774587" cy="3723753"/>
+            <a:off x="838200" y="2257063"/>
+            <a:ext cx="4894006" cy="3904906"/>
           </a:xfrm>
         </p:spPr>
         <p:txBody>
-          <a:bodyPr/>
+          <a:bodyPr>
+            <a:normAutofit/>
+          </a:bodyPr>
           <a:lstStyle>
-            <a:lvl1pPr marL="342900" indent="-342900">
-              <a:lnSpc>
-                <a:spcPct val="120000"/>
-              </a:lnSpc>
+            <a:lvl1pPr marL="0" indent="0">
               <a:spcBef>
                 <a:spcPts val="1000"/>
               </a:spcBef>
+              <a:spcAft>
+                <a:spcPts val="0"/>
+              </a:spcAft>
               <a:buClr>
-                <a:schemeClr val="accent3">
-                  <a:lumMod val="75000"/>
-                </a:schemeClr>
+                <a:schemeClr val="accent2"/>
               </a:buClr>
-              <a:buFont typeface="+mj-lt"/>
-              <a:buAutoNum type="arabicPeriod"/>
-              <a:defRPr sz="1800" spc="0" baseline="0">
-                <a:solidFill>
-                  <a:schemeClr val="bg1"/>
-                </a:solidFill>
+              <a:buFont typeface="Wingdings" panose="05000000000000000000" pitchFamily="2" charset="2"/>
+              <a:buNone/>
+              <a:defRPr sz="1800">
                 <a:latin typeface="+mn-lt"/>
               </a:defRPr>
             </a:lvl1pPr>
-            <a:lvl2pPr marL="626364" indent="-342900">
-              <a:lnSpc>
-                <a:spcPct val="120000"/>
-              </a:lnSpc>
+            <a:lvl2pPr marL="0" indent="-228600">
               <a:spcBef>
                 <a:spcPts val="1000"/>
               </a:spcBef>
+              <a:spcAft>
+                <a:spcPts val="1000"/>
+              </a:spcAft>
               <a:buClr>
-                <a:schemeClr val="accent3">
-                  <a:lumMod val="75000"/>
-                </a:schemeClr>
+                <a:schemeClr val="accent2"/>
               </a:buClr>
-              <a:buFont typeface="+mj-lt"/>
-              <a:buAutoNum type="alphaLcPeriod"/>
-              <a:defRPr sz="1800" spc="0">
-                <a:solidFill>
-                  <a:schemeClr val="bg1"/>
-                </a:solidFill>
+              <a:buFont typeface="Wingdings" panose="05000000000000000000" pitchFamily="2" charset="2"/>
+              <a:buChar char="§"/>
+              <a:defRPr sz="1800">
                 <a:latin typeface="+mn-lt"/>
               </a:defRPr>
             </a:lvl2pPr>
-            <a:lvl3pPr marL="918972" indent="-342900">
-              <a:lnSpc>
-                <a:spcPct val="120000"/>
-              </a:lnSpc>
+            <a:lvl3pPr marL="457200" indent="-228600">
               <a:spcBef>
                 <a:spcPts val="1000"/>
               </a:spcBef>
+              <a:spcAft>
+                <a:spcPts val="1000"/>
+              </a:spcAft>
               <a:buClr>
-                <a:schemeClr val="accent3">
-                  <a:lumMod val="75000"/>
-                </a:schemeClr>
+                <a:schemeClr val="accent2"/>
               </a:buClr>
-              <a:buFont typeface="+mj-lt"/>
-              <a:buAutoNum type="arabicParenR"/>
-              <a:defRPr sz="1800" spc="0">
-                <a:solidFill>
-                  <a:schemeClr val="bg1"/>
-                </a:solidFill>
+              <a:buFont typeface="Wingdings" panose="05000000000000000000" pitchFamily="2" charset="2"/>
+              <a:buChar char="§"/>
+              <a:defRPr sz="1800">
                 <a:latin typeface="+mn-lt"/>
               </a:defRPr>
             </a:lvl3pPr>
-            <a:lvl4pPr marL="1209294" indent="-342900">
-              <a:lnSpc>
-                <a:spcPct val="120000"/>
-              </a:lnSpc>
+            <a:lvl4pPr marL="685800" indent="-228600">
               <a:spcBef>
                 <a:spcPts val="1000"/>
               </a:spcBef>
+              <a:spcAft>
+                <a:spcPts val="1000"/>
+              </a:spcAft>
               <a:buClr>
-                <a:schemeClr val="accent3">
-                  <a:lumMod val="75000"/>
-                </a:schemeClr>
+                <a:schemeClr val="accent2"/>
               </a:buClr>
-              <a:buFont typeface="+mj-lt"/>
-              <a:buAutoNum type="alphaLcParenR"/>
-              <a:defRPr sz="1800" spc="0">
-                <a:solidFill>
-                  <a:schemeClr val="bg1"/>
-                </a:solidFill>
+              <a:buFont typeface="Wingdings" panose="05000000000000000000" pitchFamily="2" charset="2"/>
+              <a:buChar char="§"/>
+              <a:defRPr sz="1800">
                 <a:latin typeface="+mn-lt"/>
               </a:defRPr>
             </a:lvl4pPr>
+            <a:lvl5pPr marL="914400" indent="-228600">
+              <a:spcBef>
+                <a:spcPts val="1000"/>
+              </a:spcBef>
+              <a:spcAft>
+                <a:spcPts val="1000"/>
+              </a:spcAft>
+              <a:buClr>
+                <a:schemeClr val="accent2"/>
+              </a:buClr>
+              <a:buFont typeface="Wingdings" panose="05000000000000000000" pitchFamily="2" charset="2"/>
+              <a:buChar char="§"/>
+              <a:defRPr sz="1800">
+                <a:latin typeface="+mn-lt"/>
+              </a:defRPr>
+            </a:lvl5pPr>
           </a:lstStyle>
           <a:p>
             <a:pPr lvl="0"/>
             <a:r>
               <a:rPr lang="en-US" dirty="0"/>
-              <a:t>Click to add content</a:t>
+              <a:t>Click to add text</a:t>
             </a:r>
           </a:p>
           <a:p>
@@ -2549,14 +2390,180 @@
               <a:t>Fourth level</a:t>
             </a:r>
           </a:p>
+          <a:p>
+            <a:pPr lvl="4"/>
+            <a:r>
+              <a:rPr lang="en-US" dirty="0"/>
+              <a:t>Fifth level</a:t>
+            </a:r>
+          </a:p>
         </p:txBody>
       </p:sp>
       <p:sp>
         <p:nvSpPr>
-          <p:cNvPr id="6" name="Picture Placeholder 12">
+          <p:cNvPr id="5" name="Rectangle 4">
             <a:extLst>
               <a:ext uri="{FF2B5EF4-FFF2-40B4-BE49-F238E27FC236}">
-                <a16:creationId xmlns:a16="http://schemas.microsoft.com/office/drawing/2014/main" id="{F795324F-3564-501F-776E-1003E8C38DE9}"/>
+                <a16:creationId xmlns:a16="http://schemas.microsoft.com/office/drawing/2014/main" id="{AB1C9FF7-6A99-F749-B814-2C8D99D5AFD9}"/>
+              </a:ext>
+              <a:ext uri="{C183D7F6-B498-43B3-948B-1728B52AA6E4}">
+                <adec:decorative xmlns:adec="http://schemas.microsoft.com/office/drawing/2017/decorative" val="1"/>
+              </a:ext>
+            </a:extLst>
+          </p:cNvPr>
+          <p:cNvSpPr/>
+          <p:nvPr userDrawn="1"/>
+        </p:nvSpPr>
+        <p:spPr>
+          <a:xfrm>
+            <a:off x="993814" y="6303963"/>
+            <a:ext cx="4287186" cy="554037"/>
+          </a:xfrm>
+          <a:prstGeom prst="rect">
+            <a:avLst/>
+          </a:prstGeom>
+          <a:gradFill flip="none" rotWithShape="1">
+            <a:gsLst>
+              <a:gs pos="0">
+                <a:srgbClr val="00023A"/>
+              </a:gs>
+              <a:gs pos="100000">
+                <a:srgbClr val="E89756">
+                  <a:lumMod val="97000"/>
+                  <a:lumOff val="3000"/>
+                </a:srgbClr>
+              </a:gs>
+              <a:gs pos="50000">
+                <a:srgbClr val="A53F51"/>
+              </a:gs>
+            </a:gsLst>
+            <a:path path="circle">
+              <a:fillToRect l="100000" t="100000"/>
+            </a:path>
+            <a:tileRect r="-100000" b="-100000"/>
+          </a:gradFill>
+          <a:ln w="19050" cap="flat" cmpd="sng" algn="ctr">
+            <a:noFill/>
+            <a:prstDash val="solid"/>
+            <a:miter lim="800000"/>
+          </a:ln>
+          <a:effectLst/>
+        </p:spPr>
+        <p:txBody>
+          <a:bodyPr rtlCol="0" anchor="ctr"/>
+          <a:lstStyle/>
+          <a:p>
+            <a:pPr marL="0" marR="0" lvl="0" indent="0" algn="ctr" defTabSz="914400" eaLnBrk="1" fontAlgn="auto" latinLnBrk="0" hangingPunct="1">
+              <a:lnSpc>
+                <a:spcPct val="100000"/>
+              </a:lnSpc>
+              <a:spcBef>
+                <a:spcPts val="0"/>
+              </a:spcBef>
+              <a:spcAft>
+                <a:spcPts val="0"/>
+              </a:spcAft>
+              <a:buClrTx/>
+              <a:buSzTx/>
+              <a:buFontTx/>
+              <a:buNone/>
+              <a:tabLst/>
+              <a:defRPr/>
+            </a:pPr>
+            <a:endParaRPr kumimoji="0" lang="en-US" sz="1800" b="0" i="0" u="none" strike="noStrike" kern="0" cap="none" spc="0" normalizeH="0" baseline="0" noProof="0" dirty="0">
+              <a:ln>
+                <a:noFill/>
+              </a:ln>
+              <a:solidFill>
+                <a:srgbClr val="FFFFFF"/>
+              </a:solidFill>
+              <a:effectLst/>
+              <a:uLnTx/>
+              <a:uFillTx/>
+              <a:latin typeface="Calibri"/>
+              <a:ea typeface="+mn-ea"/>
+              <a:cs typeface="+mn-cs"/>
+            </a:endParaRPr>
+          </a:p>
+        </p:txBody>
+      </p:sp>
+      <p:pic>
+        <p:nvPicPr>
+          <p:cNvPr id="6" name="Picture Placeholder 5" descr="A person looking at blueprints on a brick wall">
+            <a:extLst>
+              <a:ext uri="{FF2B5EF4-FFF2-40B4-BE49-F238E27FC236}">
+                <a16:creationId xmlns:a16="http://schemas.microsoft.com/office/drawing/2014/main" id="{67D5F276-CD6B-250D-7618-E270FDA3C15B}"/>
+              </a:ext>
+            </a:extLst>
+          </p:cNvPr>
+          <p:cNvPicPr>
+            <a:picLocks noChangeAspect="1"/>
+          </p:cNvPicPr>
+          <p:nvPr userDrawn="1"/>
+        </p:nvPicPr>
+        <p:blipFill rotWithShape="1">
+          <a:blip r:embed="rId2">
+            <a:extLst>
+              <a:ext uri="{BEBA8EAE-BF5A-486C-A8C5-ECC9F3942E4B}">
+                <a14:imgProps xmlns:a14="http://schemas.microsoft.com/office/drawing/2010/main">
+                  <a14:imgLayer r:embed="rId3">
+                    <a14:imgEffect>
+                      <a14:saturation sat="0"/>
+                    </a14:imgEffect>
+                  </a14:imgLayer>
+                </a14:imgProps>
+              </a:ext>
+            </a:extLst>
+          </a:blip>
+          <a:srcRect l="27157" r="27157"/>
+          <a:stretch/>
+        </p:blipFill>
+        <p:spPr>
+          <a:xfrm>
+            <a:off x="7500938" y="-22225"/>
+            <a:ext cx="4714875" cy="6880225"/>
+          </a:xfrm>
+          <a:prstGeom prst="rect">
+            <a:avLst/>
+          </a:prstGeom>
+        </p:spPr>
+      </p:pic>
+    </p:spTree>
+    <p:extLst>
+      <p:ext uri="{BB962C8B-B14F-4D97-AF65-F5344CB8AC3E}">
+        <p14:creationId xmlns:p14="http://schemas.microsoft.com/office/powerpoint/2010/main" val="573940114"/>
+      </p:ext>
+    </p:extLst>
+  </p:cSld>
+  <p:clrMapOvr>
+    <a:masterClrMapping/>
+  </p:clrMapOvr>
+</p:sldLayout>
+</file>
+
+<file path=ppt/slideLayouts/slideLayout6.xml><?xml version="1.0" encoding="utf-8"?>
+<p:sldLayout xmlns:a="http://schemas.openxmlformats.org/drawingml/2006/main" xmlns:r="http://schemas.openxmlformats.org/officeDocument/2006/relationships" xmlns:p="http://schemas.openxmlformats.org/presentationml/2006/main" preserve="1" userDrawn="1">
+  <p:cSld name="Title, Content 3">
+    <p:spTree>
+      <p:nvGrpSpPr>
+        <p:cNvPr id="1" name=""/>
+        <p:cNvGrpSpPr/>
+        <p:nvPr/>
+      </p:nvGrpSpPr>
+      <p:grpSpPr>
+        <a:xfrm>
+          <a:off x="0" y="0"/>
+          <a:ext cx="0" cy="0"/>
+          <a:chOff x="0" y="0"/>
+          <a:chExt cx="0" cy="0"/>
+        </a:xfrm>
+      </p:grpSpPr>
+      <p:sp>
+        <p:nvSpPr>
+          <p:cNvPr id="2" name="Title 1">
+            <a:extLst>
+              <a:ext uri="{FF2B5EF4-FFF2-40B4-BE49-F238E27FC236}">
+                <a16:creationId xmlns:a16="http://schemas.microsoft.com/office/drawing/2014/main" id="{F657BD59-35CC-9BB3-8621-6FA3356F81AA}"/>
               </a:ext>
             </a:extLst>
           </p:cNvPr>
@@ -2564,55 +2571,353 @@
             <a:spLocks noGrp="1"/>
           </p:cNvSpPr>
           <p:nvPr>
-            <p:ph type="pic" sz="quarter" idx="10"/>
+            <p:ph type="title" hasCustomPrompt="1"/>
           </p:nvPr>
         </p:nvSpPr>
         <p:spPr>
           <a:xfrm>
-            <a:off x="4835371" y="2488825"/>
-            <a:ext cx="6407298" cy="3700454"/>
+            <a:off x="5242425" y="466344"/>
+            <a:ext cx="6241651" cy="1710354"/>
           </a:xfrm>
         </p:spPr>
         <p:txBody>
-          <a:bodyPr/>
+          <a:bodyPr bIns="0" anchor="ctr" anchorCtr="0">
+            <a:noAutofit/>
+          </a:bodyPr>
+          <a:lstStyle>
+            <a:lvl1pPr marL="0" marR="0" indent="0" algn="l" defTabSz="914400" rtl="0" eaLnBrk="1" fontAlgn="auto" latinLnBrk="0" hangingPunct="1">
+              <a:lnSpc>
+                <a:spcPct val="90000"/>
+              </a:lnSpc>
+              <a:spcBef>
+                <a:spcPct val="0"/>
+              </a:spcBef>
+              <a:spcAft>
+                <a:spcPts val="0"/>
+              </a:spcAft>
+              <a:buClrTx/>
+              <a:buSzTx/>
+              <a:buFontTx/>
+              <a:buNone/>
+              <a:tabLst/>
+              <a:defRPr sz="3200"/>
+            </a:lvl1pPr>
+          </a:lstStyle>
+          <a:p>
+            <a:r>
+              <a:rPr kumimoji="0" lang="en-US" sz="4400" b="0" i="0" u="none" strike="noStrike" kern="1200" cap="none" spc="300" normalizeH="0" baseline="0" noProof="0" dirty="0">
+                <a:ln>
+                  <a:noFill/>
+                </a:ln>
+                <a:solidFill>
+                  <a:srgbClr val="FFFFFF"/>
+                </a:solidFill>
+                <a:effectLst/>
+                <a:uLnTx/>
+                <a:uFillTx/>
+                <a:latin typeface="+mj-lt"/>
+                <a:ea typeface="+mj-ea"/>
+                <a:cs typeface="Biome" panose="020B0503030204020804" pitchFamily="34" charset="0"/>
+              </a:rPr>
+              <a:t>Click to add title</a:t>
+            </a:r>
+            <a:endParaRPr lang="en-US" dirty="0"/>
+          </a:p>
+        </p:txBody>
+      </p:sp>
+      <p:sp>
+        <p:nvSpPr>
+          <p:cNvPr id="5" name="Rectangle 4">
+            <a:extLst>
+              <a:ext uri="{FF2B5EF4-FFF2-40B4-BE49-F238E27FC236}">
+                <a16:creationId xmlns:a16="http://schemas.microsoft.com/office/drawing/2014/main" id="{0C81F3FF-82E0-A6E9-44F3-5D9572819DC6}"/>
+              </a:ext>
+              <a:ext uri="{C183D7F6-B498-43B3-948B-1728B52AA6E4}">
+                <adec:decorative xmlns:adec="http://schemas.microsoft.com/office/drawing/2017/decorative" val="1"/>
+              </a:ext>
+            </a:extLst>
+          </p:cNvPr>
+          <p:cNvSpPr/>
+          <p:nvPr userDrawn="1"/>
+        </p:nvSpPr>
+        <p:spPr>
+          <a:xfrm>
+            <a:off x="5291586" y="6303963"/>
+            <a:ext cx="4287186" cy="554037"/>
+          </a:xfrm>
+          <a:prstGeom prst="rect">
+            <a:avLst/>
+          </a:prstGeom>
+          <a:gradFill flip="none" rotWithShape="1">
+            <a:gsLst>
+              <a:gs pos="0">
+                <a:srgbClr val="00023A"/>
+              </a:gs>
+              <a:gs pos="100000">
+                <a:srgbClr val="E89756">
+                  <a:lumMod val="97000"/>
+                  <a:lumOff val="3000"/>
+                </a:srgbClr>
+              </a:gs>
+              <a:gs pos="50000">
+                <a:srgbClr val="A53F51"/>
+              </a:gs>
+            </a:gsLst>
+            <a:path path="circle">
+              <a:fillToRect l="100000" t="100000"/>
+            </a:path>
+            <a:tileRect r="-100000" b="-100000"/>
+          </a:gradFill>
+          <a:ln w="19050" cap="flat" cmpd="sng" algn="ctr">
+            <a:noFill/>
+            <a:prstDash val="solid"/>
+            <a:miter lim="800000"/>
+          </a:ln>
+          <a:effectLst/>
+        </p:spPr>
+        <p:txBody>
+          <a:bodyPr rtlCol="0" anchor="ctr"/>
           <a:lstStyle/>
           <a:p>
-            <a:endParaRPr lang="en-CN"/>
+            <a:pPr marL="0" marR="0" lvl="0" indent="0" algn="ctr" defTabSz="914400" eaLnBrk="1" fontAlgn="auto" latinLnBrk="0" hangingPunct="1">
+              <a:lnSpc>
+                <a:spcPct val="100000"/>
+              </a:lnSpc>
+              <a:spcBef>
+                <a:spcPts val="0"/>
+              </a:spcBef>
+              <a:spcAft>
+                <a:spcPts val="0"/>
+              </a:spcAft>
+              <a:buClrTx/>
+              <a:buSzTx/>
+              <a:buFontTx/>
+              <a:buNone/>
+              <a:tabLst/>
+              <a:defRPr/>
+            </a:pPr>
+            <a:endParaRPr kumimoji="0" lang="en-US" sz="1800" b="0" i="0" u="none" strike="noStrike" kern="0" cap="none" spc="0" normalizeH="0" baseline="0" noProof="0" dirty="0">
+              <a:ln>
+                <a:noFill/>
+              </a:ln>
+              <a:solidFill>
+                <a:srgbClr val="FFFFFF"/>
+              </a:solidFill>
+              <a:effectLst/>
+              <a:uLnTx/>
+              <a:uFillTx/>
+              <a:latin typeface="Calibri"/>
+              <a:ea typeface="+mn-ea"/>
+              <a:cs typeface="+mn-cs"/>
+            </a:endParaRPr>
+          </a:p>
+        </p:txBody>
+      </p:sp>
+      <p:pic>
+        <p:nvPicPr>
+          <p:cNvPr id="6" name="Picture Placeholder 7" descr="A person talking to another person">
+            <a:extLst>
+              <a:ext uri="{FF2B5EF4-FFF2-40B4-BE49-F238E27FC236}">
+                <a16:creationId xmlns:a16="http://schemas.microsoft.com/office/drawing/2014/main" id="{43938C4F-F26B-082E-6C1D-7D09DC1457E8}"/>
+              </a:ext>
+            </a:extLst>
+          </p:cNvPr>
+          <p:cNvPicPr>
+            <a:picLocks noChangeAspect="1"/>
+          </p:cNvPicPr>
+          <p:nvPr userDrawn="1"/>
+        </p:nvPicPr>
+        <p:blipFill rotWithShape="1">
+          <a:blip r:embed="rId2" cstate="print">
+            <a:extLst>
+              <a:ext uri="{BEBA8EAE-BF5A-486C-A8C5-ECC9F3942E4B}">
+                <a14:imgProps xmlns:a14="http://schemas.microsoft.com/office/drawing/2010/main">
+                  <a14:imgLayer r:embed="rId3">
+                    <a14:imgEffect>
+                      <a14:saturation sat="0"/>
+                    </a14:imgEffect>
+                  </a14:imgLayer>
+                </a14:imgProps>
+              </a:ext>
+              <a:ext uri="{28A0092B-C50C-407E-A947-70E740481C1C}">
+                <a14:useLocalDpi xmlns:a14="http://schemas.microsoft.com/office/drawing/2010/main"/>
+              </a:ext>
+            </a:extLst>
+          </a:blip>
+          <a:srcRect l="10437" r="10437"/>
+          <a:stretch/>
+        </p:blipFill>
+        <p:spPr>
+          <a:xfrm>
+            <a:off x="0" y="0"/>
+            <a:ext cx="4287838" cy="6858000"/>
+          </a:xfrm>
+          <a:prstGeom prst="rect">
+            <a:avLst/>
+          </a:prstGeom>
+        </p:spPr>
+      </p:pic>
+      <p:sp>
+        <p:nvSpPr>
+          <p:cNvPr id="7" name="Content Placeholder 10">
+            <a:extLst>
+              <a:ext uri="{FF2B5EF4-FFF2-40B4-BE49-F238E27FC236}">
+                <a16:creationId xmlns:a16="http://schemas.microsoft.com/office/drawing/2014/main" id="{4CA0E0E9-376E-927D-EBAE-6D979CBE6F4A}"/>
+              </a:ext>
+            </a:extLst>
+          </p:cNvPr>
+          <p:cNvSpPr>
+            <a:spLocks noGrp="1"/>
+          </p:cNvSpPr>
+          <p:nvPr>
+            <p:ph sz="quarter" idx="14" hasCustomPrompt="1"/>
+          </p:nvPr>
+        </p:nvSpPr>
+        <p:spPr>
+          <a:xfrm>
+            <a:off x="5291586" y="2502365"/>
+            <a:ext cx="6192490" cy="3214092"/>
+          </a:xfrm>
+        </p:spPr>
+        <p:txBody>
+          <a:bodyPr>
+            <a:normAutofit/>
+          </a:bodyPr>
+          <a:lstStyle>
+            <a:lvl1pPr marL="0" indent="0">
+              <a:spcBef>
+                <a:spcPts val="1000"/>
+              </a:spcBef>
+              <a:spcAft>
+                <a:spcPts val="0"/>
+              </a:spcAft>
+              <a:buClr>
+                <a:schemeClr val="accent2"/>
+              </a:buClr>
+              <a:buFont typeface="Wingdings" panose="05000000000000000000" pitchFamily="2" charset="2"/>
+              <a:buNone/>
+              <a:defRPr sz="1800">
+                <a:latin typeface="+mn-lt"/>
+              </a:defRPr>
+            </a:lvl1pPr>
+            <a:lvl2pPr marL="0" indent="-228600">
+              <a:spcBef>
+                <a:spcPts val="1000"/>
+              </a:spcBef>
+              <a:spcAft>
+                <a:spcPts val="1000"/>
+              </a:spcAft>
+              <a:buClr>
+                <a:schemeClr val="accent2"/>
+              </a:buClr>
+              <a:buFont typeface="Wingdings" panose="05000000000000000000" pitchFamily="2" charset="2"/>
+              <a:buChar char="§"/>
+              <a:defRPr sz="1800">
+                <a:latin typeface="+mn-lt"/>
+              </a:defRPr>
+            </a:lvl2pPr>
+            <a:lvl3pPr marL="457200" indent="-228600">
+              <a:spcBef>
+                <a:spcPts val="1000"/>
+              </a:spcBef>
+              <a:spcAft>
+                <a:spcPts val="1000"/>
+              </a:spcAft>
+              <a:buClr>
+                <a:schemeClr val="accent2"/>
+              </a:buClr>
+              <a:buFont typeface="Wingdings" panose="05000000000000000000" pitchFamily="2" charset="2"/>
+              <a:buChar char="§"/>
+              <a:defRPr sz="1800">
+                <a:latin typeface="+mn-lt"/>
+              </a:defRPr>
+            </a:lvl3pPr>
+            <a:lvl4pPr marL="685800" indent="-228600">
+              <a:spcBef>
+                <a:spcPts val="1000"/>
+              </a:spcBef>
+              <a:spcAft>
+                <a:spcPts val="1000"/>
+              </a:spcAft>
+              <a:buClr>
+                <a:schemeClr val="accent2"/>
+              </a:buClr>
+              <a:buFont typeface="Wingdings" panose="05000000000000000000" pitchFamily="2" charset="2"/>
+              <a:buChar char="§"/>
+              <a:defRPr sz="1800">
+                <a:latin typeface="+mn-lt"/>
+              </a:defRPr>
+            </a:lvl4pPr>
+            <a:lvl5pPr marL="914400" indent="-228600">
+              <a:spcBef>
+                <a:spcPts val="1000"/>
+              </a:spcBef>
+              <a:spcAft>
+                <a:spcPts val="1000"/>
+              </a:spcAft>
+              <a:buClr>
+                <a:schemeClr val="accent2"/>
+              </a:buClr>
+              <a:buFont typeface="Wingdings" panose="05000000000000000000" pitchFamily="2" charset="2"/>
+              <a:buChar char="§"/>
+              <a:defRPr sz="1800">
+                <a:latin typeface="+mn-lt"/>
+              </a:defRPr>
+            </a:lvl5pPr>
+          </a:lstStyle>
+          <a:p>
+            <a:pPr lvl="0"/>
+            <a:r>
+              <a:rPr lang="en-US" dirty="0"/>
+              <a:t>Click to add text</a:t>
+            </a:r>
+          </a:p>
+          <a:p>
+            <a:pPr lvl="1"/>
+            <a:r>
+              <a:rPr lang="en-US" dirty="0"/>
+              <a:t>Second level</a:t>
+            </a:r>
+          </a:p>
+          <a:p>
+            <a:pPr lvl="2"/>
+            <a:r>
+              <a:rPr lang="en-US" dirty="0"/>
+              <a:t>Third level</a:t>
+            </a:r>
+          </a:p>
+          <a:p>
+            <a:pPr lvl="3"/>
+            <a:r>
+              <a:rPr lang="en-US" dirty="0"/>
+              <a:t>Fourth level</a:t>
+            </a:r>
+          </a:p>
+          <a:p>
+            <a:pPr lvl="4"/>
+            <a:r>
+              <a:rPr lang="en-US" dirty="0"/>
+              <a:t>Fifth level</a:t>
+            </a:r>
           </a:p>
         </p:txBody>
       </p:sp>
     </p:spTree>
     <p:extLst>
       <p:ext uri="{BB962C8B-B14F-4D97-AF65-F5344CB8AC3E}">
-        <p14:creationId xmlns:p14="http://schemas.microsoft.com/office/powerpoint/2010/main" val="966222750"/>
+        <p14:creationId xmlns:p14="http://schemas.microsoft.com/office/powerpoint/2010/main" val="1439465407"/>
       </p:ext>
     </p:extLst>
   </p:cSld>
   <p:clrMapOvr>
     <a:masterClrMapping/>
   </p:clrMapOvr>
-  <p:extLst>
-    <p:ext uri="{DCECCB84-F9BA-43D5-87BE-67443E8EF086}">
-      <p15:sldGuideLst xmlns:p15="http://schemas.microsoft.com/office/powerpoint/2012/main">
-        <p15:guide id="1" orient="horz" pos="2160" userDrawn="1">
-          <p15:clr>
-            <a:srgbClr val="FBAE40"/>
-          </p15:clr>
-        </p15:guide>
-        <p15:guide id="2" pos="3840" userDrawn="1">
-          <p15:clr>
-            <a:srgbClr val="FBAE40"/>
-          </p15:clr>
-        </p15:guide>
-      </p15:sldGuideLst>
-    </p:ext>
-  </p:extLst>
 </p:sldLayout>
 </file>
 
-<file path=ppt/slideLayouts/slideLayout5.xml><?xml version="1.0" encoding="utf-8"?>
+<file path=ppt/slideLayouts/slideLayout7.xml><?xml version="1.0" encoding="utf-8"?>
 <p:sldLayout xmlns:a="http://schemas.openxmlformats.org/drawingml/2006/main" xmlns:r="http://schemas.openxmlformats.org/officeDocument/2006/relationships" xmlns:p="http://schemas.openxmlformats.org/presentationml/2006/main" preserve="1" userDrawn="1">
-  <p:cSld name="Title and 2 Column 1">
+  <p:cSld name="Title, Content 4">
     <p:bg>
       <p:bgPr>
         <a:gradFill>
@@ -3554,8 +3859,8 @@
         </p:nvSpPr>
         <p:spPr>
           <a:xfrm>
-            <a:off x="2373002" y="2474811"/>
-            <a:ext cx="4015098" cy="3528397"/>
+            <a:off x="2373001" y="2474811"/>
+            <a:ext cx="8849489" cy="3528397"/>
           </a:xfrm>
         </p:spPr>
         <p:txBody>
@@ -3671,233 +3976,10 @@
           </a:p>
         </p:txBody>
       </p:sp>
-      <p:sp>
-        <p:nvSpPr>
-          <p:cNvPr id="21" name="Content Placeholder 4">
-            <a:extLst>
-              <a:ext uri="{FF2B5EF4-FFF2-40B4-BE49-F238E27FC236}">
-                <a16:creationId xmlns:a16="http://schemas.microsoft.com/office/drawing/2014/main" id="{D77F99A7-26FA-422E-43E9-C76B4A56E44A}"/>
-              </a:ext>
-            </a:extLst>
-          </p:cNvPr>
-          <p:cNvSpPr>
-            <a:spLocks noGrp="1"/>
-          </p:cNvSpPr>
-          <p:nvPr>
-            <p:ph sz="quarter" idx="36" hasCustomPrompt="1"/>
-          </p:nvPr>
-        </p:nvSpPr>
-        <p:spPr>
-          <a:xfrm>
-            <a:off x="6995159" y="2474811"/>
-            <a:ext cx="4227332" cy="3528397"/>
-          </a:xfrm>
-        </p:spPr>
-        <p:txBody>
-          <a:bodyPr/>
-          <a:lstStyle>
-            <a:lvl1pPr marL="0" indent="0">
-              <a:lnSpc>
-                <a:spcPct val="120000"/>
-              </a:lnSpc>
-              <a:spcBef>
-                <a:spcPts val="1000"/>
-              </a:spcBef>
-              <a:buClr>
-                <a:schemeClr val="accent6"/>
-              </a:buClr>
-              <a:buFont typeface="Arial" panose="020B0604020202020204" pitchFamily="34" charset="0"/>
-              <a:buNone/>
-              <a:defRPr sz="1800" spc="0" baseline="0">
-                <a:solidFill>
-                  <a:schemeClr val="bg1"/>
-                </a:solidFill>
-                <a:latin typeface="+mn-lt"/>
-              </a:defRPr>
-            </a:lvl1pPr>
-            <a:lvl2pPr marL="283464" indent="-285750">
-              <a:lnSpc>
-                <a:spcPct val="120000"/>
-              </a:lnSpc>
-              <a:spcBef>
-                <a:spcPts val="1000"/>
-              </a:spcBef>
-              <a:buClr>
-                <a:schemeClr val="accent3">
-                  <a:lumMod val="75000"/>
-                </a:schemeClr>
-              </a:buClr>
-              <a:buFont typeface="Arial" panose="020B0604020202020204" pitchFamily="34" charset="0"/>
-              <a:buChar char="•"/>
-              <a:defRPr sz="1800" spc="0">
-                <a:solidFill>
-                  <a:schemeClr val="bg1"/>
-                </a:solidFill>
-              </a:defRPr>
-            </a:lvl2pPr>
-            <a:lvl3pPr marL="566928" indent="-285750">
-              <a:lnSpc>
-                <a:spcPct val="120000"/>
-              </a:lnSpc>
-              <a:spcBef>
-                <a:spcPts val="1000"/>
-              </a:spcBef>
-              <a:buClr>
-                <a:schemeClr val="accent3">
-                  <a:lumMod val="75000"/>
-                </a:schemeClr>
-              </a:buClr>
-              <a:buFont typeface="Arial" panose="020B0604020202020204" pitchFamily="34" charset="0"/>
-              <a:buChar char="•"/>
-              <a:defRPr sz="1800" spc="0">
-                <a:solidFill>
-                  <a:schemeClr val="bg1"/>
-                </a:solidFill>
-              </a:defRPr>
-            </a:lvl3pPr>
-            <a:lvl4pPr marL="859536" indent="-285750">
-              <a:lnSpc>
-                <a:spcPct val="120000"/>
-              </a:lnSpc>
-              <a:spcBef>
-                <a:spcPts val="1000"/>
-              </a:spcBef>
-              <a:buClr>
-                <a:schemeClr val="accent3">
-                  <a:lumMod val="75000"/>
-                </a:schemeClr>
-              </a:buClr>
-              <a:buFont typeface="Arial" panose="020B0604020202020204" pitchFamily="34" charset="0"/>
-              <a:buChar char="•"/>
-              <a:defRPr sz="1800" spc="0">
-                <a:solidFill>
-                  <a:schemeClr val="bg1"/>
-                </a:solidFill>
-              </a:defRPr>
-            </a:lvl4pPr>
-          </a:lstStyle>
-          <a:p>
-            <a:pPr lvl="0"/>
-            <a:r>
-              <a:rPr lang="en-US" dirty="0"/>
-              <a:t>Click to add content</a:t>
-            </a:r>
-          </a:p>
-          <a:p>
-            <a:pPr lvl="1"/>
-            <a:r>
-              <a:rPr lang="en-US" dirty="0"/>
-              <a:t>Second level</a:t>
-            </a:r>
-          </a:p>
-          <a:p>
-            <a:pPr lvl="2"/>
-            <a:r>
-              <a:rPr lang="en-US" dirty="0"/>
-              <a:t>Third level</a:t>
-            </a:r>
-          </a:p>
-          <a:p>
-            <a:pPr lvl="3"/>
-            <a:r>
-              <a:rPr lang="en-US" dirty="0"/>
-              <a:t>Fourth level</a:t>
-            </a:r>
-          </a:p>
-        </p:txBody>
-      </p:sp>
-      <p:sp>
-        <p:nvSpPr>
-          <p:cNvPr id="15" name="Footer Placeholder 4">
-            <a:extLst>
-              <a:ext uri="{FF2B5EF4-FFF2-40B4-BE49-F238E27FC236}">
-                <a16:creationId xmlns:a16="http://schemas.microsoft.com/office/drawing/2014/main" id="{B02A6961-FD29-3446-6A70-B0D4EE5D14C5}"/>
-              </a:ext>
-            </a:extLst>
-          </p:cNvPr>
-          <p:cNvSpPr>
-            <a:spLocks noGrp="1"/>
-          </p:cNvSpPr>
-          <p:nvPr>
-            <p:ph type="ftr" sz="quarter" idx="11"/>
-          </p:nvPr>
-        </p:nvSpPr>
-        <p:spPr>
-          <a:xfrm>
-            <a:off x="336405" y="6237287"/>
-            <a:ext cx="4114800" cy="365125"/>
-          </a:xfrm>
-        </p:spPr>
-        <p:txBody>
-          <a:bodyPr>
-            <a:noAutofit/>
-          </a:bodyPr>
-          <a:lstStyle>
-            <a:lvl1pPr algn="l">
-              <a:defRPr sz="1200" spc="0">
-                <a:solidFill>
-                  <a:schemeClr val="bg1"/>
-                </a:solidFill>
-              </a:defRPr>
-            </a:lvl1pPr>
-          </a:lstStyle>
-          <a:p>
-            <a:r>
-              <a:rPr lang="en-US" dirty="0"/>
-              <a:t>Presentation title</a:t>
-            </a:r>
-          </a:p>
-        </p:txBody>
-      </p:sp>
-      <p:sp>
-        <p:nvSpPr>
-          <p:cNvPr id="16" name="Slide Number Placeholder 5">
-            <a:extLst>
-              <a:ext uri="{FF2B5EF4-FFF2-40B4-BE49-F238E27FC236}">
-                <a16:creationId xmlns:a16="http://schemas.microsoft.com/office/drawing/2014/main" id="{68477A85-1CCD-1BF5-8FF0-11B80AE2F6FC}"/>
-              </a:ext>
-            </a:extLst>
-          </p:cNvPr>
-          <p:cNvSpPr>
-            <a:spLocks noGrp="1"/>
-          </p:cNvSpPr>
-          <p:nvPr>
-            <p:ph type="sldNum" sz="quarter" idx="12"/>
-          </p:nvPr>
-        </p:nvSpPr>
-        <p:spPr>
-          <a:xfrm>
-            <a:off x="9140971" y="6226198"/>
-            <a:ext cx="2743200" cy="365125"/>
-          </a:xfrm>
-        </p:spPr>
-        <p:txBody>
-          <a:bodyPr>
-            <a:noAutofit/>
-          </a:bodyPr>
-          <a:lstStyle>
-            <a:lvl1pPr>
-              <a:defRPr sz="1200">
-                <a:solidFill>
-                  <a:schemeClr val="bg1"/>
-                </a:solidFill>
-              </a:defRPr>
-            </a:lvl1pPr>
-          </a:lstStyle>
-          <a:p>
-            <a:fld id="{FE024F78-56A6-7740-B68D-8D4D026EDF3F}" type="slidenum">
-              <a:rPr lang="en-US" smtClean="0"/>
-              <a:pPr/>
-              <a:t>‹#›</a:t>
-            </a:fld>
-            <a:endParaRPr lang="en-US" dirty="0"/>
-          </a:p>
-        </p:txBody>
-      </p:sp>
     </p:spTree>
     <p:extLst>
       <p:ext uri="{BB962C8B-B14F-4D97-AF65-F5344CB8AC3E}">
-        <p14:creationId xmlns:p14="http://schemas.microsoft.com/office/powerpoint/2010/main" val="3651039301"/>
+        <p14:creationId xmlns:p14="http://schemas.microsoft.com/office/powerpoint/2010/main" val="3274757245"/>
       </p:ext>
     </p:extLst>
   </p:cSld>
@@ -3923,38 +4005,9 @@
 </p:sldLayout>
 </file>
 
-<file path=ppt/slideLayouts/slideLayout6.xml><?xml version="1.0" encoding="utf-8"?>
+<file path=ppt/slideLayouts/slideLayout8.xml><?xml version="1.0" encoding="utf-8"?>
 <p:sldLayout xmlns:a="http://schemas.openxmlformats.org/drawingml/2006/main" xmlns:r="http://schemas.openxmlformats.org/officeDocument/2006/relationships" xmlns:p="http://schemas.openxmlformats.org/presentationml/2006/main" preserve="1" userDrawn="1">
-  <p:cSld name="Tilte and Content 1 ">
-    <p:bg>
-      <p:bgPr>
-        <a:gradFill>
-          <a:gsLst>
-            <a:gs pos="81987">
-              <a:schemeClr val="accent6">
-                <a:lumMod val="50000"/>
-              </a:schemeClr>
-            </a:gs>
-            <a:gs pos="35040">
-              <a:srgbClr val="020B11"/>
-            </a:gs>
-            <a:gs pos="11979">
-              <a:schemeClr val="accent4">
-                <a:lumMod val="50000"/>
-              </a:schemeClr>
-            </a:gs>
-            <a:gs pos="0">
-              <a:schemeClr val="accent4"/>
-            </a:gs>
-            <a:gs pos="99000">
-              <a:schemeClr val="tx2"/>
-            </a:gs>
-          </a:gsLst>
-          <a:lin ang="5400000" scaled="1"/>
-        </a:gradFill>
-        <a:effectLst/>
-      </p:bgPr>
-    </p:bg>
+  <p:cSld name="Title, Picture 0">
     <p:spTree>
       <p:nvGrpSpPr>
         <p:cNvPr id="1" name=""/>
@@ -3971,10 +4024,10 @@
       </p:grpSpPr>
       <p:grpSp>
         <p:nvGrpSpPr>
-          <p:cNvPr id="3" name="Group 2">
+          <p:cNvPr id="6" name="Group 5">
             <a:extLst>
               <a:ext uri="{FF2B5EF4-FFF2-40B4-BE49-F238E27FC236}">
-                <a16:creationId xmlns:a16="http://schemas.microsoft.com/office/drawing/2014/main" id="{289F5C3D-E9E6-75E0-BF7D-799B5CFE5ED0}"/>
+                <a16:creationId xmlns:a16="http://schemas.microsoft.com/office/drawing/2014/main" id="{806F03C4-FDB1-00F5-8F67-619C72893547}"/>
               </a:ext>
               <a:ext uri="{C183D7F6-B498-43B3-948B-1728B52AA6E4}">
                 <adec:decorative xmlns:adec="http://schemas.microsoft.com/office/drawing/2017/decorative" val="1"/>
@@ -3986,18 +4039,18 @@
         </p:nvGrpSpPr>
         <p:grpSpPr>
           <a:xfrm>
-            <a:off x="4575462" y="4137"/>
-            <a:ext cx="7616537" cy="6853863"/>
-            <a:chOff x="4575462" y="4137"/>
-            <a:chExt cx="7616537" cy="6853863"/>
+            <a:off x="4575462" y="4136"/>
+            <a:ext cx="7619947" cy="6858000"/>
+            <a:chOff x="4575462" y="4136"/>
+            <a:chExt cx="7619947" cy="6858000"/>
           </a:xfrm>
         </p:grpSpPr>
         <p:grpSp>
           <p:nvGrpSpPr>
-            <p:cNvPr id="16" name="Group 15">
+            <p:cNvPr id="7" name="Group 6">
               <a:extLst>
                 <a:ext uri="{FF2B5EF4-FFF2-40B4-BE49-F238E27FC236}">
-                  <a16:creationId xmlns:a16="http://schemas.microsoft.com/office/drawing/2014/main" id="{CDE1D2C2-40C4-6B80-E8C6-B4CE94C23037}"/>
+                  <a16:creationId xmlns:a16="http://schemas.microsoft.com/office/drawing/2014/main" id="{BDE9364C-6EE9-E747-F3B5-9A5FA214C666}"/>
                 </a:ext>
               </a:extLst>
             </p:cNvPr>
@@ -4014,10 +4067,10 @@
           </p:grpSpPr>
           <p:sp>
             <p:nvSpPr>
-              <p:cNvPr id="27" name="Oval 26">
+              <p:cNvPr id="9" name="Oval 8">
                 <a:extLst>
                   <a:ext uri="{FF2B5EF4-FFF2-40B4-BE49-F238E27FC236}">
-                    <a16:creationId xmlns:a16="http://schemas.microsoft.com/office/drawing/2014/main" id="{7C904D88-E1BE-F1FA-D405-F55DA966DA84}"/>
+                    <a16:creationId xmlns:a16="http://schemas.microsoft.com/office/drawing/2014/main" id="{043581CD-691C-ADD3-0896-F2E1A4E8553C}"/>
                   </a:ext>
                   <a:ext uri="{C183D7F6-B498-43B3-948B-1728B52AA6E4}">
                     <adec:decorative xmlns:adec="http://schemas.microsoft.com/office/drawing/2017/decorative" val="1"/>
@@ -4075,10 +4128,10 @@
           </p:sp>
           <p:sp>
             <p:nvSpPr>
-              <p:cNvPr id="18" name="Graphic 12">
+              <p:cNvPr id="10" name="Graphic 12">
                 <a:extLst>
                   <a:ext uri="{FF2B5EF4-FFF2-40B4-BE49-F238E27FC236}">
-                    <a16:creationId xmlns:a16="http://schemas.microsoft.com/office/drawing/2014/main" id="{1D8F0816-C429-D32E-058B-33405874DFA7}"/>
+                    <a16:creationId xmlns:a16="http://schemas.microsoft.com/office/drawing/2014/main" id="{60EB671A-33C5-FB75-F27F-0FD17B37F524}"/>
                   </a:ext>
                   <a:ext uri="{C183D7F6-B498-43B3-948B-1728B52AA6E4}">
                     <adec:decorative xmlns:adec="http://schemas.microsoft.com/office/drawing/2017/decorative" val="1"/>
@@ -4181,10 +4234,10 @@
         </p:grpSp>
         <p:pic>
           <p:nvPicPr>
-            <p:cNvPr id="4" name="Content Placeholder 14">
+            <p:cNvPr id="8" name="Content Placeholder 14">
               <a:extLst>
                 <a:ext uri="{FF2B5EF4-FFF2-40B4-BE49-F238E27FC236}">
-                  <a16:creationId xmlns:a16="http://schemas.microsoft.com/office/drawing/2014/main" id="{14AC0A97-7D79-3DBE-FB53-A9EBFD806E06}"/>
+                  <a16:creationId xmlns:a16="http://schemas.microsoft.com/office/drawing/2014/main" id="{CC8D74CA-9208-2D40-AB11-204A1C649127}"/>
                 </a:ext>
                 <a:ext uri="{C183D7F6-B498-43B3-948B-1728B52AA6E4}">
                   <adec:decorative xmlns:adec="http://schemas.microsoft.com/office/drawing/2017/decorative" val="1"/>
@@ -4209,8 +4262,8 @@
           </p:blipFill>
           <p:spPr>
             <a:xfrm>
-              <a:off x="6542796" y="4137"/>
-              <a:ext cx="5649203" cy="6853863"/>
+              <a:off x="6542796" y="4136"/>
+              <a:ext cx="5652613" cy="6858000"/>
             </a:xfrm>
             <a:prstGeom prst="rect">
               <a:avLst/>
@@ -4220,10 +4273,10 @@
       </p:grpSp>
       <p:sp>
         <p:nvSpPr>
-          <p:cNvPr id="2" name="Title 1">
+          <p:cNvPr id="11" name="Title 1">
             <a:extLst>
               <a:ext uri="{FF2B5EF4-FFF2-40B4-BE49-F238E27FC236}">
-                <a16:creationId xmlns:a16="http://schemas.microsoft.com/office/drawing/2014/main" id="{51E83F98-B388-2594-BACB-E3DB652C97D5}"/>
+                <a16:creationId xmlns:a16="http://schemas.microsoft.com/office/drawing/2014/main" id="{1A99F113-D7C6-17BF-B586-3529CFF21E35}"/>
               </a:ext>
             </a:extLst>
           </p:cNvPr>
@@ -4236,8 +4289,8 @@
         </p:nvSpPr>
         <p:spPr>
           <a:xfrm>
-            <a:off x="835831" y="173735"/>
-            <a:ext cx="4409514" cy="2203704"/>
+            <a:off x="741680" y="430482"/>
+            <a:ext cx="10500989" cy="778153"/>
           </a:xfrm>
         </p:spPr>
         <p:txBody>
@@ -4245,10 +4298,12 @@
             <a:noAutofit/>
           </a:bodyPr>
           <a:lstStyle>
-            <a:lvl1pPr>
-              <a:defRPr sz="3200" cap="all" baseline="0">
+            <a:lvl1pPr algn="l">
+              <a:defRPr sz="3200" cap="all" spc="0" baseline="0">
                 <a:solidFill>
-                  <a:schemeClr val="accent3"/>
+                  <a:schemeClr val="accent3">
+                    <a:lumMod val="75000"/>
+                  </a:schemeClr>
                 </a:solidFill>
               </a:defRPr>
             </a:lvl1pPr>
@@ -4263,10 +4318,10 @@
       </p:sp>
       <p:sp>
         <p:nvSpPr>
-          <p:cNvPr id="7" name="Content Placeholder 6">
+          <p:cNvPr id="13" name="Picture Placeholder 12">
             <a:extLst>
               <a:ext uri="{FF2B5EF4-FFF2-40B4-BE49-F238E27FC236}">
-                <a16:creationId xmlns:a16="http://schemas.microsoft.com/office/drawing/2014/main" id="{0D9D0F3E-69D8-49F3-5D7A-71FDC4E3EEE3}"/>
+                <a16:creationId xmlns:a16="http://schemas.microsoft.com/office/drawing/2014/main" id="{9D4661F0-027E-881F-63A9-13BFE96EB8E7}"/>
               </a:ext>
             </a:extLst>
           </p:cNvPr>
@@ -4274,144 +4329,145 @@
             <a:spLocks noGrp="1"/>
           </p:cNvSpPr>
           <p:nvPr>
-            <p:ph sz="quarter" idx="14" hasCustomPrompt="1"/>
+            <p:ph type="pic" sz="quarter" idx="10"/>
           </p:nvPr>
         </p:nvSpPr>
         <p:spPr>
           <a:xfrm>
-            <a:off x="831850" y="3079119"/>
-            <a:ext cx="4413250" cy="2752725"/>
+            <a:off x="1528174" y="1511300"/>
+            <a:ext cx="8928000" cy="5040000"/>
           </a:xfrm>
         </p:spPr>
         <p:txBody>
           <a:bodyPr/>
-          <a:lstStyle>
-            <a:lvl1pPr>
-              <a:lnSpc>
-                <a:spcPct val="120000"/>
-              </a:lnSpc>
-              <a:spcBef>
-                <a:spcPts val="1000"/>
-              </a:spcBef>
-              <a:defRPr sz="1800">
-                <a:solidFill>
-                  <a:schemeClr val="bg1"/>
-                </a:solidFill>
-                <a:latin typeface="+mn-lt"/>
-              </a:defRPr>
-            </a:lvl1pPr>
-            <a:lvl2pPr>
-              <a:lnSpc>
-                <a:spcPct val="120000"/>
-              </a:lnSpc>
-              <a:spcBef>
-                <a:spcPts val="1000"/>
-              </a:spcBef>
-              <a:buClr>
-                <a:schemeClr val="accent3"/>
-              </a:buClr>
-              <a:defRPr sz="1600">
-                <a:solidFill>
-                  <a:schemeClr val="bg1"/>
-                </a:solidFill>
-                <a:latin typeface="+mn-lt"/>
-              </a:defRPr>
-            </a:lvl2pPr>
-            <a:lvl3pPr>
-              <a:lnSpc>
-                <a:spcPct val="120000"/>
-              </a:lnSpc>
-              <a:spcBef>
-                <a:spcPts val="1000"/>
-              </a:spcBef>
-              <a:buClr>
-                <a:schemeClr val="accent3"/>
-              </a:buClr>
-              <a:defRPr sz="1400">
-                <a:solidFill>
-                  <a:schemeClr val="bg1"/>
-                </a:solidFill>
-                <a:latin typeface="+mn-lt"/>
-              </a:defRPr>
-            </a:lvl3pPr>
-            <a:lvl4pPr>
-              <a:lnSpc>
-                <a:spcPct val="120000"/>
-              </a:lnSpc>
-              <a:spcBef>
-                <a:spcPts val="1000"/>
-              </a:spcBef>
-              <a:buClr>
-                <a:schemeClr val="accent3"/>
-              </a:buClr>
-              <a:defRPr sz="1200">
-                <a:solidFill>
-                  <a:schemeClr val="bg1"/>
-                </a:solidFill>
-                <a:latin typeface="+mn-lt"/>
-              </a:defRPr>
-            </a:lvl4pPr>
-            <a:lvl5pPr>
-              <a:lnSpc>
-                <a:spcPct val="120000"/>
-              </a:lnSpc>
-              <a:spcBef>
-                <a:spcPts val="1000"/>
-              </a:spcBef>
-              <a:buClr>
-                <a:schemeClr val="accent3"/>
-              </a:buClr>
-              <a:defRPr sz="1200">
-                <a:solidFill>
-                  <a:schemeClr val="bg1"/>
-                </a:solidFill>
-                <a:latin typeface="+mn-lt"/>
-              </a:defRPr>
-            </a:lvl5pPr>
-          </a:lstStyle>
+          <a:lstStyle/>
           <a:p>
-            <a:pPr lvl="0"/>
-            <a:r>
-              <a:rPr lang="en-US" dirty="0"/>
-              <a:t>Click to add content</a:t>
-            </a:r>
+            <a:endParaRPr lang="en-CN"/>
           </a:p>
+        </p:txBody>
+      </p:sp>
+    </p:spTree>
+    <p:extLst>
+      <p:ext uri="{BB962C8B-B14F-4D97-AF65-F5344CB8AC3E}">
+        <p14:creationId xmlns:p14="http://schemas.microsoft.com/office/powerpoint/2010/main" val="4125312550"/>
+      </p:ext>
+    </p:extLst>
+  </p:cSld>
+  <p:clrMapOvr>
+    <a:masterClrMapping/>
+  </p:clrMapOvr>
+</p:sldLayout>
+</file>
+
+<file path=ppt/slideLayouts/slideLayout9.xml><?xml version="1.0" encoding="utf-8"?>
+<p:sldLayout xmlns:a="http://schemas.openxmlformats.org/drawingml/2006/main" xmlns:r="http://schemas.openxmlformats.org/officeDocument/2006/relationships" xmlns:p="http://schemas.openxmlformats.org/presentationml/2006/main" preserve="1" userDrawn="1">
+  <p:cSld name="Title, Content, Picture 0">
+    <p:bg>
+      <p:bgPr>
+        <a:gradFill>
+          <a:gsLst>
+            <a:gs pos="100000">
+              <a:schemeClr val="tx2"/>
+            </a:gs>
+            <a:gs pos="81000">
+              <a:schemeClr val="accent6"/>
+            </a:gs>
+            <a:gs pos="31000">
+              <a:srgbClr val="02090E"/>
+            </a:gs>
+            <a:gs pos="14000">
+              <a:schemeClr val="accent4">
+                <a:lumMod val="75000"/>
+              </a:schemeClr>
+            </a:gs>
+            <a:gs pos="0">
+              <a:schemeClr val="accent4"/>
+            </a:gs>
+          </a:gsLst>
+          <a:lin ang="7800000" scaled="0"/>
+        </a:gradFill>
+        <a:effectLst/>
+      </p:bgPr>
+    </p:bg>
+    <p:spTree>
+      <p:nvGrpSpPr>
+        <p:cNvPr id="1" name=""/>
+        <p:cNvGrpSpPr/>
+        <p:nvPr/>
+      </p:nvGrpSpPr>
+      <p:grpSpPr>
+        <a:xfrm>
+          <a:off x="0" y="0"/>
+          <a:ext cx="0" cy="0"/>
+          <a:chOff x="0" y="0"/>
+          <a:chExt cx="0" cy="0"/>
+        </a:xfrm>
+      </p:grpSpPr>
+      <p:sp>
+        <p:nvSpPr>
+          <p:cNvPr id="3" name="Rectangle 2">
+            <a:extLst>
+              <a:ext uri="{FF2B5EF4-FFF2-40B4-BE49-F238E27FC236}">
+                <a16:creationId xmlns:a16="http://schemas.microsoft.com/office/drawing/2014/main" id="{B3A7247A-846A-F316-B494-69B42CBF34DD}"/>
+              </a:ext>
+              <a:ext uri="{C183D7F6-B498-43B3-948B-1728B52AA6E4}">
+                <adec:decorative xmlns:adec="http://schemas.microsoft.com/office/drawing/2017/decorative" val="1"/>
+              </a:ext>
+            </a:extLst>
+          </p:cNvPr>
+          <p:cNvSpPr/>
+          <p:nvPr userDrawn="1"/>
+        </p:nvSpPr>
+        <p:spPr>
+          <a:xfrm>
+            <a:off x="321869" y="343814"/>
+            <a:ext cx="11550701" cy="6210605"/>
+          </a:xfrm>
+          <a:prstGeom prst="rect">
+            <a:avLst/>
+          </a:prstGeom>
+          <a:solidFill>
+            <a:schemeClr val="tx1">
+              <a:alpha val="70000"/>
+            </a:schemeClr>
+          </a:solidFill>
+          <a:ln>
+            <a:noFill/>
+          </a:ln>
+        </p:spPr>
+        <p:style>
+          <a:lnRef idx="2">
+            <a:schemeClr val="accent1">
+              <a:shade val="50000"/>
+            </a:schemeClr>
+          </a:lnRef>
+          <a:fillRef idx="1">
+            <a:schemeClr val="accent1"/>
+          </a:fillRef>
+          <a:effectRef idx="0">
+            <a:schemeClr val="accent1"/>
+          </a:effectRef>
+          <a:fontRef idx="minor">
+            <a:schemeClr val="lt1"/>
+          </a:fontRef>
+        </p:style>
+        <p:txBody>
+          <a:bodyPr rtlCol="0" anchor="ctr">
+            <a:noAutofit/>
+          </a:bodyPr>
+          <a:lstStyle/>
           <a:p>
-            <a:pPr lvl="1"/>
-            <a:r>
-              <a:rPr lang="en-US" dirty="0"/>
-              <a:t>Second level</a:t>
-            </a:r>
-          </a:p>
-          <a:p>
-            <a:pPr lvl="2"/>
-            <a:r>
-              <a:rPr lang="en-US" dirty="0"/>
-              <a:t>Third level</a:t>
-            </a:r>
-          </a:p>
-          <a:p>
-            <a:pPr lvl="3"/>
-            <a:r>
-              <a:rPr lang="en-US" dirty="0"/>
-              <a:t>Fourth level</a:t>
-            </a:r>
-          </a:p>
-          <a:p>
-            <a:pPr lvl="4"/>
-            <a:r>
-              <a:rPr lang="en-US" dirty="0"/>
-              <a:t>Fifth level</a:t>
-            </a:r>
+            <a:pPr algn="ctr"/>
+            <a:endParaRPr lang="en-US" dirty="0"/>
           </a:p>
         </p:txBody>
       </p:sp>
       <p:cxnSp>
         <p:nvCxnSpPr>
-          <p:cNvPr id="6" name="Straight Connector 5">
+          <p:cNvPr id="4" name="Straight Connector 3">
             <a:extLst>
               <a:ext uri="{FF2B5EF4-FFF2-40B4-BE49-F238E27FC236}">
-                <a16:creationId xmlns:a16="http://schemas.microsoft.com/office/drawing/2014/main" id="{61CFC792-44F7-2497-E19D-8FB08AFF94F7}"/>
+                <a16:creationId xmlns:a16="http://schemas.microsoft.com/office/drawing/2014/main" id="{884B3AF6-983E-0901-0045-6CDF4E93E1BA}"/>
               </a:ext>
               <a:ext uri="{C183D7F6-B498-43B3-948B-1728B52AA6E4}">
                 <adec:decorative xmlns:adec="http://schemas.microsoft.com/office/drawing/2017/decorative" val="1"/>
@@ -4425,8 +4481,8 @@
         </p:nvCxnSpPr>
         <p:spPr>
           <a:xfrm>
-            <a:off x="835831" y="2679192"/>
-            <a:ext cx="4101929" cy="0"/>
+            <a:off x="807039" y="1983705"/>
+            <a:ext cx="10435630" cy="0"/>
           </a:xfrm>
           <a:prstGeom prst="line">
             <a:avLst/>
@@ -4462,10 +4518,612 @@
           </a:fontRef>
         </p:style>
       </p:cxnSp>
+      <p:grpSp>
+        <p:nvGrpSpPr>
+          <p:cNvPr id="9" name="Group 8">
+            <a:extLst>
+              <a:ext uri="{FF2B5EF4-FFF2-40B4-BE49-F238E27FC236}">
+                <a16:creationId xmlns:a16="http://schemas.microsoft.com/office/drawing/2014/main" id="{3C5B7647-403E-A66E-6CF4-0D3A99AA5154}"/>
+              </a:ext>
+              <a:ext uri="{C183D7F6-B498-43B3-948B-1728B52AA6E4}">
+                <adec:decorative xmlns:adec="http://schemas.microsoft.com/office/drawing/2017/decorative" val="1"/>
+              </a:ext>
+            </a:extLst>
+          </p:cNvPr>
+          <p:cNvGrpSpPr/>
+          <p:nvPr userDrawn="1"/>
+        </p:nvGrpSpPr>
+        <p:grpSpPr>
+          <a:xfrm rot="10800000" flipH="1">
+            <a:off x="10488530" y="4210019"/>
+            <a:ext cx="754139" cy="1865729"/>
+            <a:chOff x="653351" y="2693558"/>
+            <a:chExt cx="754139" cy="1865729"/>
+          </a:xfrm>
+        </p:grpSpPr>
+        <p:sp>
+          <p:nvSpPr>
+            <p:cNvPr id="10" name="Graphic 15">
+              <a:extLst>
+                <a:ext uri="{FF2B5EF4-FFF2-40B4-BE49-F238E27FC236}">
+                  <a16:creationId xmlns:a16="http://schemas.microsoft.com/office/drawing/2014/main" id="{E48E731E-FEF1-9C59-64B0-9CB6E8853912}"/>
+                </a:ext>
+                <a:ext uri="{C183D7F6-B498-43B3-948B-1728B52AA6E4}">
+                  <adec:decorative xmlns:adec="http://schemas.microsoft.com/office/drawing/2017/decorative" val="1"/>
+                </a:ext>
+              </a:extLst>
+            </p:cNvPr>
+            <p:cNvSpPr/>
+            <p:nvPr/>
+          </p:nvSpPr>
+          <p:spPr>
+            <a:xfrm>
+              <a:off x="1098137" y="2693558"/>
+              <a:ext cx="128016" cy="128016"/>
+            </a:xfrm>
+            <a:custGeom>
+              <a:avLst/>
+              <a:gdLst>
+                <a:gd name="connsiteX0" fmla="*/ 63857 w 127713"/>
+                <a:gd name="connsiteY0" fmla="*/ 18874 h 127713"/>
+                <a:gd name="connsiteX1" fmla="*/ 108839 w 127713"/>
+                <a:gd name="connsiteY1" fmla="*/ 63857 h 127713"/>
+                <a:gd name="connsiteX2" fmla="*/ 63857 w 127713"/>
+                <a:gd name="connsiteY2" fmla="*/ 108839 h 127713"/>
+                <a:gd name="connsiteX3" fmla="*/ 18874 w 127713"/>
+                <a:gd name="connsiteY3" fmla="*/ 63857 h 127713"/>
+                <a:gd name="connsiteX4" fmla="*/ 63857 w 127713"/>
+                <a:gd name="connsiteY4" fmla="*/ 18874 h 127713"/>
+                <a:gd name="connsiteX5" fmla="*/ 63857 w 127713"/>
+                <a:gd name="connsiteY5" fmla="*/ 0 h 127713"/>
+                <a:gd name="connsiteX6" fmla="*/ 0 w 127713"/>
+                <a:gd name="connsiteY6" fmla="*/ 63857 h 127713"/>
+                <a:gd name="connsiteX7" fmla="*/ 63857 w 127713"/>
+                <a:gd name="connsiteY7" fmla="*/ 127713 h 127713"/>
+                <a:gd name="connsiteX8" fmla="*/ 127713 w 127713"/>
+                <a:gd name="connsiteY8" fmla="*/ 63857 h 127713"/>
+                <a:gd name="connsiteX9" fmla="*/ 63857 w 127713"/>
+                <a:gd name="connsiteY9" fmla="*/ 0 h 127713"/>
+              </a:gdLst>
+              <a:ahLst/>
+              <a:cxnLst>
+                <a:cxn ang="0">
+                  <a:pos x="connsiteX0" y="connsiteY0"/>
+                </a:cxn>
+                <a:cxn ang="0">
+                  <a:pos x="connsiteX1" y="connsiteY1"/>
+                </a:cxn>
+                <a:cxn ang="0">
+                  <a:pos x="connsiteX2" y="connsiteY2"/>
+                </a:cxn>
+                <a:cxn ang="0">
+                  <a:pos x="connsiteX3" y="connsiteY3"/>
+                </a:cxn>
+                <a:cxn ang="0">
+                  <a:pos x="connsiteX4" y="connsiteY4"/>
+                </a:cxn>
+                <a:cxn ang="0">
+                  <a:pos x="connsiteX5" y="connsiteY5"/>
+                </a:cxn>
+                <a:cxn ang="0">
+                  <a:pos x="connsiteX6" y="connsiteY6"/>
+                </a:cxn>
+                <a:cxn ang="0">
+                  <a:pos x="connsiteX7" y="connsiteY7"/>
+                </a:cxn>
+                <a:cxn ang="0">
+                  <a:pos x="connsiteX8" y="connsiteY8"/>
+                </a:cxn>
+                <a:cxn ang="0">
+                  <a:pos x="connsiteX9" y="connsiteY9"/>
+                </a:cxn>
+              </a:cxnLst>
+              <a:rect l="l" t="t" r="r" b="b"/>
+              <a:pathLst>
+                <a:path w="127713" h="127713">
+                  <a:moveTo>
+                    <a:pt x="63857" y="18874"/>
+                  </a:moveTo>
+                  <a:cubicBezTo>
+                    <a:pt x="88700" y="18874"/>
+                    <a:pt x="108839" y="39013"/>
+                    <a:pt x="108839" y="63857"/>
+                  </a:cubicBezTo>
+                  <a:cubicBezTo>
+                    <a:pt x="108839" y="88700"/>
+                    <a:pt x="88700" y="108839"/>
+                    <a:pt x="63857" y="108839"/>
+                  </a:cubicBezTo>
+                  <a:cubicBezTo>
+                    <a:pt x="39013" y="108839"/>
+                    <a:pt x="18874" y="88700"/>
+                    <a:pt x="18874" y="63857"/>
+                  </a:cubicBezTo>
+                  <a:cubicBezTo>
+                    <a:pt x="18898" y="39023"/>
+                    <a:pt x="39023" y="18898"/>
+                    <a:pt x="63857" y="18874"/>
+                  </a:cubicBezTo>
+                  <a:moveTo>
+                    <a:pt x="63857" y="0"/>
+                  </a:moveTo>
+                  <a:cubicBezTo>
+                    <a:pt x="28590" y="0"/>
+                    <a:pt x="0" y="28590"/>
+                    <a:pt x="0" y="63857"/>
+                  </a:cubicBezTo>
+                  <a:cubicBezTo>
+                    <a:pt x="0" y="99124"/>
+                    <a:pt x="28590" y="127713"/>
+                    <a:pt x="63857" y="127713"/>
+                  </a:cubicBezTo>
+                  <a:cubicBezTo>
+                    <a:pt x="99124" y="127713"/>
+                    <a:pt x="127713" y="99124"/>
+                    <a:pt x="127713" y="63857"/>
+                  </a:cubicBezTo>
+                  <a:cubicBezTo>
+                    <a:pt x="127713" y="28590"/>
+                    <a:pt x="99124" y="0"/>
+                    <a:pt x="63857" y="0"/>
+                  </a:cubicBezTo>
+                  <a:close/>
+                </a:path>
+              </a:pathLst>
+            </a:custGeom>
+            <a:solidFill>
+              <a:schemeClr val="accent4">
+                <a:lumMod val="60000"/>
+                <a:lumOff val="40000"/>
+                <a:alpha val="49071"/>
+              </a:schemeClr>
+            </a:solidFill>
+            <a:ln w="610" cap="flat">
+              <a:noFill/>
+              <a:prstDash val="solid"/>
+              <a:miter/>
+            </a:ln>
+          </p:spPr>
+          <p:txBody>
+            <a:bodyPr rtlCol="0" anchor="ctr">
+              <a:noAutofit/>
+            </a:bodyPr>
+            <a:lstStyle/>
+            <a:p>
+              <a:endParaRPr lang="en-US" dirty="0"/>
+            </a:p>
+          </p:txBody>
+        </p:sp>
+        <p:sp>
+          <p:nvSpPr>
+            <p:cNvPr id="11" name="Graphic 12">
+              <a:extLst>
+                <a:ext uri="{FF2B5EF4-FFF2-40B4-BE49-F238E27FC236}">
+                  <a16:creationId xmlns:a16="http://schemas.microsoft.com/office/drawing/2014/main" id="{AFE83BB3-4D12-8E20-CA93-1834D7F0A434}"/>
+                </a:ext>
+                <a:ext uri="{C183D7F6-B498-43B3-948B-1728B52AA6E4}">
+                  <adec:decorative xmlns:adec="http://schemas.microsoft.com/office/drawing/2017/decorative" val="1"/>
+                </a:ext>
+              </a:extLst>
+            </p:cNvPr>
+            <p:cNvSpPr/>
+            <p:nvPr/>
+          </p:nvSpPr>
+          <p:spPr>
+            <a:xfrm>
+              <a:off x="1306906" y="3837599"/>
+              <a:ext cx="100584" cy="100584"/>
+            </a:xfrm>
+            <a:custGeom>
+              <a:avLst/>
+              <a:gdLst>
+                <a:gd name="connsiteX0" fmla="*/ 91138 w 91138"/>
+                <a:gd name="connsiteY0" fmla="*/ 45569 h 91138"/>
+                <a:gd name="connsiteX1" fmla="*/ 45569 w 91138"/>
+                <a:gd name="connsiteY1" fmla="*/ 91138 h 91138"/>
+                <a:gd name="connsiteX2" fmla="*/ 0 w 91138"/>
+                <a:gd name="connsiteY2" fmla="*/ 45569 h 91138"/>
+                <a:gd name="connsiteX3" fmla="*/ 45569 w 91138"/>
+                <a:gd name="connsiteY3" fmla="*/ 0 h 91138"/>
+                <a:gd name="connsiteX4" fmla="*/ 91138 w 91138"/>
+                <a:gd name="connsiteY4" fmla="*/ 45569 h 91138"/>
+              </a:gdLst>
+              <a:ahLst/>
+              <a:cxnLst>
+                <a:cxn ang="0">
+                  <a:pos x="connsiteX0" y="connsiteY0"/>
+                </a:cxn>
+                <a:cxn ang="0">
+                  <a:pos x="connsiteX1" y="connsiteY1"/>
+                </a:cxn>
+                <a:cxn ang="0">
+                  <a:pos x="connsiteX2" y="connsiteY2"/>
+                </a:cxn>
+                <a:cxn ang="0">
+                  <a:pos x="connsiteX3" y="connsiteY3"/>
+                </a:cxn>
+                <a:cxn ang="0">
+                  <a:pos x="connsiteX4" y="connsiteY4"/>
+                </a:cxn>
+              </a:cxnLst>
+              <a:rect l="l" t="t" r="r" b="b"/>
+              <a:pathLst>
+                <a:path w="91138" h="91138">
+                  <a:moveTo>
+                    <a:pt x="91138" y="45569"/>
+                  </a:moveTo>
+                  <a:cubicBezTo>
+                    <a:pt x="91138" y="70736"/>
+                    <a:pt x="70736" y="91138"/>
+                    <a:pt x="45569" y="91138"/>
+                  </a:cubicBezTo>
+                  <a:cubicBezTo>
+                    <a:pt x="20402" y="91138"/>
+                    <a:pt x="0" y="70736"/>
+                    <a:pt x="0" y="45569"/>
+                  </a:cubicBezTo>
+                  <a:cubicBezTo>
+                    <a:pt x="0" y="20402"/>
+                    <a:pt x="20402" y="0"/>
+                    <a:pt x="45569" y="0"/>
+                  </a:cubicBezTo>
+                  <a:cubicBezTo>
+                    <a:pt x="70736" y="0"/>
+                    <a:pt x="91138" y="20402"/>
+                    <a:pt x="91138" y="45569"/>
+                  </a:cubicBezTo>
+                  <a:close/>
+                </a:path>
+              </a:pathLst>
+            </a:custGeom>
+            <a:solidFill>
+              <a:schemeClr val="accent4">
+                <a:lumMod val="60000"/>
+                <a:lumOff val="40000"/>
+                <a:alpha val="49071"/>
+              </a:schemeClr>
+            </a:solidFill>
+            <a:ln w="422" cap="flat">
+              <a:noFill/>
+              <a:prstDash val="solid"/>
+              <a:miter/>
+            </a:ln>
+          </p:spPr>
+          <p:txBody>
+            <a:bodyPr rtlCol="0" anchor="ctr">
+              <a:noAutofit/>
+            </a:bodyPr>
+            <a:lstStyle/>
+            <a:p>
+              <a:endParaRPr lang="en-US" dirty="0"/>
+            </a:p>
+          </p:txBody>
+        </p:sp>
+        <p:sp>
+          <p:nvSpPr>
+            <p:cNvPr id="12" name="Graphic 12">
+              <a:extLst>
+                <a:ext uri="{FF2B5EF4-FFF2-40B4-BE49-F238E27FC236}">
+                  <a16:creationId xmlns:a16="http://schemas.microsoft.com/office/drawing/2014/main" id="{3EB1D810-BC05-6C0E-0DE4-3604EBAADCC3}"/>
+                </a:ext>
+                <a:ext uri="{C183D7F6-B498-43B3-948B-1728B52AA6E4}">
+                  <adec:decorative xmlns:adec="http://schemas.microsoft.com/office/drawing/2017/decorative" val="1"/>
+                </a:ext>
+              </a:extLst>
+            </p:cNvPr>
+            <p:cNvSpPr/>
+            <p:nvPr/>
+          </p:nvSpPr>
+          <p:spPr>
+            <a:xfrm>
+              <a:off x="653351" y="4521502"/>
+              <a:ext cx="45719" cy="37785"/>
+            </a:xfrm>
+            <a:custGeom>
+              <a:avLst/>
+              <a:gdLst>
+                <a:gd name="connsiteX0" fmla="*/ 91138 w 91138"/>
+                <a:gd name="connsiteY0" fmla="*/ 45569 h 91138"/>
+                <a:gd name="connsiteX1" fmla="*/ 45569 w 91138"/>
+                <a:gd name="connsiteY1" fmla="*/ 91138 h 91138"/>
+                <a:gd name="connsiteX2" fmla="*/ 0 w 91138"/>
+                <a:gd name="connsiteY2" fmla="*/ 45569 h 91138"/>
+                <a:gd name="connsiteX3" fmla="*/ 45569 w 91138"/>
+                <a:gd name="connsiteY3" fmla="*/ 0 h 91138"/>
+                <a:gd name="connsiteX4" fmla="*/ 91138 w 91138"/>
+                <a:gd name="connsiteY4" fmla="*/ 45569 h 91138"/>
+              </a:gdLst>
+              <a:ahLst/>
+              <a:cxnLst>
+                <a:cxn ang="0">
+                  <a:pos x="connsiteX0" y="connsiteY0"/>
+                </a:cxn>
+                <a:cxn ang="0">
+                  <a:pos x="connsiteX1" y="connsiteY1"/>
+                </a:cxn>
+                <a:cxn ang="0">
+                  <a:pos x="connsiteX2" y="connsiteY2"/>
+                </a:cxn>
+                <a:cxn ang="0">
+                  <a:pos x="connsiteX3" y="connsiteY3"/>
+                </a:cxn>
+                <a:cxn ang="0">
+                  <a:pos x="connsiteX4" y="connsiteY4"/>
+                </a:cxn>
+              </a:cxnLst>
+              <a:rect l="l" t="t" r="r" b="b"/>
+              <a:pathLst>
+                <a:path w="91138" h="91138">
+                  <a:moveTo>
+                    <a:pt x="91138" y="45569"/>
+                  </a:moveTo>
+                  <a:cubicBezTo>
+                    <a:pt x="91138" y="70736"/>
+                    <a:pt x="70736" y="91138"/>
+                    <a:pt x="45569" y="91138"/>
+                  </a:cubicBezTo>
+                  <a:cubicBezTo>
+                    <a:pt x="20402" y="91138"/>
+                    <a:pt x="0" y="70736"/>
+                    <a:pt x="0" y="45569"/>
+                  </a:cubicBezTo>
+                  <a:cubicBezTo>
+                    <a:pt x="0" y="20402"/>
+                    <a:pt x="20402" y="0"/>
+                    <a:pt x="45569" y="0"/>
+                  </a:cubicBezTo>
+                  <a:cubicBezTo>
+                    <a:pt x="70736" y="0"/>
+                    <a:pt x="91138" y="20402"/>
+                    <a:pt x="91138" y="45569"/>
+                  </a:cubicBezTo>
+                  <a:close/>
+                </a:path>
+              </a:pathLst>
+            </a:custGeom>
+            <a:solidFill>
+              <a:schemeClr val="accent4">
+                <a:lumMod val="60000"/>
+                <a:lumOff val="40000"/>
+                <a:alpha val="49071"/>
+              </a:schemeClr>
+            </a:solidFill>
+            <a:ln w="422" cap="flat">
+              <a:noFill/>
+              <a:prstDash val="solid"/>
+              <a:miter/>
+            </a:ln>
+          </p:spPr>
+          <p:txBody>
+            <a:bodyPr rtlCol="0" anchor="ctr">
+              <a:noAutofit/>
+            </a:bodyPr>
+            <a:lstStyle/>
+            <a:p>
+              <a:endParaRPr lang="en-US" dirty="0"/>
+            </a:p>
+          </p:txBody>
+        </p:sp>
+      </p:grpSp>
+      <p:sp>
+        <p:nvSpPr>
+          <p:cNvPr id="2" name="Title 1">
+            <a:extLst>
+              <a:ext uri="{FF2B5EF4-FFF2-40B4-BE49-F238E27FC236}">
+                <a16:creationId xmlns:a16="http://schemas.microsoft.com/office/drawing/2014/main" id="{DF8070BB-B3B5-3A8A-2466-D661C741794F}"/>
+              </a:ext>
+            </a:extLst>
+          </p:cNvPr>
+          <p:cNvSpPr>
+            <a:spLocks noGrp="1"/>
+          </p:cNvSpPr>
+          <p:nvPr>
+            <p:ph type="title" hasCustomPrompt="1"/>
+          </p:nvPr>
+        </p:nvSpPr>
+        <p:spPr>
+          <a:xfrm>
+            <a:off x="741680" y="430482"/>
+            <a:ext cx="10500989" cy="1327464"/>
+          </a:xfrm>
+        </p:spPr>
+        <p:txBody>
+          <a:bodyPr anchor="b">
+            <a:noAutofit/>
+          </a:bodyPr>
+          <a:lstStyle>
+            <a:lvl1pPr algn="l">
+              <a:defRPr sz="3200" cap="all" spc="0" baseline="0">
+                <a:solidFill>
+                  <a:schemeClr val="accent3">
+                    <a:lumMod val="75000"/>
+                  </a:schemeClr>
+                </a:solidFill>
+              </a:defRPr>
+            </a:lvl1pPr>
+          </a:lstStyle>
+          <a:p>
+            <a:r>
+              <a:rPr lang="en-US" dirty="0"/>
+              <a:t>Click to add title</a:t>
+            </a:r>
+          </a:p>
+        </p:txBody>
+      </p:sp>
+      <p:sp>
+        <p:nvSpPr>
+          <p:cNvPr id="5" name="Content Placeholder 4">
+            <a:extLst>
+              <a:ext uri="{FF2B5EF4-FFF2-40B4-BE49-F238E27FC236}">
+                <a16:creationId xmlns:a16="http://schemas.microsoft.com/office/drawing/2014/main" id="{A2003C5A-BF21-DE87-0ED1-3E2D0F32B5D8}"/>
+              </a:ext>
+            </a:extLst>
+          </p:cNvPr>
+          <p:cNvSpPr>
+            <a:spLocks noGrp="1"/>
+          </p:cNvSpPr>
+          <p:nvPr>
+            <p:ph sz="quarter" idx="35" hasCustomPrompt="1"/>
+          </p:nvPr>
+        </p:nvSpPr>
+        <p:spPr>
+          <a:xfrm>
+            <a:off x="807038" y="2465539"/>
+            <a:ext cx="3774587" cy="3723753"/>
+          </a:xfrm>
+        </p:spPr>
+        <p:txBody>
+          <a:bodyPr/>
+          <a:lstStyle>
+            <a:lvl1pPr marL="342900" indent="-342900">
+              <a:lnSpc>
+                <a:spcPct val="120000"/>
+              </a:lnSpc>
+              <a:spcBef>
+                <a:spcPts val="1000"/>
+              </a:spcBef>
+              <a:buClr>
+                <a:schemeClr val="accent3">
+                  <a:lumMod val="75000"/>
+                </a:schemeClr>
+              </a:buClr>
+              <a:buFont typeface="+mj-lt"/>
+              <a:buAutoNum type="arabicPeriod"/>
+              <a:defRPr sz="1800" spc="0" baseline="0">
+                <a:solidFill>
+                  <a:schemeClr val="bg1"/>
+                </a:solidFill>
+                <a:latin typeface="+mn-lt"/>
+              </a:defRPr>
+            </a:lvl1pPr>
+            <a:lvl2pPr marL="626364" indent="-342900">
+              <a:lnSpc>
+                <a:spcPct val="120000"/>
+              </a:lnSpc>
+              <a:spcBef>
+                <a:spcPts val="1000"/>
+              </a:spcBef>
+              <a:buClr>
+                <a:schemeClr val="accent3">
+                  <a:lumMod val="75000"/>
+                </a:schemeClr>
+              </a:buClr>
+              <a:buFont typeface="+mj-lt"/>
+              <a:buAutoNum type="alphaLcPeriod"/>
+              <a:defRPr sz="1800" spc="0">
+                <a:solidFill>
+                  <a:schemeClr val="bg1"/>
+                </a:solidFill>
+                <a:latin typeface="+mn-lt"/>
+              </a:defRPr>
+            </a:lvl2pPr>
+            <a:lvl3pPr marL="918972" indent="-342900">
+              <a:lnSpc>
+                <a:spcPct val="120000"/>
+              </a:lnSpc>
+              <a:spcBef>
+                <a:spcPts val="1000"/>
+              </a:spcBef>
+              <a:buClr>
+                <a:schemeClr val="accent3">
+                  <a:lumMod val="75000"/>
+                </a:schemeClr>
+              </a:buClr>
+              <a:buFont typeface="+mj-lt"/>
+              <a:buAutoNum type="arabicParenR"/>
+              <a:defRPr sz="1800" spc="0">
+                <a:solidFill>
+                  <a:schemeClr val="bg1"/>
+                </a:solidFill>
+                <a:latin typeface="+mn-lt"/>
+              </a:defRPr>
+            </a:lvl3pPr>
+            <a:lvl4pPr marL="1209294" indent="-342900">
+              <a:lnSpc>
+                <a:spcPct val="120000"/>
+              </a:lnSpc>
+              <a:spcBef>
+                <a:spcPts val="1000"/>
+              </a:spcBef>
+              <a:buClr>
+                <a:schemeClr val="accent3">
+                  <a:lumMod val="75000"/>
+                </a:schemeClr>
+              </a:buClr>
+              <a:buFont typeface="+mj-lt"/>
+              <a:buAutoNum type="alphaLcParenR"/>
+              <a:defRPr sz="1800" spc="0">
+                <a:solidFill>
+                  <a:schemeClr val="bg1"/>
+                </a:solidFill>
+                <a:latin typeface="+mn-lt"/>
+              </a:defRPr>
+            </a:lvl4pPr>
+          </a:lstStyle>
+          <a:p>
+            <a:pPr lvl="0"/>
+            <a:r>
+              <a:rPr lang="en-US" dirty="0"/>
+              <a:t>Click to add content</a:t>
+            </a:r>
+          </a:p>
+          <a:p>
+            <a:pPr lvl="1"/>
+            <a:r>
+              <a:rPr lang="en-US" dirty="0"/>
+              <a:t>Second level</a:t>
+            </a:r>
+          </a:p>
+          <a:p>
+            <a:pPr lvl="2"/>
+            <a:r>
+              <a:rPr lang="en-US" dirty="0"/>
+              <a:t>Third level</a:t>
+            </a:r>
+          </a:p>
+          <a:p>
+            <a:pPr lvl="3"/>
+            <a:r>
+              <a:rPr lang="en-US" dirty="0"/>
+              <a:t>Fourth level</a:t>
+            </a:r>
+          </a:p>
+        </p:txBody>
+      </p:sp>
+      <p:sp>
+        <p:nvSpPr>
+          <p:cNvPr id="6" name="Picture Placeholder 12">
+            <a:extLst>
+              <a:ext uri="{FF2B5EF4-FFF2-40B4-BE49-F238E27FC236}">
+                <a16:creationId xmlns:a16="http://schemas.microsoft.com/office/drawing/2014/main" id="{F795324F-3564-501F-776E-1003E8C38DE9}"/>
+              </a:ext>
+            </a:extLst>
+          </p:cNvPr>
+          <p:cNvSpPr>
+            <a:spLocks noGrp="1"/>
+          </p:cNvSpPr>
+          <p:nvPr>
+            <p:ph type="pic" sz="quarter" idx="10"/>
+          </p:nvPr>
+        </p:nvSpPr>
+        <p:spPr>
+          <a:xfrm>
+            <a:off x="4835371" y="2488825"/>
+            <a:ext cx="6407298" cy="3700454"/>
+          </a:xfrm>
+        </p:spPr>
+        <p:txBody>
+          <a:bodyPr/>
+          <a:lstStyle/>
+          <a:p>
+            <a:endParaRPr lang="en-CN"/>
+          </a:p>
+        </p:txBody>
+      </p:sp>
     </p:spTree>
     <p:extLst>
       <p:ext uri="{BB962C8B-B14F-4D97-AF65-F5344CB8AC3E}">
-        <p14:creationId xmlns:p14="http://schemas.microsoft.com/office/powerpoint/2010/main" val="2968843757"/>
+        <p14:creationId xmlns:p14="http://schemas.microsoft.com/office/powerpoint/2010/main" val="966222750"/>
       </p:ext>
     </p:extLst>
   </p:cSld>
@@ -4475,12 +5133,12 @@
   <p:extLst>
     <p:ext uri="{DCECCB84-F9BA-43D5-87BE-67443E8EF086}">
       <p15:sldGuideLst xmlns:p15="http://schemas.microsoft.com/office/powerpoint/2012/main">
-        <p15:guide id="1" orient="horz" pos="2160">
+        <p15:guide id="1" orient="horz" pos="2160" userDrawn="1">
           <p15:clr>
             <a:srgbClr val="FBAE40"/>
           </p15:clr>
         </p15:guide>
-        <p15:guide id="2" pos="3840">
+        <p15:guide id="2" pos="3840" userDrawn="1">
           <p15:clr>
             <a:srgbClr val="FBAE40"/>
           </p15:clr>
@@ -4784,11 +5442,14 @@
   <p:clrMap bg1="lt1" tx1="dk1" bg2="lt2" tx2="dk2" accent1="accent1" accent2="accent2" accent3="accent3" accent4="accent4" accent5="accent5" accent6="accent6" hlink="hlink" folHlink="folHlink"/>
   <p:sldLayoutIdLst>
     <p:sldLayoutId id="2147483679" r:id="rId1"/>
-    <p:sldLayoutId id="2147483669" r:id="rId2"/>
-    <p:sldLayoutId id="2147483680" r:id="rId3"/>
-    <p:sldLayoutId id="2147483676" r:id="rId4"/>
-    <p:sldLayoutId id="2147483681" r:id="rId5"/>
-    <p:sldLayoutId id="2147483682" r:id="rId6"/>
+    <p:sldLayoutId id="2147483687" r:id="rId2"/>
+    <p:sldLayoutId id="2147483669" r:id="rId3"/>
+    <p:sldLayoutId id="2147483682" r:id="rId4"/>
+    <p:sldLayoutId id="2147483685" r:id="rId5"/>
+    <p:sldLayoutId id="2147483686" r:id="rId6"/>
+    <p:sldLayoutId id="2147483683" r:id="rId7"/>
+    <p:sldLayoutId id="2147483680" r:id="rId8"/>
+    <p:sldLayoutId id="2147483676" r:id="rId9"/>
   </p:sldLayoutIdLst>
   <p:hf hdr="0" ftr="0" dt="0"/>
   <p:txStyles>

</xml_diff>